<commit_message>
4 why's of refactoring + Mission statement
</commit_message>
<xml_diff>
--- a/RefactoringToCleanerCode.pptx
+++ b/RefactoringToCleanerCode.pptx
@@ -5,12 +5,16 @@
     <p:sldMasterId id="2147483658" r:id="rId1"/>
   </p:sldMasterIdLst>
   <p:notesMasterIdLst>
-    <p:notesMasterId r:id="rId5"/>
+    <p:notesMasterId r:id="rId9"/>
   </p:notesMasterIdLst>
   <p:sldIdLst>
     <p:sldId id="256" r:id="rId2"/>
-    <p:sldId id="288" r:id="rId3"/>
-    <p:sldId id="278" r:id="rId4"/>
+    <p:sldId id="262" r:id="rId3"/>
+    <p:sldId id="263" r:id="rId4"/>
+    <p:sldId id="260" r:id="rId5"/>
+    <p:sldId id="289" r:id="rId6"/>
+    <p:sldId id="288" r:id="rId7"/>
+    <p:sldId id="278" r:id="rId8"/>
   </p:sldIdLst>
   <p:sldSz cx="9144000" cy="5143500" type="screen16x9"/>
   <p:notesSz cx="6858000" cy="9144000"/>
@@ -801,6 +805,333 @@
   <p:cSld>
     <p:spTree>
       <p:nvGrpSpPr>
+        <p:cNvPr id="1" name="Shape 90"/>
+        <p:cNvGrpSpPr/>
+        <p:nvPr/>
+      </p:nvGrpSpPr>
+      <p:grpSpPr>
+        <a:xfrm>
+          <a:off x="0" y="0"/>
+          <a:ext cx="0" cy="0"/>
+          <a:chOff x="0" y="0"/>
+          <a:chExt cx="0" cy="0"/>
+        </a:xfrm>
+      </p:grpSpPr>
+      <p:sp>
+        <p:nvSpPr>
+          <p:cNvPr id="91" name="Google Shape;91;g35ed75ccf_015:notes"/>
+          <p:cNvSpPr>
+            <a:spLocks noGrp="1" noRot="1" noChangeAspect="1"/>
+          </p:cNvSpPr>
+          <p:nvPr>
+            <p:ph type="sldImg" idx="2"/>
+          </p:nvPr>
+        </p:nvSpPr>
+        <p:spPr>
+          <a:xfrm>
+            <a:off x="381000" y="685800"/>
+            <a:ext cx="6096000" cy="3429000"/>
+          </a:xfrm>
+          <a:custGeom>
+            <a:avLst/>
+            <a:gdLst/>
+            <a:ahLst/>
+            <a:cxnLst/>
+            <a:rect l="l" t="t" r="r" b="b"/>
+            <a:pathLst>
+              <a:path w="120000" h="120000" extrusionOk="0">
+                <a:moveTo>
+                  <a:pt x="0" y="0"/>
+                </a:moveTo>
+                <a:lnTo>
+                  <a:pt x="120000" y="0"/>
+                </a:lnTo>
+                <a:lnTo>
+                  <a:pt x="120000" y="120000"/>
+                </a:lnTo>
+                <a:lnTo>
+                  <a:pt x="0" y="120000"/>
+                </a:lnTo>
+                <a:close/>
+              </a:path>
+            </a:pathLst>
+          </a:custGeom>
+        </p:spPr>
+      </p:sp>
+      <p:sp>
+        <p:nvSpPr>
+          <p:cNvPr id="92" name="Google Shape;92;g35ed75ccf_015:notes"/>
+          <p:cNvSpPr txBox="1">
+            <a:spLocks noGrp="1"/>
+          </p:cNvSpPr>
+          <p:nvPr>
+            <p:ph type="body" idx="1"/>
+          </p:nvPr>
+        </p:nvSpPr>
+        <p:spPr>
+          <a:xfrm>
+            <a:off x="685800" y="4343400"/>
+            <a:ext cx="5486400" cy="4114800"/>
+          </a:xfrm>
+          <a:prstGeom prst="rect">
+            <a:avLst/>
+          </a:prstGeom>
+        </p:spPr>
+        <p:txBody>
+          <a:bodyPr spcFirstLastPara="1" wrap="square" lIns="91425" tIns="91425" rIns="91425" bIns="91425" anchor="t" anchorCtr="0">
+            <a:noAutofit/>
+          </a:bodyPr>
+          <a:lstStyle/>
+          <a:p>
+            <a:pPr marL="0" lvl="0" indent="0" algn="l" rtl="0">
+              <a:spcBef>
+                <a:spcPts val="0"/>
+              </a:spcBef>
+              <a:spcAft>
+                <a:spcPts val="0"/>
+              </a:spcAft>
+              <a:buNone/>
+            </a:pPr>
+            <a:endParaRPr/>
+          </a:p>
+        </p:txBody>
+      </p:sp>
+    </p:spTree>
+    <p:extLst>
+      <p:ext uri="{BB962C8B-B14F-4D97-AF65-F5344CB8AC3E}">
+        <p14:creationId xmlns:p14="http://schemas.microsoft.com/office/powerpoint/2010/main" val="2829314234"/>
+      </p:ext>
+    </p:extLst>
+  </p:cSld>
+  <p:clrMapOvr>
+    <a:masterClrMapping/>
+  </p:clrMapOvr>
+</p:notes>
+</file>
+
+<file path=ppt/notesSlides/notesSlide3.xml><?xml version="1.0" encoding="utf-8"?>
+<p:notes xmlns:a="http://schemas.openxmlformats.org/drawingml/2006/main" xmlns:r="http://schemas.openxmlformats.org/officeDocument/2006/relationships" xmlns:p="http://schemas.openxmlformats.org/presentationml/2006/main" showMasterSp="0" showMasterPhAnim="0">
+  <p:cSld>
+    <p:spTree>
+      <p:nvGrpSpPr>
+        <p:cNvPr id="1" name="Shape 105"/>
+        <p:cNvGrpSpPr/>
+        <p:nvPr/>
+      </p:nvGrpSpPr>
+      <p:grpSpPr>
+        <a:xfrm>
+          <a:off x="0" y="0"/>
+          <a:ext cx="0" cy="0"/>
+          <a:chOff x="0" y="0"/>
+          <a:chExt cx="0" cy="0"/>
+        </a:xfrm>
+      </p:grpSpPr>
+      <p:sp>
+        <p:nvSpPr>
+          <p:cNvPr id="106" name="Google Shape;106;g35f391192_017:notes"/>
+          <p:cNvSpPr>
+            <a:spLocks noGrp="1" noRot="1" noChangeAspect="1"/>
+          </p:cNvSpPr>
+          <p:nvPr>
+            <p:ph type="sldImg" idx="2"/>
+          </p:nvPr>
+        </p:nvSpPr>
+        <p:spPr>
+          <a:xfrm>
+            <a:off x="381000" y="685800"/>
+            <a:ext cx="6096000" cy="3429000"/>
+          </a:xfrm>
+          <a:custGeom>
+            <a:avLst/>
+            <a:gdLst/>
+            <a:ahLst/>
+            <a:cxnLst/>
+            <a:rect l="l" t="t" r="r" b="b"/>
+            <a:pathLst>
+              <a:path w="120000" h="120000" extrusionOk="0">
+                <a:moveTo>
+                  <a:pt x="0" y="0"/>
+                </a:moveTo>
+                <a:lnTo>
+                  <a:pt x="120000" y="0"/>
+                </a:lnTo>
+                <a:lnTo>
+                  <a:pt x="120000" y="120000"/>
+                </a:lnTo>
+                <a:lnTo>
+                  <a:pt x="0" y="120000"/>
+                </a:lnTo>
+                <a:close/>
+              </a:path>
+            </a:pathLst>
+          </a:custGeom>
+        </p:spPr>
+      </p:sp>
+      <p:sp>
+        <p:nvSpPr>
+          <p:cNvPr id="107" name="Google Shape;107;g35f391192_017:notes"/>
+          <p:cNvSpPr txBox="1">
+            <a:spLocks noGrp="1"/>
+          </p:cNvSpPr>
+          <p:nvPr>
+            <p:ph type="body" idx="1"/>
+          </p:nvPr>
+        </p:nvSpPr>
+        <p:spPr>
+          <a:xfrm>
+            <a:off x="685800" y="4343400"/>
+            <a:ext cx="5486400" cy="4114800"/>
+          </a:xfrm>
+          <a:prstGeom prst="rect">
+            <a:avLst/>
+          </a:prstGeom>
+        </p:spPr>
+        <p:txBody>
+          <a:bodyPr spcFirstLastPara="1" wrap="square" lIns="91425" tIns="91425" rIns="91425" bIns="91425" anchor="t" anchorCtr="0">
+            <a:noAutofit/>
+          </a:bodyPr>
+          <a:lstStyle/>
+          <a:p>
+            <a:pPr marL="0" lvl="0" indent="0" algn="l" rtl="0">
+              <a:spcBef>
+                <a:spcPts val="0"/>
+              </a:spcBef>
+              <a:spcAft>
+                <a:spcPts val="0"/>
+              </a:spcAft>
+              <a:buNone/>
+            </a:pPr>
+            <a:endParaRPr/>
+          </a:p>
+        </p:txBody>
+      </p:sp>
+    </p:spTree>
+    <p:extLst>
+      <p:ext uri="{BB962C8B-B14F-4D97-AF65-F5344CB8AC3E}">
+        <p14:creationId xmlns:p14="http://schemas.microsoft.com/office/powerpoint/2010/main" val="3783233666"/>
+      </p:ext>
+    </p:extLst>
+  </p:cSld>
+  <p:clrMapOvr>
+    <a:masterClrMapping/>
+  </p:clrMapOvr>
+</p:notes>
+</file>
+
+<file path=ppt/notesSlides/notesSlide4.xml><?xml version="1.0" encoding="utf-8"?>
+<p:notes xmlns:a="http://schemas.openxmlformats.org/drawingml/2006/main" xmlns:r="http://schemas.openxmlformats.org/officeDocument/2006/relationships" xmlns:p="http://schemas.openxmlformats.org/presentationml/2006/main" showMasterSp="0" showMasterPhAnim="0">
+  <p:cSld>
+    <p:spTree>
+      <p:nvGrpSpPr>
+        <p:cNvPr id="1" name="Shape 77"/>
+        <p:cNvGrpSpPr/>
+        <p:nvPr/>
+      </p:nvGrpSpPr>
+      <p:grpSpPr>
+        <a:xfrm>
+          <a:off x="0" y="0"/>
+          <a:ext cx="0" cy="0"/>
+          <a:chOff x="0" y="0"/>
+          <a:chExt cx="0" cy="0"/>
+        </a:xfrm>
+      </p:grpSpPr>
+      <p:sp>
+        <p:nvSpPr>
+          <p:cNvPr id="78" name="Google Shape;78;g35f391192_09:notes"/>
+          <p:cNvSpPr>
+            <a:spLocks noGrp="1" noRot="1" noChangeAspect="1"/>
+          </p:cNvSpPr>
+          <p:nvPr>
+            <p:ph type="sldImg" idx="2"/>
+          </p:nvPr>
+        </p:nvSpPr>
+        <p:spPr>
+          <a:xfrm>
+            <a:off x="381000" y="685800"/>
+            <a:ext cx="6096000" cy="3429000"/>
+          </a:xfrm>
+          <a:custGeom>
+            <a:avLst/>
+            <a:gdLst/>
+            <a:ahLst/>
+            <a:cxnLst/>
+            <a:rect l="l" t="t" r="r" b="b"/>
+            <a:pathLst>
+              <a:path w="120000" h="120000" extrusionOk="0">
+                <a:moveTo>
+                  <a:pt x="0" y="0"/>
+                </a:moveTo>
+                <a:lnTo>
+                  <a:pt x="120000" y="0"/>
+                </a:lnTo>
+                <a:lnTo>
+                  <a:pt x="120000" y="120000"/>
+                </a:lnTo>
+                <a:lnTo>
+                  <a:pt x="0" y="120000"/>
+                </a:lnTo>
+                <a:close/>
+              </a:path>
+            </a:pathLst>
+          </a:custGeom>
+        </p:spPr>
+      </p:sp>
+      <p:sp>
+        <p:nvSpPr>
+          <p:cNvPr id="79" name="Google Shape;79;g35f391192_09:notes"/>
+          <p:cNvSpPr txBox="1">
+            <a:spLocks noGrp="1"/>
+          </p:cNvSpPr>
+          <p:nvPr>
+            <p:ph type="body" idx="1"/>
+          </p:nvPr>
+        </p:nvSpPr>
+        <p:spPr>
+          <a:xfrm>
+            <a:off x="685800" y="4343400"/>
+            <a:ext cx="5486400" cy="4114800"/>
+          </a:xfrm>
+          <a:prstGeom prst="rect">
+            <a:avLst/>
+          </a:prstGeom>
+        </p:spPr>
+        <p:txBody>
+          <a:bodyPr spcFirstLastPara="1" wrap="square" lIns="91425" tIns="91425" rIns="91425" bIns="91425" anchor="t" anchorCtr="0">
+            <a:noAutofit/>
+          </a:bodyPr>
+          <a:lstStyle/>
+          <a:p>
+            <a:pPr marL="0" lvl="0" indent="0" algn="l" rtl="0">
+              <a:spcBef>
+                <a:spcPts val="0"/>
+              </a:spcBef>
+              <a:spcAft>
+                <a:spcPts val="0"/>
+              </a:spcAft>
+              <a:buNone/>
+            </a:pPr>
+            <a:endParaRPr/>
+          </a:p>
+        </p:txBody>
+      </p:sp>
+    </p:spTree>
+    <p:extLst>
+      <p:ext uri="{BB962C8B-B14F-4D97-AF65-F5344CB8AC3E}">
+        <p14:creationId xmlns:p14="http://schemas.microsoft.com/office/powerpoint/2010/main" val="3538297406"/>
+      </p:ext>
+    </p:extLst>
+  </p:cSld>
+  <p:clrMapOvr>
+    <a:masterClrMapping/>
+  </p:clrMapOvr>
+</p:notes>
+</file>
+
+<file path=ppt/notesSlides/notesSlide5.xml><?xml version="1.0" encoding="utf-8"?>
+<p:notes xmlns:a="http://schemas.openxmlformats.org/drawingml/2006/main" xmlns:r="http://schemas.openxmlformats.org/officeDocument/2006/relationships" xmlns:p="http://schemas.openxmlformats.org/presentationml/2006/main" showMasterSp="0" showMasterPhAnim="0">
+  <p:cSld>
+    <p:spTree>
+      <p:nvGrpSpPr>
         <p:cNvPr id="1" name="Shape 274"/>
         <p:cNvGrpSpPr/>
         <p:nvPr/>
@@ -1663,6 +1994,959 @@
         </p:txBody>
       </p:sp>
     </p:spTree>
+  </p:cSld>
+  <p:clrMapOvr>
+    <a:masterClrMapping/>
+  </p:clrMapOvr>
+</p:sldLayout>
+</file>
+
+<file path=ppt/slideLayouts/slideLayout4.xml><?xml version="1.0" encoding="utf-8"?>
+<p:sldLayout xmlns:a="http://schemas.openxmlformats.org/drawingml/2006/main" xmlns:r="http://schemas.openxmlformats.org/officeDocument/2006/relationships" xmlns:p="http://schemas.openxmlformats.org/presentationml/2006/main" matchingName="Quote">
+  <p:cSld name="Quote">
+    <p:spTree>
+      <p:nvGrpSpPr>
+        <p:cNvPr id="1" name="Shape 17"/>
+        <p:cNvGrpSpPr/>
+        <p:nvPr/>
+      </p:nvGrpSpPr>
+      <p:grpSpPr>
+        <a:xfrm>
+          <a:off x="0" y="0"/>
+          <a:ext cx="0" cy="0"/>
+          <a:chOff x="0" y="0"/>
+          <a:chExt cx="0" cy="0"/>
+        </a:xfrm>
+      </p:grpSpPr>
+      <p:sp>
+        <p:nvSpPr>
+          <p:cNvPr id="18" name="Google Shape;18;p4"/>
+          <p:cNvSpPr/>
+          <p:nvPr/>
+        </p:nvSpPr>
+        <p:spPr>
+          <a:xfrm>
+            <a:off x="4136250" y="1321393"/>
+            <a:ext cx="871500" cy="868800"/>
+          </a:xfrm>
+          <a:prstGeom prst="ellipse">
+            <a:avLst/>
+          </a:prstGeom>
+          <a:solidFill>
+            <a:srgbClr val="EFEFEF"/>
+          </a:solidFill>
+          <a:ln>
+            <a:noFill/>
+          </a:ln>
+        </p:spPr>
+        <p:txBody>
+          <a:bodyPr spcFirstLastPara="1" wrap="square" lIns="91425" tIns="91425" rIns="91425" bIns="91425" anchor="ctr" anchorCtr="0">
+            <a:noAutofit/>
+          </a:bodyPr>
+          <a:lstStyle/>
+          <a:p>
+            <a:pPr marL="0" lvl="0" indent="0" algn="l" rtl="0">
+              <a:spcBef>
+                <a:spcPts val="0"/>
+              </a:spcBef>
+              <a:spcAft>
+                <a:spcPts val="0"/>
+              </a:spcAft>
+              <a:buNone/>
+            </a:pPr>
+            <a:endParaRPr/>
+          </a:p>
+        </p:txBody>
+      </p:sp>
+      <p:sp>
+        <p:nvSpPr>
+          <p:cNvPr id="19" name="Google Shape;19;p4"/>
+          <p:cNvSpPr txBox="1">
+            <a:spLocks noGrp="1"/>
+          </p:cNvSpPr>
+          <p:nvPr>
+            <p:ph type="body" idx="1"/>
+          </p:nvPr>
+        </p:nvSpPr>
+        <p:spPr>
+          <a:xfrm>
+            <a:off x="1659150" y="2161800"/>
+            <a:ext cx="5825700" cy="819900"/>
+          </a:xfrm>
+          <a:prstGeom prst="rect">
+            <a:avLst/>
+          </a:prstGeom>
+        </p:spPr>
+        <p:txBody>
+          <a:bodyPr spcFirstLastPara="1" wrap="square" lIns="91425" tIns="91425" rIns="91425" bIns="91425" anchor="t" anchorCtr="0">
+            <a:noAutofit/>
+          </a:bodyPr>
+          <a:lstStyle>
+            <a:lvl1pPr marL="457200" lvl="0" indent="-355600" algn="ctr" rtl="0">
+              <a:spcBef>
+                <a:spcPts val="600"/>
+              </a:spcBef>
+              <a:spcAft>
+                <a:spcPts val="0"/>
+              </a:spcAft>
+              <a:buSzPts val="2000"/>
+              <a:buChar char="▣"/>
+              <a:defRPr i="1"/>
+            </a:lvl1pPr>
+            <a:lvl2pPr marL="914400" lvl="1" indent="-355600" algn="ctr" rtl="0">
+              <a:spcBef>
+                <a:spcPts val="0"/>
+              </a:spcBef>
+              <a:spcAft>
+                <a:spcPts val="0"/>
+              </a:spcAft>
+              <a:buSzPts val="2000"/>
+              <a:buChar char="○"/>
+              <a:defRPr i="1"/>
+            </a:lvl2pPr>
+            <a:lvl3pPr marL="1371600" lvl="2" indent="-355600" algn="ctr" rtl="0">
+              <a:spcBef>
+                <a:spcPts val="0"/>
+              </a:spcBef>
+              <a:spcAft>
+                <a:spcPts val="0"/>
+              </a:spcAft>
+              <a:buSzPts val="2000"/>
+              <a:buChar char="■"/>
+              <a:defRPr i="1"/>
+            </a:lvl3pPr>
+            <a:lvl4pPr marL="1828800" lvl="3" indent="-355600" algn="ctr" rtl="0">
+              <a:spcBef>
+                <a:spcPts val="0"/>
+              </a:spcBef>
+              <a:spcAft>
+                <a:spcPts val="0"/>
+              </a:spcAft>
+              <a:buSzPts val="2000"/>
+              <a:buChar char="●"/>
+              <a:defRPr i="1"/>
+            </a:lvl4pPr>
+            <a:lvl5pPr marL="2286000" lvl="4" indent="-355600" algn="ctr" rtl="0">
+              <a:spcBef>
+                <a:spcPts val="0"/>
+              </a:spcBef>
+              <a:spcAft>
+                <a:spcPts val="0"/>
+              </a:spcAft>
+              <a:buSzPts val="2000"/>
+              <a:buChar char="○"/>
+              <a:defRPr i="1"/>
+            </a:lvl5pPr>
+            <a:lvl6pPr marL="2743200" lvl="5" indent="-355600" algn="ctr" rtl="0">
+              <a:spcBef>
+                <a:spcPts val="0"/>
+              </a:spcBef>
+              <a:spcAft>
+                <a:spcPts val="0"/>
+              </a:spcAft>
+              <a:buSzPts val="2000"/>
+              <a:buChar char="■"/>
+              <a:defRPr i="1"/>
+            </a:lvl6pPr>
+            <a:lvl7pPr marL="3200400" lvl="6" indent="-355600" algn="ctr" rtl="0">
+              <a:spcBef>
+                <a:spcPts val="0"/>
+              </a:spcBef>
+              <a:spcAft>
+                <a:spcPts val="0"/>
+              </a:spcAft>
+              <a:buSzPts val="2000"/>
+              <a:buChar char="●"/>
+              <a:defRPr i="1"/>
+            </a:lvl7pPr>
+            <a:lvl8pPr marL="3657600" lvl="7" indent="-355600" algn="ctr" rtl="0">
+              <a:spcBef>
+                <a:spcPts val="0"/>
+              </a:spcBef>
+              <a:spcAft>
+                <a:spcPts val="0"/>
+              </a:spcAft>
+              <a:buSzPts val="2000"/>
+              <a:buChar char="○"/>
+              <a:defRPr i="1"/>
+            </a:lvl8pPr>
+            <a:lvl9pPr marL="4114800" lvl="8" indent="-355600" algn="ctr">
+              <a:spcBef>
+                <a:spcPts val="0"/>
+              </a:spcBef>
+              <a:spcAft>
+                <a:spcPts val="0"/>
+              </a:spcAft>
+              <a:buSzPts val="2000"/>
+              <a:buChar char="■"/>
+              <a:defRPr i="1"/>
+            </a:lvl9pPr>
+          </a:lstStyle>
+          <a:p>
+            <a:endParaRPr/>
+          </a:p>
+        </p:txBody>
+      </p:sp>
+      <p:sp>
+        <p:nvSpPr>
+          <p:cNvPr id="20" name="Google Shape;20;p4"/>
+          <p:cNvSpPr txBox="1"/>
+          <p:nvPr/>
+        </p:nvSpPr>
+        <p:spPr>
+          <a:xfrm>
+            <a:off x="3593400" y="1391925"/>
+            <a:ext cx="1957200" cy="538200"/>
+          </a:xfrm>
+          <a:prstGeom prst="rect">
+            <a:avLst/>
+          </a:prstGeom>
+          <a:noFill/>
+          <a:ln>
+            <a:noFill/>
+          </a:ln>
+        </p:spPr>
+        <p:txBody>
+          <a:bodyPr spcFirstLastPara="1" wrap="square" lIns="91425" tIns="91425" rIns="91425" bIns="91425" anchor="t" anchorCtr="0">
+            <a:noAutofit/>
+          </a:bodyPr>
+          <a:lstStyle/>
+          <a:p>
+            <a:pPr marL="0" lvl="0" indent="0" algn="ctr" rtl="0">
+              <a:spcBef>
+                <a:spcPts val="0"/>
+              </a:spcBef>
+              <a:spcAft>
+                <a:spcPts val="0"/>
+              </a:spcAft>
+              <a:buNone/>
+            </a:pPr>
+            <a:r>
+              <a:rPr lang="en" sz="6000">
+                <a:solidFill>
+                  <a:srgbClr val="B7B7B7"/>
+                </a:solidFill>
+                <a:latin typeface="Playfair Display"/>
+                <a:ea typeface="Playfair Display"/>
+                <a:cs typeface="Playfair Display"/>
+                <a:sym typeface="Playfair Display"/>
+              </a:rPr>
+              <a:t>“</a:t>
+            </a:r>
+            <a:endParaRPr sz="6000">
+              <a:solidFill>
+                <a:srgbClr val="B7B7B7"/>
+              </a:solidFill>
+              <a:latin typeface="Playfair Display"/>
+              <a:ea typeface="Playfair Display"/>
+              <a:cs typeface="Playfair Display"/>
+              <a:sym typeface="Playfair Display"/>
+            </a:endParaRPr>
+          </a:p>
+        </p:txBody>
+      </p:sp>
+      <p:sp>
+        <p:nvSpPr>
+          <p:cNvPr id="21" name="Google Shape;21;p4"/>
+          <p:cNvSpPr txBox="1">
+            <a:spLocks noGrp="1"/>
+          </p:cNvSpPr>
+          <p:nvPr>
+            <p:ph type="sldNum" idx="12"/>
+          </p:nvPr>
+        </p:nvSpPr>
+        <p:spPr>
+          <a:xfrm>
+            <a:off x="4297650" y="4419838"/>
+            <a:ext cx="548700" cy="393600"/>
+          </a:xfrm>
+          <a:prstGeom prst="rect">
+            <a:avLst/>
+          </a:prstGeom>
+        </p:spPr>
+        <p:txBody>
+          <a:bodyPr spcFirstLastPara="1" wrap="square" lIns="91425" tIns="91425" rIns="91425" bIns="91425" anchor="b" anchorCtr="0">
+            <a:noAutofit/>
+          </a:bodyPr>
+          <a:lstStyle>
+            <a:lvl1pPr lvl="0">
+              <a:buNone/>
+              <a:defRPr/>
+            </a:lvl1pPr>
+            <a:lvl2pPr lvl="1">
+              <a:buNone/>
+              <a:defRPr/>
+            </a:lvl2pPr>
+            <a:lvl3pPr lvl="2">
+              <a:buNone/>
+              <a:defRPr/>
+            </a:lvl3pPr>
+            <a:lvl4pPr lvl="3">
+              <a:buNone/>
+              <a:defRPr/>
+            </a:lvl4pPr>
+            <a:lvl5pPr lvl="4">
+              <a:buNone/>
+              <a:defRPr/>
+            </a:lvl5pPr>
+            <a:lvl6pPr lvl="5">
+              <a:buNone/>
+              <a:defRPr/>
+            </a:lvl6pPr>
+            <a:lvl7pPr lvl="6">
+              <a:buNone/>
+              <a:defRPr/>
+            </a:lvl7pPr>
+            <a:lvl8pPr lvl="7">
+              <a:buNone/>
+              <a:defRPr/>
+            </a:lvl8pPr>
+            <a:lvl9pPr lvl="8">
+              <a:buNone/>
+              <a:defRPr/>
+            </a:lvl9pPr>
+          </a:lstStyle>
+          <a:p>
+            <a:pPr marL="0" lvl="0" indent="0" algn="ctr" rtl="0">
+              <a:spcBef>
+                <a:spcPts val="0"/>
+              </a:spcBef>
+              <a:spcAft>
+                <a:spcPts val="0"/>
+              </a:spcAft>
+              <a:buNone/>
+            </a:pPr>
+            <a:fld id="{00000000-1234-1234-1234-123412341234}" type="slidenum">
+              <a:rPr lang="en"/>
+              <a:t>‹#›</a:t>
+            </a:fld>
+            <a:endParaRPr/>
+          </a:p>
+        </p:txBody>
+      </p:sp>
+    </p:spTree>
+    <p:extLst>
+      <p:ext uri="{BB962C8B-B14F-4D97-AF65-F5344CB8AC3E}">
+        <p14:creationId xmlns:p14="http://schemas.microsoft.com/office/powerpoint/2010/main" val="2103749545"/>
+      </p:ext>
+    </p:extLst>
+  </p:cSld>
+  <p:clrMapOvr>
+    <a:masterClrMapping/>
+  </p:clrMapOvr>
+</p:sldLayout>
+</file>
+
+<file path=ppt/slideLayouts/slideLayout5.xml><?xml version="1.0" encoding="utf-8"?>
+<p:sldLayout xmlns:a="http://schemas.openxmlformats.org/drawingml/2006/main" xmlns:r="http://schemas.openxmlformats.org/officeDocument/2006/relationships" xmlns:p="http://schemas.openxmlformats.org/presentationml/2006/main" matchingName="Blank black">
+  <p:cSld name="Blank black">
+    <p:bg>
+      <p:bgPr>
+        <a:solidFill>
+          <a:srgbClr val="000000"/>
+        </a:solidFill>
+        <a:effectLst/>
+      </p:bgPr>
+    </p:bg>
+    <p:spTree>
+      <p:nvGrpSpPr>
+        <p:cNvPr id="1" name="Shape 45"/>
+        <p:cNvGrpSpPr/>
+        <p:nvPr/>
+      </p:nvGrpSpPr>
+      <p:grpSpPr>
+        <a:xfrm>
+          <a:off x="0" y="0"/>
+          <a:ext cx="0" cy="0"/>
+          <a:chOff x="0" y="0"/>
+          <a:chExt cx="0" cy="0"/>
+        </a:xfrm>
+      </p:grpSpPr>
+      <p:sp>
+        <p:nvSpPr>
+          <p:cNvPr id="46" name="Google Shape;46;p11"/>
+          <p:cNvSpPr txBox="1">
+            <a:spLocks noGrp="1"/>
+          </p:cNvSpPr>
+          <p:nvPr>
+            <p:ph type="sldNum" idx="12"/>
+          </p:nvPr>
+        </p:nvSpPr>
+        <p:spPr>
+          <a:xfrm>
+            <a:off x="4297650" y="4419838"/>
+            <a:ext cx="548700" cy="393600"/>
+          </a:xfrm>
+          <a:prstGeom prst="rect">
+            <a:avLst/>
+          </a:prstGeom>
+        </p:spPr>
+        <p:txBody>
+          <a:bodyPr spcFirstLastPara="1" wrap="square" lIns="91425" tIns="91425" rIns="91425" bIns="91425" anchor="b" anchorCtr="0">
+            <a:noAutofit/>
+          </a:bodyPr>
+          <a:lstStyle>
+            <a:lvl1pPr lvl="0" rtl="0">
+              <a:buNone/>
+              <a:defRPr/>
+            </a:lvl1pPr>
+            <a:lvl2pPr lvl="1" rtl="0">
+              <a:buNone/>
+              <a:defRPr/>
+            </a:lvl2pPr>
+            <a:lvl3pPr lvl="2" rtl="0">
+              <a:buNone/>
+              <a:defRPr/>
+            </a:lvl3pPr>
+            <a:lvl4pPr lvl="3" rtl="0">
+              <a:buNone/>
+              <a:defRPr/>
+            </a:lvl4pPr>
+            <a:lvl5pPr lvl="4" rtl="0">
+              <a:buNone/>
+              <a:defRPr/>
+            </a:lvl5pPr>
+            <a:lvl6pPr lvl="5" rtl="0">
+              <a:buNone/>
+              <a:defRPr/>
+            </a:lvl6pPr>
+            <a:lvl7pPr lvl="6" rtl="0">
+              <a:buNone/>
+              <a:defRPr/>
+            </a:lvl7pPr>
+            <a:lvl8pPr lvl="7" rtl="0">
+              <a:buNone/>
+              <a:defRPr/>
+            </a:lvl8pPr>
+            <a:lvl9pPr lvl="8" rtl="0">
+              <a:buNone/>
+              <a:defRPr/>
+            </a:lvl9pPr>
+          </a:lstStyle>
+          <a:p>
+            <a:pPr marL="0" lvl="0" indent="0" algn="ctr" rtl="0">
+              <a:spcBef>
+                <a:spcPts val="0"/>
+              </a:spcBef>
+              <a:spcAft>
+                <a:spcPts val="0"/>
+              </a:spcAft>
+              <a:buNone/>
+            </a:pPr>
+            <a:fld id="{00000000-1234-1234-1234-123412341234}" type="slidenum">
+              <a:rPr lang="en"/>
+              <a:t>‹#›</a:t>
+            </a:fld>
+            <a:endParaRPr/>
+          </a:p>
+        </p:txBody>
+      </p:sp>
+    </p:spTree>
+    <p:extLst>
+      <p:ext uri="{BB962C8B-B14F-4D97-AF65-F5344CB8AC3E}">
+        <p14:creationId xmlns:p14="http://schemas.microsoft.com/office/powerpoint/2010/main" val="272328088"/>
+      </p:ext>
+    </p:extLst>
+  </p:cSld>
+  <p:clrMapOvr>
+    <a:masterClrMapping/>
+  </p:clrMapOvr>
+</p:sldLayout>
+</file>
+
+<file path=ppt/slideLayouts/slideLayout6.xml><?xml version="1.0" encoding="utf-8"?>
+<p:sldLayout xmlns:a="http://schemas.openxmlformats.org/drawingml/2006/main" xmlns:r="http://schemas.openxmlformats.org/officeDocument/2006/relationships" xmlns:p="http://schemas.openxmlformats.org/presentationml/2006/main" matchingName="Title + 2 columns" type="twoColTx">
+  <p:cSld name="Title + 2 columns">
+    <p:spTree>
+      <p:nvGrpSpPr>
+        <p:cNvPr id="1" name="Shape 26"/>
+        <p:cNvGrpSpPr/>
+        <p:nvPr/>
+      </p:nvGrpSpPr>
+      <p:grpSpPr>
+        <a:xfrm>
+          <a:off x="0" y="0"/>
+          <a:ext cx="0" cy="0"/>
+          <a:chOff x="0" y="0"/>
+          <a:chExt cx="0" cy="0"/>
+        </a:xfrm>
+      </p:grpSpPr>
+      <p:sp>
+        <p:nvSpPr>
+          <p:cNvPr id="27" name="Google Shape;27;p6"/>
+          <p:cNvSpPr txBox="1">
+            <a:spLocks noGrp="1"/>
+          </p:cNvSpPr>
+          <p:nvPr>
+            <p:ph type="title"/>
+          </p:nvPr>
+        </p:nvSpPr>
+        <p:spPr>
+          <a:xfrm>
+            <a:off x="388955" y="338306"/>
+            <a:ext cx="8366100" cy="762600"/>
+          </a:xfrm>
+          <a:prstGeom prst="rect">
+            <a:avLst/>
+          </a:prstGeom>
+        </p:spPr>
+        <p:txBody>
+          <a:bodyPr spcFirstLastPara="1" wrap="square" lIns="91425" tIns="91425" rIns="91425" bIns="91425" anchor="ctr" anchorCtr="0">
+            <a:noAutofit/>
+          </a:bodyPr>
+          <a:lstStyle>
+            <a:lvl1pPr lvl="0">
+              <a:spcBef>
+                <a:spcPts val="0"/>
+              </a:spcBef>
+              <a:spcAft>
+                <a:spcPts val="0"/>
+              </a:spcAft>
+              <a:buSzPts val="1600"/>
+              <a:buNone/>
+              <a:defRPr>
+                <a:highlight>
+                  <a:srgbClr val="F3F3F3"/>
+                </a:highlight>
+              </a:defRPr>
+            </a:lvl1pPr>
+            <a:lvl2pPr lvl="1">
+              <a:spcBef>
+                <a:spcPts val="0"/>
+              </a:spcBef>
+              <a:spcAft>
+                <a:spcPts val="0"/>
+              </a:spcAft>
+              <a:buSzPts val="1600"/>
+              <a:buNone/>
+              <a:defRPr/>
+            </a:lvl2pPr>
+            <a:lvl3pPr lvl="2">
+              <a:spcBef>
+                <a:spcPts val="0"/>
+              </a:spcBef>
+              <a:spcAft>
+                <a:spcPts val="0"/>
+              </a:spcAft>
+              <a:buSzPts val="1600"/>
+              <a:buNone/>
+              <a:defRPr/>
+            </a:lvl3pPr>
+            <a:lvl4pPr lvl="3">
+              <a:spcBef>
+                <a:spcPts val="0"/>
+              </a:spcBef>
+              <a:spcAft>
+                <a:spcPts val="0"/>
+              </a:spcAft>
+              <a:buSzPts val="1600"/>
+              <a:buNone/>
+              <a:defRPr/>
+            </a:lvl4pPr>
+            <a:lvl5pPr lvl="4">
+              <a:spcBef>
+                <a:spcPts val="0"/>
+              </a:spcBef>
+              <a:spcAft>
+                <a:spcPts val="0"/>
+              </a:spcAft>
+              <a:buSzPts val="1600"/>
+              <a:buNone/>
+              <a:defRPr/>
+            </a:lvl5pPr>
+            <a:lvl6pPr lvl="5">
+              <a:spcBef>
+                <a:spcPts val="0"/>
+              </a:spcBef>
+              <a:spcAft>
+                <a:spcPts val="0"/>
+              </a:spcAft>
+              <a:buSzPts val="1600"/>
+              <a:buNone/>
+              <a:defRPr/>
+            </a:lvl6pPr>
+            <a:lvl7pPr lvl="6">
+              <a:spcBef>
+                <a:spcPts val="0"/>
+              </a:spcBef>
+              <a:spcAft>
+                <a:spcPts val="0"/>
+              </a:spcAft>
+              <a:buSzPts val="1600"/>
+              <a:buNone/>
+              <a:defRPr/>
+            </a:lvl7pPr>
+            <a:lvl8pPr lvl="7">
+              <a:spcBef>
+                <a:spcPts val="0"/>
+              </a:spcBef>
+              <a:spcAft>
+                <a:spcPts val="0"/>
+              </a:spcAft>
+              <a:buSzPts val="1600"/>
+              <a:buNone/>
+              <a:defRPr/>
+            </a:lvl8pPr>
+            <a:lvl9pPr lvl="8">
+              <a:spcBef>
+                <a:spcPts val="0"/>
+              </a:spcBef>
+              <a:spcAft>
+                <a:spcPts val="0"/>
+              </a:spcAft>
+              <a:buSzPts val="1600"/>
+              <a:buNone/>
+              <a:defRPr/>
+            </a:lvl9pPr>
+          </a:lstStyle>
+          <a:p>
+            <a:endParaRPr/>
+          </a:p>
+        </p:txBody>
+      </p:sp>
+      <p:sp>
+        <p:nvSpPr>
+          <p:cNvPr id="28" name="Google Shape;28;p6"/>
+          <p:cNvSpPr txBox="1">
+            <a:spLocks noGrp="1"/>
+          </p:cNvSpPr>
+          <p:nvPr>
+            <p:ph type="body" idx="1"/>
+          </p:nvPr>
+        </p:nvSpPr>
+        <p:spPr>
+          <a:xfrm>
+            <a:off x="970212" y="1200150"/>
+            <a:ext cx="3496500" cy="2945700"/>
+          </a:xfrm>
+          <a:prstGeom prst="rect">
+            <a:avLst/>
+          </a:prstGeom>
+        </p:spPr>
+        <p:txBody>
+          <a:bodyPr spcFirstLastPara="1" wrap="square" lIns="91425" tIns="91425" rIns="91425" bIns="91425" anchor="t" anchorCtr="0">
+            <a:noAutofit/>
+          </a:bodyPr>
+          <a:lstStyle>
+            <a:lvl1pPr marL="457200" lvl="0" indent="-342900">
+              <a:spcBef>
+                <a:spcPts val="600"/>
+              </a:spcBef>
+              <a:spcAft>
+                <a:spcPts val="0"/>
+              </a:spcAft>
+              <a:buSzPts val="1800"/>
+              <a:buChar char="▣"/>
+              <a:defRPr sz="1800"/>
+            </a:lvl1pPr>
+            <a:lvl2pPr marL="914400" lvl="1" indent="-342900">
+              <a:spcBef>
+                <a:spcPts val="0"/>
+              </a:spcBef>
+              <a:spcAft>
+                <a:spcPts val="0"/>
+              </a:spcAft>
+              <a:buSzPts val="1800"/>
+              <a:buChar char="○"/>
+              <a:defRPr sz="1800"/>
+            </a:lvl2pPr>
+            <a:lvl3pPr marL="1371600" lvl="2" indent="-342900">
+              <a:spcBef>
+                <a:spcPts val="0"/>
+              </a:spcBef>
+              <a:spcAft>
+                <a:spcPts val="0"/>
+              </a:spcAft>
+              <a:buSzPts val="1800"/>
+              <a:buChar char="■"/>
+              <a:defRPr sz="1800"/>
+            </a:lvl3pPr>
+            <a:lvl4pPr marL="1828800" lvl="3" indent="-342900">
+              <a:spcBef>
+                <a:spcPts val="0"/>
+              </a:spcBef>
+              <a:spcAft>
+                <a:spcPts val="0"/>
+              </a:spcAft>
+              <a:buSzPts val="1800"/>
+              <a:buChar char="●"/>
+              <a:defRPr sz="1800"/>
+            </a:lvl4pPr>
+            <a:lvl5pPr marL="2286000" lvl="4" indent="-342900">
+              <a:spcBef>
+                <a:spcPts val="0"/>
+              </a:spcBef>
+              <a:spcAft>
+                <a:spcPts val="0"/>
+              </a:spcAft>
+              <a:buSzPts val="1800"/>
+              <a:buChar char="○"/>
+              <a:defRPr sz="1800"/>
+            </a:lvl5pPr>
+            <a:lvl6pPr marL="2743200" lvl="5" indent="-342900">
+              <a:spcBef>
+                <a:spcPts val="0"/>
+              </a:spcBef>
+              <a:spcAft>
+                <a:spcPts val="0"/>
+              </a:spcAft>
+              <a:buSzPts val="1800"/>
+              <a:buChar char="■"/>
+              <a:defRPr sz="1800"/>
+            </a:lvl6pPr>
+            <a:lvl7pPr marL="3200400" lvl="6" indent="-342900">
+              <a:spcBef>
+                <a:spcPts val="0"/>
+              </a:spcBef>
+              <a:spcAft>
+                <a:spcPts val="0"/>
+              </a:spcAft>
+              <a:buSzPts val="1800"/>
+              <a:buChar char="●"/>
+              <a:defRPr sz="1800"/>
+            </a:lvl7pPr>
+            <a:lvl8pPr marL="3657600" lvl="7" indent="-342900">
+              <a:spcBef>
+                <a:spcPts val="0"/>
+              </a:spcBef>
+              <a:spcAft>
+                <a:spcPts val="0"/>
+              </a:spcAft>
+              <a:buSzPts val="1800"/>
+              <a:buChar char="○"/>
+              <a:defRPr sz="1800"/>
+            </a:lvl8pPr>
+            <a:lvl9pPr marL="4114800" lvl="8" indent="-342900">
+              <a:spcBef>
+                <a:spcPts val="0"/>
+              </a:spcBef>
+              <a:spcAft>
+                <a:spcPts val="0"/>
+              </a:spcAft>
+              <a:buSzPts val="1800"/>
+              <a:buChar char="■"/>
+              <a:defRPr sz="1800"/>
+            </a:lvl9pPr>
+          </a:lstStyle>
+          <a:p>
+            <a:endParaRPr/>
+          </a:p>
+        </p:txBody>
+      </p:sp>
+      <p:sp>
+        <p:nvSpPr>
+          <p:cNvPr id="29" name="Google Shape;29;p6"/>
+          <p:cNvSpPr txBox="1">
+            <a:spLocks noGrp="1"/>
+          </p:cNvSpPr>
+          <p:nvPr>
+            <p:ph type="body" idx="2"/>
+          </p:nvPr>
+        </p:nvSpPr>
+        <p:spPr>
+          <a:xfrm>
+            <a:off x="4677288" y="1200150"/>
+            <a:ext cx="3496500" cy="2945700"/>
+          </a:xfrm>
+          <a:prstGeom prst="rect">
+            <a:avLst/>
+          </a:prstGeom>
+        </p:spPr>
+        <p:txBody>
+          <a:bodyPr spcFirstLastPara="1" wrap="square" lIns="91425" tIns="91425" rIns="91425" bIns="91425" anchor="t" anchorCtr="0">
+            <a:noAutofit/>
+          </a:bodyPr>
+          <a:lstStyle>
+            <a:lvl1pPr marL="457200" lvl="0" indent="-342900">
+              <a:spcBef>
+                <a:spcPts val="600"/>
+              </a:spcBef>
+              <a:spcAft>
+                <a:spcPts val="0"/>
+              </a:spcAft>
+              <a:buSzPts val="1800"/>
+              <a:buChar char="▣"/>
+              <a:defRPr sz="1800"/>
+            </a:lvl1pPr>
+            <a:lvl2pPr marL="914400" lvl="1" indent="-342900">
+              <a:spcBef>
+                <a:spcPts val="0"/>
+              </a:spcBef>
+              <a:spcAft>
+                <a:spcPts val="0"/>
+              </a:spcAft>
+              <a:buSzPts val="1800"/>
+              <a:buChar char="○"/>
+              <a:defRPr sz="1800"/>
+            </a:lvl2pPr>
+            <a:lvl3pPr marL="1371600" lvl="2" indent="-342900">
+              <a:spcBef>
+                <a:spcPts val="0"/>
+              </a:spcBef>
+              <a:spcAft>
+                <a:spcPts val="0"/>
+              </a:spcAft>
+              <a:buSzPts val="1800"/>
+              <a:buChar char="■"/>
+              <a:defRPr sz="1800"/>
+            </a:lvl3pPr>
+            <a:lvl4pPr marL="1828800" lvl="3" indent="-342900">
+              <a:spcBef>
+                <a:spcPts val="0"/>
+              </a:spcBef>
+              <a:spcAft>
+                <a:spcPts val="0"/>
+              </a:spcAft>
+              <a:buSzPts val="1800"/>
+              <a:buChar char="●"/>
+              <a:defRPr sz="1800"/>
+            </a:lvl4pPr>
+            <a:lvl5pPr marL="2286000" lvl="4" indent="-342900">
+              <a:spcBef>
+                <a:spcPts val="0"/>
+              </a:spcBef>
+              <a:spcAft>
+                <a:spcPts val="0"/>
+              </a:spcAft>
+              <a:buSzPts val="1800"/>
+              <a:buChar char="○"/>
+              <a:defRPr sz="1800"/>
+            </a:lvl5pPr>
+            <a:lvl6pPr marL="2743200" lvl="5" indent="-342900">
+              <a:spcBef>
+                <a:spcPts val="0"/>
+              </a:spcBef>
+              <a:spcAft>
+                <a:spcPts val="0"/>
+              </a:spcAft>
+              <a:buSzPts val="1800"/>
+              <a:buChar char="■"/>
+              <a:defRPr sz="1800"/>
+            </a:lvl6pPr>
+            <a:lvl7pPr marL="3200400" lvl="6" indent="-342900">
+              <a:spcBef>
+                <a:spcPts val="0"/>
+              </a:spcBef>
+              <a:spcAft>
+                <a:spcPts val="0"/>
+              </a:spcAft>
+              <a:buSzPts val="1800"/>
+              <a:buChar char="●"/>
+              <a:defRPr sz="1800"/>
+            </a:lvl7pPr>
+            <a:lvl8pPr marL="3657600" lvl="7" indent="-342900">
+              <a:spcBef>
+                <a:spcPts val="0"/>
+              </a:spcBef>
+              <a:spcAft>
+                <a:spcPts val="0"/>
+              </a:spcAft>
+              <a:buSzPts val="1800"/>
+              <a:buChar char="○"/>
+              <a:defRPr sz="1800"/>
+            </a:lvl8pPr>
+            <a:lvl9pPr marL="4114800" lvl="8" indent="-342900">
+              <a:spcBef>
+                <a:spcPts val="0"/>
+              </a:spcBef>
+              <a:spcAft>
+                <a:spcPts val="0"/>
+              </a:spcAft>
+              <a:buSzPts val="1800"/>
+              <a:buChar char="■"/>
+              <a:defRPr sz="1800"/>
+            </a:lvl9pPr>
+          </a:lstStyle>
+          <a:p>
+            <a:endParaRPr/>
+          </a:p>
+        </p:txBody>
+      </p:sp>
+      <p:sp>
+        <p:nvSpPr>
+          <p:cNvPr id="30" name="Google Shape;30;p6"/>
+          <p:cNvSpPr txBox="1">
+            <a:spLocks noGrp="1"/>
+          </p:cNvSpPr>
+          <p:nvPr>
+            <p:ph type="sldNum" idx="12"/>
+          </p:nvPr>
+        </p:nvSpPr>
+        <p:spPr>
+          <a:xfrm>
+            <a:off x="4297650" y="4419838"/>
+            <a:ext cx="548700" cy="393600"/>
+          </a:xfrm>
+          <a:prstGeom prst="rect">
+            <a:avLst/>
+          </a:prstGeom>
+        </p:spPr>
+        <p:txBody>
+          <a:bodyPr spcFirstLastPara="1" wrap="square" lIns="91425" tIns="91425" rIns="91425" bIns="91425" anchor="b" anchorCtr="0">
+            <a:noAutofit/>
+          </a:bodyPr>
+          <a:lstStyle>
+            <a:lvl1pPr lvl="0" rtl="0">
+              <a:buNone/>
+              <a:defRPr/>
+            </a:lvl1pPr>
+            <a:lvl2pPr lvl="1" rtl="0">
+              <a:buNone/>
+              <a:defRPr/>
+            </a:lvl2pPr>
+            <a:lvl3pPr lvl="2" rtl="0">
+              <a:buNone/>
+              <a:defRPr/>
+            </a:lvl3pPr>
+            <a:lvl4pPr lvl="3" rtl="0">
+              <a:buNone/>
+              <a:defRPr/>
+            </a:lvl4pPr>
+            <a:lvl5pPr lvl="4" rtl="0">
+              <a:buNone/>
+              <a:defRPr/>
+            </a:lvl5pPr>
+            <a:lvl6pPr lvl="5" rtl="0">
+              <a:buNone/>
+              <a:defRPr/>
+            </a:lvl6pPr>
+            <a:lvl7pPr lvl="6" rtl="0">
+              <a:buNone/>
+              <a:defRPr/>
+            </a:lvl7pPr>
+            <a:lvl8pPr lvl="7" rtl="0">
+              <a:buNone/>
+              <a:defRPr/>
+            </a:lvl8pPr>
+            <a:lvl9pPr lvl="8" rtl="0">
+              <a:buNone/>
+              <a:defRPr/>
+            </a:lvl9pPr>
+          </a:lstStyle>
+          <a:p>
+            <a:pPr marL="0" lvl="0" indent="0" algn="ctr" rtl="0">
+              <a:spcBef>
+                <a:spcPts val="0"/>
+              </a:spcBef>
+              <a:spcAft>
+                <a:spcPts val="0"/>
+              </a:spcAft>
+              <a:buNone/>
+            </a:pPr>
+            <a:fld id="{00000000-1234-1234-1234-123412341234}" type="slidenum">
+              <a:rPr lang="en"/>
+              <a:t>‹#›</a:t>
+            </a:fld>
+            <a:endParaRPr/>
+          </a:p>
+        </p:txBody>
+      </p:sp>
+    </p:spTree>
+    <p:extLst>
+      <p:ext uri="{BB962C8B-B14F-4D97-AF65-F5344CB8AC3E}">
+        <p14:creationId xmlns:p14="http://schemas.microsoft.com/office/powerpoint/2010/main" val="1082107648"/>
+      </p:ext>
+    </p:extLst>
   </p:cSld>
   <p:clrMapOvr>
     <a:masterClrMapping/>
@@ -2427,6 +3711,9 @@
     <p:sldLayoutId id="2147483648" r:id="rId1"/>
     <p:sldLayoutId id="2147483649" r:id="rId2"/>
     <p:sldLayoutId id="2147483656" r:id="rId3"/>
+    <p:sldLayoutId id="2147483659" r:id="rId4"/>
+    <p:sldLayoutId id="2147483660" r:id="rId5"/>
+    <p:sldLayoutId id="2147483662" r:id="rId6"/>
   </p:sldLayoutIdLst>
   <p:hf hdr="0" ftr="0" dt="0"/>
   <p:txStyles>
@@ -3535,6 +4822,2467 @@
   <p:cSld>
     <p:spTree>
       <p:nvGrpSpPr>
+        <p:cNvPr id="1" name="Shape 93"/>
+        <p:cNvGrpSpPr/>
+        <p:nvPr/>
+      </p:nvGrpSpPr>
+      <p:grpSpPr>
+        <a:xfrm>
+          <a:off x="0" y="0"/>
+          <a:ext cx="0" cy="0"/>
+          <a:chOff x="0" y="0"/>
+          <a:chExt cx="0" cy="0"/>
+        </a:xfrm>
+      </p:grpSpPr>
+      <p:sp>
+        <p:nvSpPr>
+          <p:cNvPr id="94" name="Google Shape;94;p18"/>
+          <p:cNvSpPr txBox="1">
+            <a:spLocks noGrp="1"/>
+          </p:cNvSpPr>
+          <p:nvPr>
+            <p:ph type="ctrTitle" idx="4294967295"/>
+          </p:nvPr>
+        </p:nvSpPr>
+        <p:spPr>
+          <a:xfrm>
+            <a:off x="1620900" y="2199075"/>
+            <a:ext cx="5902200" cy="1159800"/>
+          </a:xfrm>
+          <a:prstGeom prst="rect">
+            <a:avLst/>
+          </a:prstGeom>
+        </p:spPr>
+        <p:txBody>
+          <a:bodyPr spcFirstLastPara="1" wrap="square" lIns="91425" tIns="91425" rIns="91425" bIns="91425" anchor="ctr" anchorCtr="0">
+            <a:noAutofit/>
+          </a:bodyPr>
+          <a:lstStyle/>
+          <a:p>
+            <a:pPr marL="0" lvl="0" indent="0" algn="ctr" rtl="0">
+              <a:spcBef>
+                <a:spcPts val="0"/>
+              </a:spcBef>
+              <a:spcAft>
+                <a:spcPts val="0"/>
+              </a:spcAft>
+              <a:buNone/>
+            </a:pPr>
+            <a:r>
+              <a:rPr lang="en" sz="6000" i="1" dirty="0">
+                <a:solidFill>
+                  <a:srgbClr val="FFFFFF"/>
+                </a:solidFill>
+              </a:rPr>
+              <a:t>Better Games</a:t>
+            </a:r>
+            <a:endParaRPr sz="6000" i="1" dirty="0">
+              <a:solidFill>
+                <a:srgbClr val="FFFFFF"/>
+              </a:solidFill>
+            </a:endParaRPr>
+          </a:p>
+        </p:txBody>
+      </p:sp>
+      <p:sp>
+        <p:nvSpPr>
+          <p:cNvPr id="95" name="Google Shape;95;p18"/>
+          <p:cNvSpPr txBox="1">
+            <a:spLocks noGrp="1"/>
+          </p:cNvSpPr>
+          <p:nvPr>
+            <p:ph type="subTitle" idx="4294967295"/>
+          </p:nvPr>
+        </p:nvSpPr>
+        <p:spPr>
+          <a:xfrm>
+            <a:off x="1620900" y="3284340"/>
+            <a:ext cx="5902200" cy="784800"/>
+          </a:xfrm>
+          <a:prstGeom prst="rect">
+            <a:avLst/>
+          </a:prstGeom>
+        </p:spPr>
+        <p:txBody>
+          <a:bodyPr spcFirstLastPara="1" wrap="square" lIns="91425" tIns="91425" rIns="91425" bIns="91425" anchor="t" anchorCtr="0">
+            <a:noAutofit/>
+          </a:bodyPr>
+          <a:lstStyle/>
+          <a:p>
+            <a:pPr marL="0" lvl="0" indent="0" algn="ctr">
+              <a:buNone/>
+            </a:pPr>
+            <a:r>
+              <a:rPr lang="en" dirty="0">
+                <a:solidFill>
+                  <a:srgbClr val="FFFFFF"/>
+                </a:solidFill>
+              </a:rPr>
+              <a:t>We work at an online game company that wants to improve the </a:t>
+            </a:r>
+            <a:r>
+              <a:rPr lang="en-US" dirty="0">
+                <a:solidFill>
+                  <a:srgbClr val="FFFFFF"/>
+                </a:solidFill>
+              </a:rPr>
+              <a:t>yatzy experience.</a:t>
+            </a:r>
+          </a:p>
+          <a:p>
+            <a:pPr marL="0" lvl="0" indent="0" algn="ctr">
+              <a:buNone/>
+            </a:pPr>
+            <a:r>
+              <a:rPr lang="en-US" dirty="0">
+                <a:solidFill>
+                  <a:srgbClr val="FFFFFF"/>
+                </a:solidFill>
+              </a:rPr>
+              <a:t>Our product owner </a:t>
+            </a:r>
+            <a:r>
+              <a:rPr lang="en-US" b="1" dirty="0">
+                <a:solidFill>
+                  <a:srgbClr val="FFFFFF"/>
+                </a:solidFill>
+              </a:rPr>
+              <a:t>‘has a few ideas’ </a:t>
+            </a:r>
+            <a:r>
+              <a:rPr lang="en-US" dirty="0">
+                <a:solidFill>
+                  <a:srgbClr val="FFFFFF"/>
+                </a:solidFill>
+              </a:rPr>
+              <a:t>and we want to make the code flexible to try things out</a:t>
+            </a:r>
+          </a:p>
+          <a:p>
+            <a:pPr marL="0" lvl="0" indent="0" algn="ctr">
+              <a:buNone/>
+            </a:pPr>
+            <a:endParaRPr dirty="0">
+              <a:solidFill>
+                <a:srgbClr val="FFFFFF"/>
+              </a:solidFill>
+            </a:endParaRPr>
+          </a:p>
+        </p:txBody>
+      </p:sp>
+      <p:sp>
+        <p:nvSpPr>
+          <p:cNvPr id="96" name="Google Shape;96;p18"/>
+          <p:cNvSpPr/>
+          <p:nvPr/>
+        </p:nvSpPr>
+        <p:spPr>
+          <a:xfrm>
+            <a:off x="3935896" y="922408"/>
+            <a:ext cx="1272208" cy="1273222"/>
+          </a:xfrm>
+          <a:prstGeom prst="ellipse">
+            <a:avLst/>
+          </a:prstGeom>
+          <a:solidFill>
+            <a:srgbClr val="FFFFFF"/>
+          </a:solidFill>
+          <a:ln>
+            <a:noFill/>
+          </a:ln>
+        </p:spPr>
+        <p:txBody>
+          <a:bodyPr spcFirstLastPara="1" wrap="square" lIns="91425" tIns="91425" rIns="91425" bIns="91425" anchor="ctr" anchorCtr="0">
+            <a:noAutofit/>
+          </a:bodyPr>
+          <a:lstStyle/>
+          <a:p>
+            <a:pPr marL="0" lvl="0" indent="0" algn="l" rtl="0">
+              <a:spcBef>
+                <a:spcPts val="0"/>
+              </a:spcBef>
+              <a:spcAft>
+                <a:spcPts val="0"/>
+              </a:spcAft>
+              <a:buNone/>
+            </a:pPr>
+            <a:endParaRPr/>
+          </a:p>
+        </p:txBody>
+      </p:sp>
+      <p:sp>
+        <p:nvSpPr>
+          <p:cNvPr id="13" name="Google Shape;390;p37">
+            <a:extLst>
+              <a:ext uri="{FF2B5EF4-FFF2-40B4-BE49-F238E27FC236}">
+                <a16:creationId xmlns:a16="http://schemas.microsoft.com/office/drawing/2014/main" id="{BF657C25-24DB-D44A-9D1C-8CD51D24D7D6}"/>
+              </a:ext>
+            </a:extLst>
+          </p:cNvPr>
+          <p:cNvSpPr/>
+          <p:nvPr/>
+        </p:nvSpPr>
+        <p:spPr>
+          <a:xfrm>
+            <a:off x="4112094" y="1099113"/>
+            <a:ext cx="919812" cy="919812"/>
+          </a:xfrm>
+          <a:custGeom>
+            <a:avLst/>
+            <a:gdLst/>
+            <a:ahLst/>
+            <a:cxnLst/>
+            <a:rect l="l" t="t" r="r" b="b"/>
+            <a:pathLst>
+              <a:path w="16027" h="16027" fill="none" extrusionOk="0">
+                <a:moveTo>
+                  <a:pt x="14029" y="4019"/>
+                </a:moveTo>
+                <a:lnTo>
+                  <a:pt x="14029" y="4019"/>
+                </a:lnTo>
+                <a:lnTo>
+                  <a:pt x="14200" y="3849"/>
+                </a:lnTo>
+                <a:lnTo>
+                  <a:pt x="14395" y="3752"/>
+                </a:lnTo>
+                <a:lnTo>
+                  <a:pt x="14614" y="3678"/>
+                </a:lnTo>
+                <a:lnTo>
+                  <a:pt x="14809" y="3630"/>
+                </a:lnTo>
+                <a:lnTo>
+                  <a:pt x="15028" y="3581"/>
+                </a:lnTo>
+                <a:lnTo>
+                  <a:pt x="15247" y="3484"/>
+                </a:lnTo>
+                <a:lnTo>
+                  <a:pt x="15442" y="3362"/>
+                </a:lnTo>
+                <a:lnTo>
+                  <a:pt x="15661" y="3191"/>
+                </a:lnTo>
+                <a:lnTo>
+                  <a:pt x="15661" y="3191"/>
+                </a:lnTo>
+                <a:lnTo>
+                  <a:pt x="15832" y="2997"/>
+                </a:lnTo>
+                <a:lnTo>
+                  <a:pt x="15929" y="2777"/>
+                </a:lnTo>
+                <a:lnTo>
+                  <a:pt x="16002" y="2534"/>
+                </a:lnTo>
+                <a:lnTo>
+                  <a:pt x="16026" y="2266"/>
+                </a:lnTo>
+                <a:lnTo>
+                  <a:pt x="16026" y="2266"/>
+                </a:lnTo>
+                <a:lnTo>
+                  <a:pt x="16002" y="2047"/>
+                </a:lnTo>
+                <a:lnTo>
+                  <a:pt x="15978" y="1827"/>
+                </a:lnTo>
+                <a:lnTo>
+                  <a:pt x="15905" y="1633"/>
+                </a:lnTo>
+                <a:lnTo>
+                  <a:pt x="15807" y="1413"/>
+                </a:lnTo>
+                <a:lnTo>
+                  <a:pt x="15710" y="1243"/>
+                </a:lnTo>
+                <a:lnTo>
+                  <a:pt x="15588" y="1048"/>
+                </a:lnTo>
+                <a:lnTo>
+                  <a:pt x="15466" y="878"/>
+                </a:lnTo>
+                <a:lnTo>
+                  <a:pt x="15320" y="707"/>
+                </a:lnTo>
+                <a:lnTo>
+                  <a:pt x="15320" y="707"/>
+                </a:lnTo>
+                <a:lnTo>
+                  <a:pt x="15150" y="561"/>
+                </a:lnTo>
+                <a:lnTo>
+                  <a:pt x="14979" y="439"/>
+                </a:lnTo>
+                <a:lnTo>
+                  <a:pt x="14784" y="317"/>
+                </a:lnTo>
+                <a:lnTo>
+                  <a:pt x="14590" y="196"/>
+                </a:lnTo>
+                <a:lnTo>
+                  <a:pt x="14395" y="123"/>
+                </a:lnTo>
+                <a:lnTo>
+                  <a:pt x="14175" y="50"/>
+                </a:lnTo>
+                <a:lnTo>
+                  <a:pt x="13981" y="25"/>
+                </a:lnTo>
+                <a:lnTo>
+                  <a:pt x="13761" y="1"/>
+                </a:lnTo>
+                <a:lnTo>
+                  <a:pt x="13761" y="1"/>
+                </a:lnTo>
+                <a:lnTo>
+                  <a:pt x="13494" y="25"/>
+                </a:lnTo>
+                <a:lnTo>
+                  <a:pt x="13250" y="98"/>
+                </a:lnTo>
+                <a:lnTo>
+                  <a:pt x="13031" y="196"/>
+                </a:lnTo>
+                <a:lnTo>
+                  <a:pt x="12836" y="366"/>
+                </a:lnTo>
+                <a:lnTo>
+                  <a:pt x="12836" y="366"/>
+                </a:lnTo>
+                <a:lnTo>
+                  <a:pt x="12665" y="561"/>
+                </a:lnTo>
+                <a:lnTo>
+                  <a:pt x="12544" y="780"/>
+                </a:lnTo>
+                <a:lnTo>
+                  <a:pt x="12471" y="975"/>
+                </a:lnTo>
+                <a:lnTo>
+                  <a:pt x="12422" y="1194"/>
+                </a:lnTo>
+                <a:lnTo>
+                  <a:pt x="12349" y="1413"/>
+                </a:lnTo>
+                <a:lnTo>
+                  <a:pt x="12276" y="1608"/>
+                </a:lnTo>
+                <a:lnTo>
+                  <a:pt x="12178" y="1827"/>
+                </a:lnTo>
+                <a:lnTo>
+                  <a:pt x="12008" y="1998"/>
+                </a:lnTo>
+                <a:lnTo>
+                  <a:pt x="12008" y="1998"/>
+                </a:lnTo>
+                <a:lnTo>
+                  <a:pt x="11740" y="2266"/>
+                </a:lnTo>
+                <a:lnTo>
+                  <a:pt x="11496" y="2436"/>
+                </a:lnTo>
+                <a:lnTo>
+                  <a:pt x="11277" y="2534"/>
+                </a:lnTo>
+                <a:lnTo>
+                  <a:pt x="11082" y="2582"/>
+                </a:lnTo>
+                <a:lnTo>
+                  <a:pt x="10888" y="2582"/>
+                </a:lnTo>
+                <a:lnTo>
+                  <a:pt x="10717" y="2534"/>
+                </a:lnTo>
+                <a:lnTo>
+                  <a:pt x="10547" y="2412"/>
+                </a:lnTo>
+                <a:lnTo>
+                  <a:pt x="10376" y="2290"/>
+                </a:lnTo>
+                <a:lnTo>
+                  <a:pt x="10206" y="2095"/>
+                </a:lnTo>
+                <a:lnTo>
+                  <a:pt x="10035" y="1901"/>
+                </a:lnTo>
+                <a:lnTo>
+                  <a:pt x="9670" y="1413"/>
+                </a:lnTo>
+                <a:lnTo>
+                  <a:pt x="9231" y="878"/>
+                </a:lnTo>
+                <a:lnTo>
+                  <a:pt x="8988" y="585"/>
+                </a:lnTo>
+                <a:lnTo>
+                  <a:pt x="8720" y="293"/>
+                </a:lnTo>
+                <a:lnTo>
+                  <a:pt x="8720" y="293"/>
+                </a:lnTo>
+                <a:lnTo>
+                  <a:pt x="8574" y="171"/>
+                </a:lnTo>
+                <a:lnTo>
+                  <a:pt x="8379" y="74"/>
+                </a:lnTo>
+                <a:lnTo>
+                  <a:pt x="8209" y="25"/>
+                </a:lnTo>
+                <a:lnTo>
+                  <a:pt x="8014" y="1"/>
+                </a:lnTo>
+                <a:lnTo>
+                  <a:pt x="8014" y="1"/>
+                </a:lnTo>
+                <a:lnTo>
+                  <a:pt x="7916" y="25"/>
+                </a:lnTo>
+                <a:lnTo>
+                  <a:pt x="7770" y="98"/>
+                </a:lnTo>
+                <a:lnTo>
+                  <a:pt x="7307" y="366"/>
+                </a:lnTo>
+                <a:lnTo>
+                  <a:pt x="7039" y="537"/>
+                </a:lnTo>
+                <a:lnTo>
+                  <a:pt x="6747" y="756"/>
+                </a:lnTo>
+                <a:lnTo>
+                  <a:pt x="6431" y="975"/>
+                </a:lnTo>
+                <a:lnTo>
+                  <a:pt x="6138" y="1243"/>
+                </a:lnTo>
+                <a:lnTo>
+                  <a:pt x="5870" y="1511"/>
+                </a:lnTo>
+                <a:lnTo>
+                  <a:pt x="5627" y="1803"/>
+                </a:lnTo>
+                <a:lnTo>
+                  <a:pt x="5432" y="2095"/>
+                </a:lnTo>
+                <a:lnTo>
+                  <a:pt x="5359" y="2242"/>
+                </a:lnTo>
+                <a:lnTo>
+                  <a:pt x="5310" y="2412"/>
+                </a:lnTo>
+                <a:lnTo>
+                  <a:pt x="5262" y="2558"/>
+                </a:lnTo>
+                <a:lnTo>
+                  <a:pt x="5237" y="2704"/>
+                </a:lnTo>
+                <a:lnTo>
+                  <a:pt x="5237" y="2850"/>
+                </a:lnTo>
+                <a:lnTo>
+                  <a:pt x="5262" y="3021"/>
+                </a:lnTo>
+                <a:lnTo>
+                  <a:pt x="5310" y="3167"/>
+                </a:lnTo>
+                <a:lnTo>
+                  <a:pt x="5383" y="3313"/>
+                </a:lnTo>
+                <a:lnTo>
+                  <a:pt x="5481" y="3459"/>
+                </a:lnTo>
+                <a:lnTo>
+                  <a:pt x="5603" y="3605"/>
+                </a:lnTo>
+                <a:lnTo>
+                  <a:pt x="5603" y="3605"/>
+                </a:lnTo>
+                <a:lnTo>
+                  <a:pt x="5797" y="3752"/>
+                </a:lnTo>
+                <a:lnTo>
+                  <a:pt x="5992" y="3849"/>
+                </a:lnTo>
+                <a:lnTo>
+                  <a:pt x="6187" y="3946"/>
+                </a:lnTo>
+                <a:lnTo>
+                  <a:pt x="6406" y="3995"/>
+                </a:lnTo>
+                <a:lnTo>
+                  <a:pt x="6625" y="4044"/>
+                </a:lnTo>
+                <a:lnTo>
+                  <a:pt x="6845" y="4141"/>
+                </a:lnTo>
+                <a:lnTo>
+                  <a:pt x="7039" y="4239"/>
+                </a:lnTo>
+                <a:lnTo>
+                  <a:pt x="7234" y="4409"/>
+                </a:lnTo>
+                <a:lnTo>
+                  <a:pt x="7234" y="4409"/>
+                </a:lnTo>
+                <a:lnTo>
+                  <a:pt x="7405" y="4604"/>
+                </a:lnTo>
+                <a:lnTo>
+                  <a:pt x="7502" y="4823"/>
+                </a:lnTo>
+                <a:lnTo>
+                  <a:pt x="7575" y="5067"/>
+                </a:lnTo>
+                <a:lnTo>
+                  <a:pt x="7600" y="5359"/>
+                </a:lnTo>
+                <a:lnTo>
+                  <a:pt x="7600" y="5359"/>
+                </a:lnTo>
+                <a:lnTo>
+                  <a:pt x="7575" y="5554"/>
+                </a:lnTo>
+                <a:lnTo>
+                  <a:pt x="7551" y="5773"/>
+                </a:lnTo>
+                <a:lnTo>
+                  <a:pt x="7478" y="5968"/>
+                </a:lnTo>
+                <a:lnTo>
+                  <a:pt x="7405" y="6163"/>
+                </a:lnTo>
+                <a:lnTo>
+                  <a:pt x="7307" y="6357"/>
+                </a:lnTo>
+                <a:lnTo>
+                  <a:pt x="7186" y="6552"/>
+                </a:lnTo>
+                <a:lnTo>
+                  <a:pt x="7039" y="6723"/>
+                </a:lnTo>
+                <a:lnTo>
+                  <a:pt x="6893" y="6893"/>
+                </a:lnTo>
+                <a:lnTo>
+                  <a:pt x="6893" y="6893"/>
+                </a:lnTo>
+                <a:lnTo>
+                  <a:pt x="6723" y="7039"/>
+                </a:lnTo>
+                <a:lnTo>
+                  <a:pt x="6552" y="7186"/>
+                </a:lnTo>
+                <a:lnTo>
+                  <a:pt x="6382" y="7283"/>
+                </a:lnTo>
+                <a:lnTo>
+                  <a:pt x="6187" y="7405"/>
+                </a:lnTo>
+                <a:lnTo>
+                  <a:pt x="5992" y="7478"/>
+                </a:lnTo>
+                <a:lnTo>
+                  <a:pt x="5773" y="7551"/>
+                </a:lnTo>
+                <a:lnTo>
+                  <a:pt x="5554" y="7575"/>
+                </a:lnTo>
+                <a:lnTo>
+                  <a:pt x="5359" y="7600"/>
+                </a:lnTo>
+                <a:lnTo>
+                  <a:pt x="5359" y="7600"/>
+                </a:lnTo>
+                <a:lnTo>
+                  <a:pt x="5091" y="7575"/>
+                </a:lnTo>
+                <a:lnTo>
+                  <a:pt x="4848" y="7502"/>
+                </a:lnTo>
+                <a:lnTo>
+                  <a:pt x="4604" y="7405"/>
+                </a:lnTo>
+                <a:lnTo>
+                  <a:pt x="4409" y="7234"/>
+                </a:lnTo>
+                <a:lnTo>
+                  <a:pt x="4409" y="7234"/>
+                </a:lnTo>
+                <a:lnTo>
+                  <a:pt x="4239" y="7039"/>
+                </a:lnTo>
+                <a:lnTo>
+                  <a:pt x="4117" y="6820"/>
+                </a:lnTo>
+                <a:lnTo>
+                  <a:pt x="4044" y="6601"/>
+                </a:lnTo>
+                <a:lnTo>
+                  <a:pt x="3971" y="6382"/>
+                </a:lnTo>
+                <a:lnTo>
+                  <a:pt x="3922" y="6187"/>
+                </a:lnTo>
+                <a:lnTo>
+                  <a:pt x="3849" y="5992"/>
+                </a:lnTo>
+                <a:lnTo>
+                  <a:pt x="3752" y="5797"/>
+                </a:lnTo>
+                <a:lnTo>
+                  <a:pt x="3605" y="5602"/>
+                </a:lnTo>
+                <a:lnTo>
+                  <a:pt x="3605" y="5602"/>
+                </a:lnTo>
+                <a:lnTo>
+                  <a:pt x="3459" y="5481"/>
+                </a:lnTo>
+                <a:lnTo>
+                  <a:pt x="3313" y="5383"/>
+                </a:lnTo>
+                <a:lnTo>
+                  <a:pt x="3167" y="5310"/>
+                </a:lnTo>
+                <a:lnTo>
+                  <a:pt x="3021" y="5262"/>
+                </a:lnTo>
+                <a:lnTo>
+                  <a:pt x="2850" y="5237"/>
+                </a:lnTo>
+                <a:lnTo>
+                  <a:pt x="2704" y="5237"/>
+                </a:lnTo>
+                <a:lnTo>
+                  <a:pt x="2558" y="5262"/>
+                </a:lnTo>
+                <a:lnTo>
+                  <a:pt x="2412" y="5310"/>
+                </a:lnTo>
+                <a:lnTo>
+                  <a:pt x="2242" y="5359"/>
+                </a:lnTo>
+                <a:lnTo>
+                  <a:pt x="2095" y="5432"/>
+                </a:lnTo>
+                <a:lnTo>
+                  <a:pt x="1803" y="5627"/>
+                </a:lnTo>
+                <a:lnTo>
+                  <a:pt x="1511" y="5870"/>
+                </a:lnTo>
+                <a:lnTo>
+                  <a:pt x="1243" y="6138"/>
+                </a:lnTo>
+                <a:lnTo>
+                  <a:pt x="975" y="6431"/>
+                </a:lnTo>
+                <a:lnTo>
+                  <a:pt x="756" y="6747"/>
+                </a:lnTo>
+                <a:lnTo>
+                  <a:pt x="537" y="7039"/>
+                </a:lnTo>
+                <a:lnTo>
+                  <a:pt x="366" y="7307"/>
+                </a:lnTo>
+                <a:lnTo>
+                  <a:pt x="98" y="7770"/>
+                </a:lnTo>
+                <a:lnTo>
+                  <a:pt x="25" y="7916"/>
+                </a:lnTo>
+                <a:lnTo>
+                  <a:pt x="1" y="8014"/>
+                </a:lnTo>
+                <a:lnTo>
+                  <a:pt x="1" y="8014"/>
+                </a:lnTo>
+                <a:lnTo>
+                  <a:pt x="25" y="8208"/>
+                </a:lnTo>
+                <a:lnTo>
+                  <a:pt x="74" y="8379"/>
+                </a:lnTo>
+                <a:lnTo>
+                  <a:pt x="171" y="8574"/>
+                </a:lnTo>
+                <a:lnTo>
+                  <a:pt x="293" y="8720"/>
+                </a:lnTo>
+                <a:lnTo>
+                  <a:pt x="293" y="8720"/>
+                </a:lnTo>
+                <a:lnTo>
+                  <a:pt x="585" y="8988"/>
+                </a:lnTo>
+                <a:lnTo>
+                  <a:pt x="878" y="9231"/>
+                </a:lnTo>
+                <a:lnTo>
+                  <a:pt x="1413" y="9670"/>
+                </a:lnTo>
+                <a:lnTo>
+                  <a:pt x="1901" y="10035"/>
+                </a:lnTo>
+                <a:lnTo>
+                  <a:pt x="2095" y="10206"/>
+                </a:lnTo>
+                <a:lnTo>
+                  <a:pt x="2290" y="10376"/>
+                </a:lnTo>
+                <a:lnTo>
+                  <a:pt x="2412" y="10547"/>
+                </a:lnTo>
+                <a:lnTo>
+                  <a:pt x="2534" y="10717"/>
+                </a:lnTo>
+                <a:lnTo>
+                  <a:pt x="2583" y="10888"/>
+                </a:lnTo>
+                <a:lnTo>
+                  <a:pt x="2583" y="11082"/>
+                </a:lnTo>
+                <a:lnTo>
+                  <a:pt x="2534" y="11277"/>
+                </a:lnTo>
+                <a:lnTo>
+                  <a:pt x="2436" y="11496"/>
+                </a:lnTo>
+                <a:lnTo>
+                  <a:pt x="2266" y="11740"/>
+                </a:lnTo>
+                <a:lnTo>
+                  <a:pt x="1998" y="12008"/>
+                </a:lnTo>
+                <a:lnTo>
+                  <a:pt x="1998" y="12008"/>
+                </a:lnTo>
+                <a:lnTo>
+                  <a:pt x="1828" y="12178"/>
+                </a:lnTo>
+                <a:lnTo>
+                  <a:pt x="1633" y="12276"/>
+                </a:lnTo>
+                <a:lnTo>
+                  <a:pt x="1413" y="12349"/>
+                </a:lnTo>
+                <a:lnTo>
+                  <a:pt x="1219" y="12398"/>
+                </a:lnTo>
+                <a:lnTo>
+                  <a:pt x="999" y="12446"/>
+                </a:lnTo>
+                <a:lnTo>
+                  <a:pt x="780" y="12544"/>
+                </a:lnTo>
+                <a:lnTo>
+                  <a:pt x="585" y="12665"/>
+                </a:lnTo>
+                <a:lnTo>
+                  <a:pt x="366" y="12836"/>
+                </a:lnTo>
+                <a:lnTo>
+                  <a:pt x="366" y="12836"/>
+                </a:lnTo>
+                <a:lnTo>
+                  <a:pt x="196" y="13031"/>
+                </a:lnTo>
+                <a:lnTo>
+                  <a:pt x="98" y="13250"/>
+                </a:lnTo>
+                <a:lnTo>
+                  <a:pt x="25" y="13493"/>
+                </a:lnTo>
+                <a:lnTo>
+                  <a:pt x="1" y="13761"/>
+                </a:lnTo>
+                <a:lnTo>
+                  <a:pt x="1" y="13761"/>
+                </a:lnTo>
+                <a:lnTo>
+                  <a:pt x="25" y="13981"/>
+                </a:lnTo>
+                <a:lnTo>
+                  <a:pt x="50" y="14200"/>
+                </a:lnTo>
+                <a:lnTo>
+                  <a:pt x="123" y="14395"/>
+                </a:lnTo>
+                <a:lnTo>
+                  <a:pt x="220" y="14614"/>
+                </a:lnTo>
+                <a:lnTo>
+                  <a:pt x="318" y="14784"/>
+                </a:lnTo>
+                <a:lnTo>
+                  <a:pt x="439" y="14979"/>
+                </a:lnTo>
+                <a:lnTo>
+                  <a:pt x="561" y="15150"/>
+                </a:lnTo>
+                <a:lnTo>
+                  <a:pt x="707" y="15320"/>
+                </a:lnTo>
+                <a:lnTo>
+                  <a:pt x="707" y="15320"/>
+                </a:lnTo>
+                <a:lnTo>
+                  <a:pt x="878" y="15466"/>
+                </a:lnTo>
+                <a:lnTo>
+                  <a:pt x="1048" y="15588"/>
+                </a:lnTo>
+                <a:lnTo>
+                  <a:pt x="1243" y="15710"/>
+                </a:lnTo>
+                <a:lnTo>
+                  <a:pt x="1438" y="15832"/>
+                </a:lnTo>
+                <a:lnTo>
+                  <a:pt x="1633" y="15905"/>
+                </a:lnTo>
+                <a:lnTo>
+                  <a:pt x="1852" y="15978"/>
+                </a:lnTo>
+                <a:lnTo>
+                  <a:pt x="2047" y="16002"/>
+                </a:lnTo>
+                <a:lnTo>
+                  <a:pt x="2266" y="16026"/>
+                </a:lnTo>
+                <a:lnTo>
+                  <a:pt x="2266" y="16026"/>
+                </a:lnTo>
+                <a:lnTo>
+                  <a:pt x="2534" y="16002"/>
+                </a:lnTo>
+                <a:lnTo>
+                  <a:pt x="2777" y="15929"/>
+                </a:lnTo>
+                <a:lnTo>
+                  <a:pt x="2997" y="15832"/>
+                </a:lnTo>
+                <a:lnTo>
+                  <a:pt x="3191" y="15661"/>
+                </a:lnTo>
+                <a:lnTo>
+                  <a:pt x="3191" y="15661"/>
+                </a:lnTo>
+                <a:lnTo>
+                  <a:pt x="3362" y="15466"/>
+                </a:lnTo>
+                <a:lnTo>
+                  <a:pt x="3484" y="15247"/>
+                </a:lnTo>
+                <a:lnTo>
+                  <a:pt x="3557" y="15052"/>
+                </a:lnTo>
+                <a:lnTo>
+                  <a:pt x="3605" y="14833"/>
+                </a:lnTo>
+                <a:lnTo>
+                  <a:pt x="3679" y="14614"/>
+                </a:lnTo>
+                <a:lnTo>
+                  <a:pt x="3752" y="14419"/>
+                </a:lnTo>
+                <a:lnTo>
+                  <a:pt x="3849" y="14200"/>
+                </a:lnTo>
+                <a:lnTo>
+                  <a:pt x="4019" y="14029"/>
+                </a:lnTo>
+                <a:lnTo>
+                  <a:pt x="4019" y="14029"/>
+                </a:lnTo>
+                <a:lnTo>
+                  <a:pt x="4287" y="13786"/>
+                </a:lnTo>
+                <a:lnTo>
+                  <a:pt x="4531" y="13591"/>
+                </a:lnTo>
+                <a:lnTo>
+                  <a:pt x="4750" y="13493"/>
+                </a:lnTo>
+                <a:lnTo>
+                  <a:pt x="4945" y="13445"/>
+                </a:lnTo>
+                <a:lnTo>
+                  <a:pt x="5140" y="13445"/>
+                </a:lnTo>
+                <a:lnTo>
+                  <a:pt x="5310" y="13493"/>
+                </a:lnTo>
+                <a:lnTo>
+                  <a:pt x="5481" y="13615"/>
+                </a:lnTo>
+                <a:lnTo>
+                  <a:pt x="5651" y="13737"/>
+                </a:lnTo>
+                <a:lnTo>
+                  <a:pt x="5822" y="13932"/>
+                </a:lnTo>
+                <a:lnTo>
+                  <a:pt x="5992" y="14127"/>
+                </a:lnTo>
+                <a:lnTo>
+                  <a:pt x="6358" y="14614"/>
+                </a:lnTo>
+                <a:lnTo>
+                  <a:pt x="6796" y="15150"/>
+                </a:lnTo>
+                <a:lnTo>
+                  <a:pt x="7039" y="15442"/>
+                </a:lnTo>
+                <a:lnTo>
+                  <a:pt x="7307" y="15734"/>
+                </a:lnTo>
+                <a:lnTo>
+                  <a:pt x="7307" y="15734"/>
+                </a:lnTo>
+                <a:lnTo>
+                  <a:pt x="7454" y="15856"/>
+                </a:lnTo>
+                <a:lnTo>
+                  <a:pt x="7648" y="15953"/>
+                </a:lnTo>
+                <a:lnTo>
+                  <a:pt x="7819" y="16002"/>
+                </a:lnTo>
+                <a:lnTo>
+                  <a:pt x="8014" y="16026"/>
+                </a:lnTo>
+                <a:lnTo>
+                  <a:pt x="8014" y="16026"/>
+                </a:lnTo>
+                <a:lnTo>
+                  <a:pt x="8111" y="16002"/>
+                </a:lnTo>
+                <a:lnTo>
+                  <a:pt x="8257" y="15929"/>
+                </a:lnTo>
+                <a:lnTo>
+                  <a:pt x="8720" y="15661"/>
+                </a:lnTo>
+                <a:lnTo>
+                  <a:pt x="8988" y="15491"/>
+                </a:lnTo>
+                <a:lnTo>
+                  <a:pt x="9280" y="15271"/>
+                </a:lnTo>
+                <a:lnTo>
+                  <a:pt x="9597" y="15052"/>
+                </a:lnTo>
+                <a:lnTo>
+                  <a:pt x="9889" y="14784"/>
+                </a:lnTo>
+                <a:lnTo>
+                  <a:pt x="10157" y="14516"/>
+                </a:lnTo>
+                <a:lnTo>
+                  <a:pt x="10400" y="14224"/>
+                </a:lnTo>
+                <a:lnTo>
+                  <a:pt x="10595" y="13932"/>
+                </a:lnTo>
+                <a:lnTo>
+                  <a:pt x="10668" y="13786"/>
+                </a:lnTo>
+                <a:lnTo>
+                  <a:pt x="10717" y="13615"/>
+                </a:lnTo>
+                <a:lnTo>
+                  <a:pt x="10766" y="13469"/>
+                </a:lnTo>
+                <a:lnTo>
+                  <a:pt x="10790" y="13323"/>
+                </a:lnTo>
+                <a:lnTo>
+                  <a:pt x="10790" y="13177"/>
+                </a:lnTo>
+                <a:lnTo>
+                  <a:pt x="10766" y="13006"/>
+                </a:lnTo>
+                <a:lnTo>
+                  <a:pt x="10717" y="12860"/>
+                </a:lnTo>
+                <a:lnTo>
+                  <a:pt x="10644" y="12714"/>
+                </a:lnTo>
+                <a:lnTo>
+                  <a:pt x="10547" y="12568"/>
+                </a:lnTo>
+                <a:lnTo>
+                  <a:pt x="10425" y="12422"/>
+                </a:lnTo>
+                <a:lnTo>
+                  <a:pt x="10425" y="12422"/>
+                </a:lnTo>
+                <a:lnTo>
+                  <a:pt x="10230" y="12276"/>
+                </a:lnTo>
+                <a:lnTo>
+                  <a:pt x="10035" y="12178"/>
+                </a:lnTo>
+                <a:lnTo>
+                  <a:pt x="9840" y="12105"/>
+                </a:lnTo>
+                <a:lnTo>
+                  <a:pt x="9621" y="12032"/>
+                </a:lnTo>
+                <a:lnTo>
+                  <a:pt x="9402" y="11983"/>
+                </a:lnTo>
+                <a:lnTo>
+                  <a:pt x="9183" y="11886"/>
+                </a:lnTo>
+                <a:lnTo>
+                  <a:pt x="8988" y="11789"/>
+                </a:lnTo>
+                <a:lnTo>
+                  <a:pt x="8793" y="11618"/>
+                </a:lnTo>
+                <a:lnTo>
+                  <a:pt x="8793" y="11618"/>
+                </a:lnTo>
+                <a:lnTo>
+                  <a:pt x="8623" y="11423"/>
+                </a:lnTo>
+                <a:lnTo>
+                  <a:pt x="8525" y="11204"/>
+                </a:lnTo>
+                <a:lnTo>
+                  <a:pt x="8452" y="10961"/>
+                </a:lnTo>
+                <a:lnTo>
+                  <a:pt x="8428" y="10668"/>
+                </a:lnTo>
+                <a:lnTo>
+                  <a:pt x="8428" y="10668"/>
+                </a:lnTo>
+                <a:lnTo>
+                  <a:pt x="8452" y="10473"/>
+                </a:lnTo>
+                <a:lnTo>
+                  <a:pt x="8476" y="10254"/>
+                </a:lnTo>
+                <a:lnTo>
+                  <a:pt x="8549" y="10059"/>
+                </a:lnTo>
+                <a:lnTo>
+                  <a:pt x="8623" y="9865"/>
+                </a:lnTo>
+                <a:lnTo>
+                  <a:pt x="8720" y="9670"/>
+                </a:lnTo>
+                <a:lnTo>
+                  <a:pt x="8842" y="9475"/>
+                </a:lnTo>
+                <a:lnTo>
+                  <a:pt x="8988" y="9304"/>
+                </a:lnTo>
+                <a:lnTo>
+                  <a:pt x="9134" y="9134"/>
+                </a:lnTo>
+                <a:lnTo>
+                  <a:pt x="9134" y="9134"/>
+                </a:lnTo>
+                <a:lnTo>
+                  <a:pt x="9304" y="8988"/>
+                </a:lnTo>
+                <a:lnTo>
+                  <a:pt x="9475" y="8866"/>
+                </a:lnTo>
+                <a:lnTo>
+                  <a:pt x="9645" y="8744"/>
+                </a:lnTo>
+                <a:lnTo>
+                  <a:pt x="9840" y="8622"/>
+                </a:lnTo>
+                <a:lnTo>
+                  <a:pt x="10035" y="8549"/>
+                </a:lnTo>
+                <a:lnTo>
+                  <a:pt x="10254" y="8476"/>
+                </a:lnTo>
+                <a:lnTo>
+                  <a:pt x="10474" y="8452"/>
+                </a:lnTo>
+                <a:lnTo>
+                  <a:pt x="10668" y="8428"/>
+                </a:lnTo>
+                <a:lnTo>
+                  <a:pt x="10668" y="8428"/>
+                </a:lnTo>
+                <a:lnTo>
+                  <a:pt x="10936" y="8452"/>
+                </a:lnTo>
+                <a:lnTo>
+                  <a:pt x="11180" y="8525"/>
+                </a:lnTo>
+                <a:lnTo>
+                  <a:pt x="11423" y="8622"/>
+                </a:lnTo>
+                <a:lnTo>
+                  <a:pt x="11618" y="8793"/>
+                </a:lnTo>
+                <a:lnTo>
+                  <a:pt x="11618" y="8793"/>
+                </a:lnTo>
+                <a:lnTo>
+                  <a:pt x="11789" y="8988"/>
+                </a:lnTo>
+                <a:lnTo>
+                  <a:pt x="11910" y="9207"/>
+                </a:lnTo>
+                <a:lnTo>
+                  <a:pt x="11984" y="9426"/>
+                </a:lnTo>
+                <a:lnTo>
+                  <a:pt x="12057" y="9645"/>
+                </a:lnTo>
+                <a:lnTo>
+                  <a:pt x="12105" y="9840"/>
+                </a:lnTo>
+                <a:lnTo>
+                  <a:pt x="12178" y="10035"/>
+                </a:lnTo>
+                <a:lnTo>
+                  <a:pt x="12276" y="10230"/>
+                </a:lnTo>
+                <a:lnTo>
+                  <a:pt x="12422" y="10425"/>
+                </a:lnTo>
+                <a:lnTo>
+                  <a:pt x="12422" y="10425"/>
+                </a:lnTo>
+                <a:lnTo>
+                  <a:pt x="12568" y="10547"/>
+                </a:lnTo>
+                <a:lnTo>
+                  <a:pt x="12714" y="10644"/>
+                </a:lnTo>
+                <a:lnTo>
+                  <a:pt x="12860" y="10717"/>
+                </a:lnTo>
+                <a:lnTo>
+                  <a:pt x="13006" y="10766"/>
+                </a:lnTo>
+                <a:lnTo>
+                  <a:pt x="13177" y="10790"/>
+                </a:lnTo>
+                <a:lnTo>
+                  <a:pt x="13323" y="10790"/>
+                </a:lnTo>
+                <a:lnTo>
+                  <a:pt x="13469" y="10766"/>
+                </a:lnTo>
+                <a:lnTo>
+                  <a:pt x="13615" y="10717"/>
+                </a:lnTo>
+                <a:lnTo>
+                  <a:pt x="13786" y="10668"/>
+                </a:lnTo>
+                <a:lnTo>
+                  <a:pt x="13932" y="10595"/>
+                </a:lnTo>
+                <a:lnTo>
+                  <a:pt x="14224" y="10400"/>
+                </a:lnTo>
+                <a:lnTo>
+                  <a:pt x="14516" y="10157"/>
+                </a:lnTo>
+                <a:lnTo>
+                  <a:pt x="14784" y="9889"/>
+                </a:lnTo>
+                <a:lnTo>
+                  <a:pt x="15052" y="9597"/>
+                </a:lnTo>
+                <a:lnTo>
+                  <a:pt x="15271" y="9280"/>
+                </a:lnTo>
+                <a:lnTo>
+                  <a:pt x="15491" y="8988"/>
+                </a:lnTo>
+                <a:lnTo>
+                  <a:pt x="15661" y="8720"/>
+                </a:lnTo>
+                <a:lnTo>
+                  <a:pt x="15929" y="8257"/>
+                </a:lnTo>
+                <a:lnTo>
+                  <a:pt x="16002" y="8111"/>
+                </a:lnTo>
+                <a:lnTo>
+                  <a:pt x="16026" y="8014"/>
+                </a:lnTo>
+                <a:lnTo>
+                  <a:pt x="16026" y="8014"/>
+                </a:lnTo>
+                <a:lnTo>
+                  <a:pt x="16002" y="7819"/>
+                </a:lnTo>
+                <a:lnTo>
+                  <a:pt x="15953" y="7648"/>
+                </a:lnTo>
+                <a:lnTo>
+                  <a:pt x="15856" y="7453"/>
+                </a:lnTo>
+                <a:lnTo>
+                  <a:pt x="15734" y="7307"/>
+                </a:lnTo>
+                <a:lnTo>
+                  <a:pt x="15734" y="7307"/>
+                </a:lnTo>
+                <a:lnTo>
+                  <a:pt x="15442" y="7039"/>
+                </a:lnTo>
+                <a:lnTo>
+                  <a:pt x="15150" y="6796"/>
+                </a:lnTo>
+                <a:lnTo>
+                  <a:pt x="14614" y="6357"/>
+                </a:lnTo>
+                <a:lnTo>
+                  <a:pt x="14127" y="5992"/>
+                </a:lnTo>
+                <a:lnTo>
+                  <a:pt x="13932" y="5822"/>
+                </a:lnTo>
+                <a:lnTo>
+                  <a:pt x="13737" y="5651"/>
+                </a:lnTo>
+                <a:lnTo>
+                  <a:pt x="13615" y="5481"/>
+                </a:lnTo>
+                <a:lnTo>
+                  <a:pt x="13494" y="5310"/>
+                </a:lnTo>
+                <a:lnTo>
+                  <a:pt x="13445" y="5140"/>
+                </a:lnTo>
+                <a:lnTo>
+                  <a:pt x="13445" y="4945"/>
+                </a:lnTo>
+                <a:lnTo>
+                  <a:pt x="13494" y="4750"/>
+                </a:lnTo>
+                <a:lnTo>
+                  <a:pt x="13591" y="4531"/>
+                </a:lnTo>
+                <a:lnTo>
+                  <a:pt x="13761" y="4287"/>
+                </a:lnTo>
+                <a:lnTo>
+                  <a:pt x="14029" y="4019"/>
+                </a:lnTo>
+                <a:lnTo>
+                  <a:pt x="14029" y="4019"/>
+                </a:lnTo>
+                <a:close/>
+              </a:path>
+            </a:pathLst>
+          </a:custGeom>
+          <a:noFill/>
+          <a:ln w="12175" cap="rnd" cmpd="sng">
+            <a:solidFill>
+              <a:schemeClr val="accent1"/>
+            </a:solidFill>
+            <a:prstDash val="solid"/>
+            <a:round/>
+            <a:headEnd type="none" w="sm" len="sm"/>
+            <a:tailEnd type="none" w="sm" len="sm"/>
+          </a:ln>
+        </p:spPr>
+        <p:txBody>
+          <a:bodyPr spcFirstLastPara="1" wrap="square" lIns="91425" tIns="91425" rIns="91425" bIns="91425" anchor="ctr" anchorCtr="0">
+            <a:noAutofit/>
+          </a:bodyPr>
+          <a:lstStyle/>
+          <a:p>
+            <a:pPr marL="0" lvl="0" indent="0" algn="l" rtl="0">
+              <a:spcBef>
+                <a:spcPts val="0"/>
+              </a:spcBef>
+              <a:spcAft>
+                <a:spcPts val="0"/>
+              </a:spcAft>
+              <a:buNone/>
+            </a:pPr>
+            <a:endParaRPr/>
+          </a:p>
+        </p:txBody>
+      </p:sp>
+    </p:spTree>
+    <p:extLst>
+      <p:ext uri="{BB962C8B-B14F-4D97-AF65-F5344CB8AC3E}">
+        <p14:creationId xmlns:p14="http://schemas.microsoft.com/office/powerpoint/2010/main" val="3491490913"/>
+      </p:ext>
+    </p:extLst>
+  </p:cSld>
+  <p:clrMapOvr>
+    <a:masterClrMapping/>
+  </p:clrMapOvr>
+</p:sld>
+</file>
+
+<file path=ppt/slides/slide3.xml><?xml version="1.0" encoding="utf-8"?>
+<p:sld xmlns:a="http://schemas.openxmlformats.org/drawingml/2006/main" xmlns:r="http://schemas.openxmlformats.org/officeDocument/2006/relationships" xmlns:p="http://schemas.openxmlformats.org/presentationml/2006/main">
+  <p:cSld>
+    <p:spTree>
+      <p:nvGrpSpPr>
+        <p:cNvPr id="1" name="Shape 108"/>
+        <p:cNvGrpSpPr/>
+        <p:nvPr/>
+      </p:nvGrpSpPr>
+      <p:grpSpPr>
+        <a:xfrm>
+          <a:off x="0" y="0"/>
+          <a:ext cx="0" cy="0"/>
+          <a:chOff x="0" y="0"/>
+          <a:chExt cx="0" cy="0"/>
+        </a:xfrm>
+      </p:grpSpPr>
+      <p:sp>
+        <p:nvSpPr>
+          <p:cNvPr id="111" name="Google Shape;111;p19"/>
+          <p:cNvSpPr txBox="1">
+            <a:spLocks noGrp="1"/>
+          </p:cNvSpPr>
+          <p:nvPr>
+            <p:ph type="body" idx="2"/>
+          </p:nvPr>
+        </p:nvSpPr>
+        <p:spPr>
+          <a:xfrm>
+            <a:off x="4677289" y="1733383"/>
+            <a:ext cx="3496500" cy="1953000"/>
+          </a:xfrm>
+          <a:prstGeom prst="rect">
+            <a:avLst/>
+          </a:prstGeom>
+        </p:spPr>
+        <p:txBody>
+          <a:bodyPr spcFirstLastPara="1" wrap="square" lIns="91425" tIns="91425" rIns="91425" bIns="91425" anchor="t" anchorCtr="0">
+            <a:noAutofit/>
+          </a:bodyPr>
+          <a:lstStyle/>
+          <a:p>
+            <a:pPr marL="0" lvl="0" indent="0" algn="ctr" rtl="0">
+              <a:spcBef>
+                <a:spcPts val="600"/>
+              </a:spcBef>
+              <a:spcAft>
+                <a:spcPts val="0"/>
+              </a:spcAft>
+              <a:buNone/>
+            </a:pPr>
+            <a:r>
+              <a:rPr lang="en" sz="2400" b="1" i="1" dirty="0">
+                <a:latin typeface="Playfair Display"/>
+                <a:ea typeface="Playfair Display"/>
+                <a:cs typeface="Playfair Display"/>
+                <a:sym typeface="Playfair Display"/>
+              </a:rPr>
+              <a:t>Change</a:t>
+            </a:r>
+            <a:endParaRPr b="1" dirty="0"/>
+          </a:p>
+          <a:p>
+            <a:pPr marL="0" lvl="0" indent="0" algn="ctr" rtl="0">
+              <a:spcBef>
+                <a:spcPts val="600"/>
+              </a:spcBef>
+              <a:spcAft>
+                <a:spcPts val="0"/>
+              </a:spcAft>
+              <a:buNone/>
+            </a:pPr>
+            <a:endParaRPr lang="en" b="1" dirty="0"/>
+          </a:p>
+          <a:p>
+            <a:pPr marL="0" lvl="0" indent="0" algn="ctr" rtl="0">
+              <a:spcBef>
+                <a:spcPts val="600"/>
+              </a:spcBef>
+              <a:spcAft>
+                <a:spcPts val="0"/>
+              </a:spcAft>
+              <a:buNone/>
+            </a:pPr>
+            <a:r>
+              <a:rPr lang="en" dirty="0"/>
+              <a:t>Change how you use code</a:t>
+            </a:r>
+          </a:p>
+          <a:p>
+            <a:pPr marL="0" lvl="0" indent="0" algn="ctr" rtl="0">
+              <a:spcBef>
+                <a:spcPts val="600"/>
+              </a:spcBef>
+              <a:spcAft>
+                <a:spcPts val="0"/>
+              </a:spcAft>
+              <a:buNone/>
+            </a:pPr>
+            <a:endParaRPr lang="en" dirty="0"/>
+          </a:p>
+          <a:p>
+            <a:pPr marL="0" lvl="0" indent="0" algn="ctr" rtl="0">
+              <a:spcBef>
+                <a:spcPts val="600"/>
+              </a:spcBef>
+              <a:spcAft>
+                <a:spcPts val="0"/>
+              </a:spcAft>
+              <a:buNone/>
+            </a:pPr>
+            <a:r>
+              <a:rPr lang="en" dirty="0"/>
+              <a:t>Change what the code does</a:t>
+            </a:r>
+          </a:p>
+        </p:txBody>
+      </p:sp>
+      <p:sp>
+        <p:nvSpPr>
+          <p:cNvPr id="112" name="Google Shape;112;p19"/>
+          <p:cNvSpPr txBox="1">
+            <a:spLocks noGrp="1"/>
+          </p:cNvSpPr>
+          <p:nvPr>
+            <p:ph type="sldNum" idx="12"/>
+          </p:nvPr>
+        </p:nvSpPr>
+        <p:spPr>
+          <a:xfrm>
+            <a:off x="4297650" y="4419838"/>
+            <a:ext cx="548700" cy="393600"/>
+          </a:xfrm>
+          <a:prstGeom prst="rect">
+            <a:avLst/>
+          </a:prstGeom>
+        </p:spPr>
+        <p:txBody>
+          <a:bodyPr spcFirstLastPara="1" wrap="square" lIns="91425" tIns="91425" rIns="91425" bIns="91425" anchor="b" anchorCtr="0">
+            <a:noAutofit/>
+          </a:bodyPr>
+          <a:lstStyle/>
+          <a:p>
+            <a:pPr marL="0" lvl="0" indent="0" algn="ctr" rtl="0">
+              <a:spcBef>
+                <a:spcPts val="0"/>
+              </a:spcBef>
+              <a:spcAft>
+                <a:spcPts val="0"/>
+              </a:spcAft>
+              <a:buNone/>
+            </a:pPr>
+            <a:fld id="{00000000-1234-1234-1234-123412341234}" type="slidenum">
+              <a:rPr lang="en"/>
+              <a:t>3</a:t>
+            </a:fld>
+            <a:endParaRPr/>
+          </a:p>
+        </p:txBody>
+      </p:sp>
+      <p:sp>
+        <p:nvSpPr>
+          <p:cNvPr id="110" name="Google Shape;110;p19"/>
+          <p:cNvSpPr txBox="1">
+            <a:spLocks noGrp="1"/>
+          </p:cNvSpPr>
+          <p:nvPr>
+            <p:ph type="title"/>
+          </p:nvPr>
+        </p:nvSpPr>
+        <p:spPr>
+          <a:xfrm>
+            <a:off x="388955" y="338306"/>
+            <a:ext cx="8366100" cy="762600"/>
+          </a:xfrm>
+          <a:prstGeom prst="rect">
+            <a:avLst/>
+          </a:prstGeom>
+        </p:spPr>
+        <p:txBody>
+          <a:bodyPr spcFirstLastPara="1" wrap="square" lIns="91425" tIns="91425" rIns="91425" bIns="91425" anchor="ctr" anchorCtr="0">
+            <a:noAutofit/>
+          </a:bodyPr>
+          <a:lstStyle/>
+          <a:p>
+            <a:pPr lvl="0"/>
+            <a:r>
+              <a:rPr lang="en" dirty="0"/>
+              <a:t>Why we Refactor?</a:t>
+            </a:r>
+            <a:endParaRPr dirty="0"/>
+          </a:p>
+        </p:txBody>
+      </p:sp>
+      <p:sp>
+        <p:nvSpPr>
+          <p:cNvPr id="109" name="Google Shape;109;p19"/>
+          <p:cNvSpPr txBox="1">
+            <a:spLocks noGrp="1"/>
+          </p:cNvSpPr>
+          <p:nvPr>
+            <p:ph type="body" idx="1"/>
+          </p:nvPr>
+        </p:nvSpPr>
+        <p:spPr>
+          <a:xfrm>
+            <a:off x="801150" y="1733383"/>
+            <a:ext cx="3496500" cy="1953000"/>
+          </a:xfrm>
+          <a:prstGeom prst="rect">
+            <a:avLst/>
+          </a:prstGeom>
+        </p:spPr>
+        <p:txBody>
+          <a:bodyPr spcFirstLastPara="1" wrap="square" lIns="91425" tIns="91425" rIns="91425" bIns="91425" anchor="t" anchorCtr="0">
+            <a:noAutofit/>
+          </a:bodyPr>
+          <a:lstStyle/>
+          <a:p>
+            <a:pPr marL="0" lvl="0" indent="0" algn="ctr" rtl="0">
+              <a:spcBef>
+                <a:spcPts val="600"/>
+              </a:spcBef>
+              <a:spcAft>
+                <a:spcPts val="0"/>
+              </a:spcAft>
+              <a:buNone/>
+            </a:pPr>
+            <a:r>
+              <a:rPr lang="en" sz="2400" b="1" i="1" dirty="0">
+                <a:latin typeface="Playfair Display"/>
+                <a:ea typeface="Playfair Display"/>
+                <a:cs typeface="Playfair Display"/>
+                <a:sym typeface="Playfair Display"/>
+              </a:rPr>
+              <a:t>Insights</a:t>
+            </a:r>
+            <a:endParaRPr sz="2400" b="1" i="1" dirty="0">
+              <a:latin typeface="Playfair Display"/>
+              <a:ea typeface="Playfair Display"/>
+              <a:cs typeface="Playfair Display"/>
+              <a:sym typeface="Playfair Display"/>
+            </a:endParaRPr>
+          </a:p>
+          <a:p>
+            <a:pPr marL="0" lvl="0" indent="0" algn="ctr" rtl="0">
+              <a:spcBef>
+                <a:spcPts val="600"/>
+              </a:spcBef>
+              <a:spcAft>
+                <a:spcPts val="0"/>
+              </a:spcAft>
+              <a:buNone/>
+            </a:pPr>
+            <a:endParaRPr lang="en" dirty="0"/>
+          </a:p>
+          <a:p>
+            <a:pPr marL="0" lvl="0" indent="0" algn="ctr" rtl="0">
+              <a:spcBef>
+                <a:spcPts val="600"/>
+              </a:spcBef>
+              <a:spcAft>
+                <a:spcPts val="0"/>
+              </a:spcAft>
+              <a:buNone/>
+            </a:pPr>
+            <a:r>
+              <a:rPr lang="en" dirty="0"/>
+              <a:t>Gain an insight</a:t>
+            </a:r>
+          </a:p>
+          <a:p>
+            <a:pPr marL="0" lvl="0" indent="0" algn="ctr" rtl="0">
+              <a:spcBef>
+                <a:spcPts val="600"/>
+              </a:spcBef>
+              <a:spcAft>
+                <a:spcPts val="0"/>
+              </a:spcAft>
+              <a:buNone/>
+            </a:pPr>
+            <a:endParaRPr lang="en" dirty="0"/>
+          </a:p>
+          <a:p>
+            <a:pPr marL="0" lvl="0" indent="0" algn="ctr" rtl="0">
+              <a:spcBef>
+                <a:spcPts val="600"/>
+              </a:spcBef>
+              <a:spcAft>
+                <a:spcPts val="0"/>
+              </a:spcAft>
+              <a:buNone/>
+            </a:pPr>
+            <a:r>
+              <a:rPr lang="en" dirty="0"/>
+              <a:t>Record an insight</a:t>
+            </a:r>
+            <a:endParaRPr dirty="0"/>
+          </a:p>
+        </p:txBody>
+      </p:sp>
+      <p:cxnSp>
+        <p:nvCxnSpPr>
+          <p:cNvPr id="3" name="Straight Connector 2">
+            <a:extLst>
+              <a:ext uri="{FF2B5EF4-FFF2-40B4-BE49-F238E27FC236}">
+                <a16:creationId xmlns:a16="http://schemas.microsoft.com/office/drawing/2014/main" id="{75A3AAC8-D2C8-2147-8E05-86D74E562804}"/>
+              </a:ext>
+            </a:extLst>
+          </p:cNvPr>
+          <p:cNvCxnSpPr>
+            <a:cxnSpLocks/>
+          </p:cNvCxnSpPr>
+          <p:nvPr/>
+        </p:nvCxnSpPr>
+        <p:spPr>
+          <a:xfrm>
+            <a:off x="4572000" y="946205"/>
+            <a:ext cx="0" cy="3705308"/>
+          </a:xfrm>
+          <a:prstGeom prst="line">
+            <a:avLst/>
+          </a:prstGeom>
+        </p:spPr>
+        <p:style>
+          <a:lnRef idx="1">
+            <a:schemeClr val="accent1"/>
+          </a:lnRef>
+          <a:fillRef idx="0">
+            <a:schemeClr val="accent1"/>
+          </a:fillRef>
+          <a:effectRef idx="0">
+            <a:schemeClr val="accent1"/>
+          </a:effectRef>
+          <a:fontRef idx="minor">
+            <a:schemeClr val="tx1"/>
+          </a:fontRef>
+        </p:style>
+      </p:cxnSp>
+      <p:grpSp>
+        <p:nvGrpSpPr>
+          <p:cNvPr id="10" name="Google Shape;378;p37">
+            <a:extLst>
+              <a:ext uri="{FF2B5EF4-FFF2-40B4-BE49-F238E27FC236}">
+                <a16:creationId xmlns:a16="http://schemas.microsoft.com/office/drawing/2014/main" id="{F75B2BDF-0577-0047-8271-5962DE0F624C}"/>
+              </a:ext>
+            </a:extLst>
+          </p:cNvPr>
+          <p:cNvGrpSpPr/>
+          <p:nvPr/>
+        </p:nvGrpSpPr>
+        <p:grpSpPr>
+          <a:xfrm rot="1160667">
+            <a:off x="7926046" y="3269596"/>
+            <a:ext cx="366458" cy="366437"/>
+            <a:chOff x="1923675" y="1633650"/>
+            <a:chExt cx="436000" cy="435975"/>
+          </a:xfrm>
+        </p:grpSpPr>
+        <p:sp>
+          <p:nvSpPr>
+            <p:cNvPr id="11" name="Google Shape;379;p37">
+              <a:extLst>
+                <a:ext uri="{FF2B5EF4-FFF2-40B4-BE49-F238E27FC236}">
+                  <a16:creationId xmlns:a16="http://schemas.microsoft.com/office/drawing/2014/main" id="{AA8E83A7-674F-2F43-9BFD-2DA9DB6C4FE3}"/>
+                </a:ext>
+              </a:extLst>
+            </p:cNvPr>
+            <p:cNvSpPr/>
+            <p:nvPr/>
+          </p:nvSpPr>
+          <p:spPr>
+            <a:xfrm>
+              <a:off x="2209250" y="1633650"/>
+              <a:ext cx="150425" cy="150425"/>
+            </a:xfrm>
+            <a:custGeom>
+              <a:avLst/>
+              <a:gdLst/>
+              <a:ahLst/>
+              <a:cxnLst/>
+              <a:rect l="l" t="t" r="r" b="b"/>
+              <a:pathLst>
+                <a:path w="6017" h="6017" fill="none" extrusionOk="0">
+                  <a:moveTo>
+                    <a:pt x="5846" y="3605"/>
+                  </a:moveTo>
+                  <a:lnTo>
+                    <a:pt x="2412" y="171"/>
+                  </a:lnTo>
+                  <a:lnTo>
+                    <a:pt x="2412" y="171"/>
+                  </a:lnTo>
+                  <a:lnTo>
+                    <a:pt x="2314" y="98"/>
+                  </a:lnTo>
+                  <a:lnTo>
+                    <a:pt x="2217" y="49"/>
+                  </a:lnTo>
+                  <a:lnTo>
+                    <a:pt x="2095" y="25"/>
+                  </a:lnTo>
+                  <a:lnTo>
+                    <a:pt x="1997" y="1"/>
+                  </a:lnTo>
+                  <a:lnTo>
+                    <a:pt x="1876" y="25"/>
+                  </a:lnTo>
+                  <a:lnTo>
+                    <a:pt x="1778" y="49"/>
+                  </a:lnTo>
+                  <a:lnTo>
+                    <a:pt x="1681" y="98"/>
+                  </a:lnTo>
+                  <a:lnTo>
+                    <a:pt x="1583" y="171"/>
+                  </a:lnTo>
+                  <a:lnTo>
+                    <a:pt x="0" y="1778"/>
+                  </a:lnTo>
+                  <a:lnTo>
+                    <a:pt x="4238" y="6016"/>
+                  </a:lnTo>
+                  <a:lnTo>
+                    <a:pt x="5846" y="4433"/>
+                  </a:lnTo>
+                  <a:lnTo>
+                    <a:pt x="5846" y="4433"/>
+                  </a:lnTo>
+                  <a:lnTo>
+                    <a:pt x="5919" y="4336"/>
+                  </a:lnTo>
+                  <a:lnTo>
+                    <a:pt x="5967" y="4238"/>
+                  </a:lnTo>
+                  <a:lnTo>
+                    <a:pt x="5992" y="4141"/>
+                  </a:lnTo>
+                  <a:lnTo>
+                    <a:pt x="6016" y="4019"/>
+                  </a:lnTo>
+                  <a:lnTo>
+                    <a:pt x="5992" y="3922"/>
+                  </a:lnTo>
+                  <a:lnTo>
+                    <a:pt x="5967" y="3800"/>
+                  </a:lnTo>
+                  <a:lnTo>
+                    <a:pt x="5919" y="3703"/>
+                  </a:lnTo>
+                  <a:lnTo>
+                    <a:pt x="5846" y="3605"/>
+                  </a:lnTo>
+                  <a:lnTo>
+                    <a:pt x="5846" y="3605"/>
+                  </a:lnTo>
+                  <a:close/>
+                </a:path>
+              </a:pathLst>
+            </a:custGeom>
+            <a:noFill/>
+            <a:ln w="12175" cap="rnd" cmpd="sng">
+              <a:solidFill>
+                <a:schemeClr val="accent1"/>
+              </a:solidFill>
+              <a:prstDash val="solid"/>
+              <a:round/>
+              <a:headEnd type="none" w="sm" len="sm"/>
+              <a:tailEnd type="none" w="sm" len="sm"/>
+            </a:ln>
+          </p:spPr>
+          <p:txBody>
+            <a:bodyPr spcFirstLastPara="1" wrap="square" lIns="91425" tIns="91425" rIns="91425" bIns="91425" anchor="ctr" anchorCtr="0">
+              <a:noAutofit/>
+            </a:bodyPr>
+            <a:lstStyle/>
+            <a:p>
+              <a:pPr marL="0" lvl="0" indent="0" algn="l" rtl="0">
+                <a:spcBef>
+                  <a:spcPts val="0"/>
+                </a:spcBef>
+                <a:spcAft>
+                  <a:spcPts val="0"/>
+                </a:spcAft>
+                <a:buNone/>
+              </a:pPr>
+              <a:endParaRPr/>
+            </a:p>
+          </p:txBody>
+        </p:sp>
+        <p:sp>
+          <p:nvSpPr>
+            <p:cNvPr id="12" name="Google Shape;380;p37">
+              <a:extLst>
+                <a:ext uri="{FF2B5EF4-FFF2-40B4-BE49-F238E27FC236}">
+                  <a16:creationId xmlns:a16="http://schemas.microsoft.com/office/drawing/2014/main" id="{68F6B620-CDD9-0F4D-A5C6-2AD855AE3C4F}"/>
+                </a:ext>
+              </a:extLst>
+            </p:cNvPr>
+            <p:cNvSpPr/>
+            <p:nvPr/>
+          </p:nvSpPr>
+          <p:spPr>
+            <a:xfrm>
+              <a:off x="2019900" y="1757250"/>
+              <a:ext cx="261825" cy="261850"/>
+            </a:xfrm>
+            <a:custGeom>
+              <a:avLst/>
+              <a:gdLst/>
+              <a:ahLst/>
+              <a:cxnLst/>
+              <a:rect l="l" t="t" r="r" b="b"/>
+              <a:pathLst>
+                <a:path w="10473" h="10474" fill="none" extrusionOk="0">
+                  <a:moveTo>
+                    <a:pt x="10473" y="1"/>
+                  </a:moveTo>
+                  <a:lnTo>
+                    <a:pt x="0" y="10473"/>
+                  </a:lnTo>
+                </a:path>
+              </a:pathLst>
+            </a:custGeom>
+            <a:noFill/>
+            <a:ln w="12175" cap="rnd" cmpd="sng">
+              <a:solidFill>
+                <a:schemeClr val="accent1"/>
+              </a:solidFill>
+              <a:prstDash val="solid"/>
+              <a:round/>
+              <a:headEnd type="none" w="sm" len="sm"/>
+              <a:tailEnd type="none" w="sm" len="sm"/>
+            </a:ln>
+          </p:spPr>
+          <p:txBody>
+            <a:bodyPr spcFirstLastPara="1" wrap="square" lIns="91425" tIns="91425" rIns="91425" bIns="91425" anchor="ctr" anchorCtr="0">
+              <a:noAutofit/>
+            </a:bodyPr>
+            <a:lstStyle/>
+            <a:p>
+              <a:pPr marL="0" lvl="0" indent="0" algn="l" rtl="0">
+                <a:spcBef>
+                  <a:spcPts val="0"/>
+                </a:spcBef>
+                <a:spcAft>
+                  <a:spcPts val="0"/>
+                </a:spcAft>
+                <a:buNone/>
+              </a:pPr>
+              <a:endParaRPr/>
+            </a:p>
+          </p:txBody>
+        </p:sp>
+        <p:sp>
+          <p:nvSpPr>
+            <p:cNvPr id="13" name="Google Shape;381;p37">
+              <a:extLst>
+                <a:ext uri="{FF2B5EF4-FFF2-40B4-BE49-F238E27FC236}">
+                  <a16:creationId xmlns:a16="http://schemas.microsoft.com/office/drawing/2014/main" id="{4066391E-F8B1-544B-9DC8-D48769E98CCD}"/>
+                </a:ext>
+              </a:extLst>
+            </p:cNvPr>
+            <p:cNvSpPr/>
+            <p:nvPr/>
+          </p:nvSpPr>
+          <p:spPr>
+            <a:xfrm>
+              <a:off x="1923675" y="1681150"/>
+              <a:ext cx="388500" cy="388475"/>
+            </a:xfrm>
+            <a:custGeom>
+              <a:avLst/>
+              <a:gdLst/>
+              <a:ahLst/>
+              <a:cxnLst/>
+              <a:rect l="l" t="t" r="r" b="b"/>
+              <a:pathLst>
+                <a:path w="15540" h="15539" fill="none" extrusionOk="0">
+                  <a:moveTo>
+                    <a:pt x="11277" y="0"/>
+                  </a:moveTo>
+                  <a:lnTo>
+                    <a:pt x="756" y="10546"/>
+                  </a:lnTo>
+                  <a:lnTo>
+                    <a:pt x="756" y="10546"/>
+                  </a:lnTo>
+                  <a:lnTo>
+                    <a:pt x="683" y="10619"/>
+                  </a:lnTo>
+                  <a:lnTo>
+                    <a:pt x="634" y="10692"/>
+                  </a:lnTo>
+                  <a:lnTo>
+                    <a:pt x="610" y="10765"/>
+                  </a:lnTo>
+                  <a:lnTo>
+                    <a:pt x="585" y="10863"/>
+                  </a:lnTo>
+                  <a:lnTo>
+                    <a:pt x="1" y="14881"/>
+                  </a:lnTo>
+                  <a:lnTo>
+                    <a:pt x="1" y="14881"/>
+                  </a:lnTo>
+                  <a:lnTo>
+                    <a:pt x="1" y="15003"/>
+                  </a:lnTo>
+                  <a:lnTo>
+                    <a:pt x="25" y="15149"/>
+                  </a:lnTo>
+                  <a:lnTo>
+                    <a:pt x="98" y="15271"/>
+                  </a:lnTo>
+                  <a:lnTo>
+                    <a:pt x="171" y="15368"/>
+                  </a:lnTo>
+                  <a:lnTo>
+                    <a:pt x="171" y="15368"/>
+                  </a:lnTo>
+                  <a:lnTo>
+                    <a:pt x="269" y="15441"/>
+                  </a:lnTo>
+                  <a:lnTo>
+                    <a:pt x="366" y="15490"/>
+                  </a:lnTo>
+                  <a:lnTo>
+                    <a:pt x="464" y="15514"/>
+                  </a:lnTo>
+                  <a:lnTo>
+                    <a:pt x="585" y="15539"/>
+                  </a:lnTo>
+                  <a:lnTo>
+                    <a:pt x="585" y="15539"/>
+                  </a:lnTo>
+                  <a:lnTo>
+                    <a:pt x="659" y="15539"/>
+                  </a:lnTo>
+                  <a:lnTo>
+                    <a:pt x="4677" y="14954"/>
+                  </a:lnTo>
+                  <a:lnTo>
+                    <a:pt x="4677" y="14954"/>
+                  </a:lnTo>
+                  <a:lnTo>
+                    <a:pt x="4848" y="14905"/>
+                  </a:lnTo>
+                  <a:lnTo>
+                    <a:pt x="4921" y="14857"/>
+                  </a:lnTo>
+                  <a:lnTo>
+                    <a:pt x="4994" y="14784"/>
+                  </a:lnTo>
+                  <a:lnTo>
+                    <a:pt x="15539" y="4262"/>
+                  </a:lnTo>
+                </a:path>
+              </a:pathLst>
+            </a:custGeom>
+            <a:noFill/>
+            <a:ln w="12175" cap="rnd" cmpd="sng">
+              <a:solidFill>
+                <a:schemeClr val="accent1"/>
+              </a:solidFill>
+              <a:prstDash val="solid"/>
+              <a:round/>
+              <a:headEnd type="none" w="sm" len="sm"/>
+              <a:tailEnd type="none" w="sm" len="sm"/>
+            </a:ln>
+          </p:spPr>
+          <p:txBody>
+            <a:bodyPr spcFirstLastPara="1" wrap="square" lIns="91425" tIns="91425" rIns="91425" bIns="91425" anchor="ctr" anchorCtr="0">
+              <a:noAutofit/>
+            </a:bodyPr>
+            <a:lstStyle/>
+            <a:p>
+              <a:pPr marL="0" lvl="0" indent="0" algn="l" rtl="0">
+                <a:spcBef>
+                  <a:spcPts val="0"/>
+                </a:spcBef>
+                <a:spcAft>
+                  <a:spcPts val="0"/>
+                </a:spcAft>
+                <a:buNone/>
+              </a:pPr>
+              <a:endParaRPr/>
+            </a:p>
+          </p:txBody>
+        </p:sp>
+        <p:sp>
+          <p:nvSpPr>
+            <p:cNvPr id="14" name="Google Shape;382;p37">
+              <a:extLst>
+                <a:ext uri="{FF2B5EF4-FFF2-40B4-BE49-F238E27FC236}">
+                  <a16:creationId xmlns:a16="http://schemas.microsoft.com/office/drawing/2014/main" id="{50E7A8CA-E64E-5341-8526-F29EA298609D}"/>
+                </a:ext>
+              </a:extLst>
+            </p:cNvPr>
+            <p:cNvSpPr/>
+            <p:nvPr/>
+          </p:nvSpPr>
+          <p:spPr>
+            <a:xfrm>
+              <a:off x="1974225" y="1711575"/>
+              <a:ext cx="261825" cy="261850"/>
+            </a:xfrm>
+            <a:custGeom>
+              <a:avLst/>
+              <a:gdLst/>
+              <a:ahLst/>
+              <a:cxnLst/>
+              <a:rect l="l" t="t" r="r" b="b"/>
+              <a:pathLst>
+                <a:path w="10473" h="10474" fill="none" extrusionOk="0">
+                  <a:moveTo>
+                    <a:pt x="0" y="10474"/>
+                  </a:moveTo>
+                  <a:lnTo>
+                    <a:pt x="10473" y="1"/>
+                  </a:lnTo>
+                </a:path>
+              </a:pathLst>
+            </a:custGeom>
+            <a:noFill/>
+            <a:ln w="12175" cap="rnd" cmpd="sng">
+              <a:solidFill>
+                <a:schemeClr val="accent1"/>
+              </a:solidFill>
+              <a:prstDash val="solid"/>
+              <a:round/>
+              <a:headEnd type="none" w="sm" len="sm"/>
+              <a:tailEnd type="none" w="sm" len="sm"/>
+            </a:ln>
+          </p:spPr>
+          <p:txBody>
+            <a:bodyPr spcFirstLastPara="1" wrap="square" lIns="91425" tIns="91425" rIns="91425" bIns="91425" anchor="ctr" anchorCtr="0">
+              <a:noAutofit/>
+            </a:bodyPr>
+            <a:lstStyle/>
+            <a:p>
+              <a:pPr marL="0" lvl="0" indent="0" algn="l" rtl="0">
+                <a:spcBef>
+                  <a:spcPts val="0"/>
+                </a:spcBef>
+                <a:spcAft>
+                  <a:spcPts val="0"/>
+                </a:spcAft>
+                <a:buNone/>
+              </a:pPr>
+              <a:endParaRPr/>
+            </a:p>
+          </p:txBody>
+        </p:sp>
+        <p:sp>
+          <p:nvSpPr>
+            <p:cNvPr id="15" name="Google Shape;383;p37">
+              <a:extLst>
+                <a:ext uri="{FF2B5EF4-FFF2-40B4-BE49-F238E27FC236}">
+                  <a16:creationId xmlns:a16="http://schemas.microsoft.com/office/drawing/2014/main" id="{1B2C0EE8-AE4A-ED42-9CE4-A0F3F0186893}"/>
+                </a:ext>
+              </a:extLst>
+            </p:cNvPr>
+            <p:cNvSpPr/>
+            <p:nvPr/>
+          </p:nvSpPr>
+          <p:spPr>
+            <a:xfrm>
+              <a:off x="1934650" y="2014200"/>
+              <a:ext cx="44475" cy="44475"/>
+            </a:xfrm>
+            <a:custGeom>
+              <a:avLst/>
+              <a:gdLst/>
+              <a:ahLst/>
+              <a:cxnLst/>
+              <a:rect l="l" t="t" r="r" b="b"/>
+              <a:pathLst>
+                <a:path w="1779" h="1779" fill="none" extrusionOk="0">
+                  <a:moveTo>
+                    <a:pt x="1778" y="1778"/>
+                  </a:moveTo>
+                  <a:lnTo>
+                    <a:pt x="0" y="0"/>
+                  </a:lnTo>
+                </a:path>
+              </a:pathLst>
+            </a:custGeom>
+            <a:noFill/>
+            <a:ln w="12175" cap="rnd" cmpd="sng">
+              <a:solidFill>
+                <a:schemeClr val="accent1"/>
+              </a:solidFill>
+              <a:prstDash val="solid"/>
+              <a:round/>
+              <a:headEnd type="none" w="sm" len="sm"/>
+              <a:tailEnd type="none" w="sm" len="sm"/>
+            </a:ln>
+          </p:spPr>
+          <p:txBody>
+            <a:bodyPr spcFirstLastPara="1" wrap="square" lIns="91425" tIns="91425" rIns="91425" bIns="91425" anchor="ctr" anchorCtr="0">
+              <a:noAutofit/>
+            </a:bodyPr>
+            <a:lstStyle/>
+            <a:p>
+              <a:pPr marL="0" lvl="0" indent="0" algn="l" rtl="0">
+                <a:spcBef>
+                  <a:spcPts val="0"/>
+                </a:spcBef>
+                <a:spcAft>
+                  <a:spcPts val="0"/>
+                </a:spcAft>
+                <a:buNone/>
+              </a:pPr>
+              <a:endParaRPr/>
+            </a:p>
+          </p:txBody>
+        </p:sp>
+        <p:sp>
+          <p:nvSpPr>
+            <p:cNvPr id="16" name="Google Shape;384;p37">
+              <a:extLst>
+                <a:ext uri="{FF2B5EF4-FFF2-40B4-BE49-F238E27FC236}">
+                  <a16:creationId xmlns:a16="http://schemas.microsoft.com/office/drawing/2014/main" id="{25E0074C-6C1B-1843-BB47-5AD0C85CAE4C}"/>
+                </a:ext>
+              </a:extLst>
+            </p:cNvPr>
+            <p:cNvSpPr/>
+            <p:nvPr/>
+          </p:nvSpPr>
+          <p:spPr>
+            <a:xfrm>
+              <a:off x="1944375" y="1947225"/>
+              <a:ext cx="101725" cy="101700"/>
+            </a:xfrm>
+            <a:custGeom>
+              <a:avLst/>
+              <a:gdLst/>
+              <a:ahLst/>
+              <a:cxnLst/>
+              <a:rect l="l" t="t" r="r" b="b"/>
+              <a:pathLst>
+                <a:path w="4069" h="4068" fill="none" extrusionOk="0">
+                  <a:moveTo>
+                    <a:pt x="1" y="49"/>
+                  </a:moveTo>
+                  <a:lnTo>
+                    <a:pt x="1" y="49"/>
+                  </a:lnTo>
+                  <a:lnTo>
+                    <a:pt x="25" y="0"/>
+                  </a:lnTo>
+                  <a:lnTo>
+                    <a:pt x="25" y="0"/>
+                  </a:lnTo>
+                  <a:lnTo>
+                    <a:pt x="4068" y="4043"/>
+                  </a:lnTo>
+                  <a:lnTo>
+                    <a:pt x="4068" y="4043"/>
+                  </a:lnTo>
+                  <a:lnTo>
+                    <a:pt x="4068" y="4043"/>
+                  </a:lnTo>
+                  <a:lnTo>
+                    <a:pt x="4020" y="4068"/>
+                  </a:lnTo>
+                </a:path>
+              </a:pathLst>
+            </a:custGeom>
+            <a:noFill/>
+            <a:ln w="12175" cap="rnd" cmpd="sng">
+              <a:solidFill>
+                <a:schemeClr val="accent1"/>
+              </a:solidFill>
+              <a:prstDash val="solid"/>
+              <a:round/>
+              <a:headEnd type="none" w="sm" len="sm"/>
+              <a:tailEnd type="none" w="sm" len="sm"/>
+            </a:ln>
+          </p:spPr>
+          <p:txBody>
+            <a:bodyPr spcFirstLastPara="1" wrap="square" lIns="91425" tIns="91425" rIns="91425" bIns="91425" anchor="ctr" anchorCtr="0">
+              <a:noAutofit/>
+            </a:bodyPr>
+            <a:lstStyle/>
+            <a:p>
+              <a:pPr marL="0" lvl="0" indent="0" algn="l" rtl="0">
+                <a:spcBef>
+                  <a:spcPts val="0"/>
+                </a:spcBef>
+                <a:spcAft>
+                  <a:spcPts val="0"/>
+                </a:spcAft>
+                <a:buNone/>
+              </a:pPr>
+              <a:endParaRPr/>
+            </a:p>
+          </p:txBody>
+        </p:sp>
+      </p:grpSp>
+    </p:spTree>
+    <p:extLst>
+      <p:ext uri="{BB962C8B-B14F-4D97-AF65-F5344CB8AC3E}">
+        <p14:creationId xmlns:p14="http://schemas.microsoft.com/office/powerpoint/2010/main" val="734602564"/>
+      </p:ext>
+    </p:extLst>
+  </p:cSld>
+  <p:clrMapOvr>
+    <a:masterClrMapping/>
+  </p:clrMapOvr>
+</p:sld>
+</file>
+
+<file path=ppt/slides/slide4.xml><?xml version="1.0" encoding="utf-8"?>
+<p:sld xmlns:a="http://schemas.openxmlformats.org/drawingml/2006/main" xmlns:r="http://schemas.openxmlformats.org/officeDocument/2006/relationships" xmlns:p="http://schemas.openxmlformats.org/presentationml/2006/main">
+  <p:cSld>
+    <p:spTree>
+      <p:nvGrpSpPr>
+        <p:cNvPr id="1" name="Shape 80"/>
+        <p:cNvGrpSpPr/>
+        <p:nvPr/>
+      </p:nvGrpSpPr>
+      <p:grpSpPr>
+        <a:xfrm>
+          <a:off x="0" y="0"/>
+          <a:ext cx="0" cy="0"/>
+          <a:chOff x="0" y="0"/>
+          <a:chExt cx="0" cy="0"/>
+        </a:xfrm>
+      </p:grpSpPr>
+      <p:sp>
+        <p:nvSpPr>
+          <p:cNvPr id="81" name="Google Shape;81;p16"/>
+          <p:cNvSpPr txBox="1">
+            <a:spLocks noGrp="1"/>
+          </p:cNvSpPr>
+          <p:nvPr>
+            <p:ph type="body" idx="1"/>
+          </p:nvPr>
+        </p:nvSpPr>
+        <p:spPr>
+          <a:xfrm>
+            <a:off x="1659150" y="2161800"/>
+            <a:ext cx="5825700" cy="819900"/>
+          </a:xfrm>
+          <a:prstGeom prst="rect">
+            <a:avLst/>
+          </a:prstGeom>
+        </p:spPr>
+        <p:txBody>
+          <a:bodyPr spcFirstLastPara="1" wrap="square" lIns="91425" tIns="91425" rIns="91425" bIns="91425" anchor="t" anchorCtr="0">
+            <a:noAutofit/>
+          </a:bodyPr>
+          <a:lstStyle/>
+          <a:p>
+            <a:pPr marL="0" lvl="0" indent="0" algn="ctr" rtl="0">
+              <a:spcBef>
+                <a:spcPts val="600"/>
+              </a:spcBef>
+              <a:spcAft>
+                <a:spcPts val="0"/>
+              </a:spcAft>
+              <a:buNone/>
+            </a:pPr>
+            <a:r>
+              <a:rPr lang="en"/>
+              <a:t>Quotations are commonly printed as a means of inspiration and to invoke philosophical thoughts from the reader.</a:t>
+            </a:r>
+            <a:endParaRPr/>
+          </a:p>
+        </p:txBody>
+      </p:sp>
+      <p:sp>
+        <p:nvSpPr>
+          <p:cNvPr id="82" name="Google Shape;82;p16"/>
+          <p:cNvSpPr txBox="1">
+            <a:spLocks noGrp="1"/>
+          </p:cNvSpPr>
+          <p:nvPr>
+            <p:ph type="sldNum" idx="12"/>
+          </p:nvPr>
+        </p:nvSpPr>
+        <p:spPr>
+          <a:xfrm>
+            <a:off x="4297650" y="4419838"/>
+            <a:ext cx="548700" cy="393600"/>
+          </a:xfrm>
+          <a:prstGeom prst="rect">
+            <a:avLst/>
+          </a:prstGeom>
+        </p:spPr>
+        <p:txBody>
+          <a:bodyPr spcFirstLastPara="1" wrap="square" lIns="91425" tIns="91425" rIns="91425" bIns="91425" anchor="b" anchorCtr="0">
+            <a:noAutofit/>
+          </a:bodyPr>
+          <a:lstStyle/>
+          <a:p>
+            <a:pPr marL="0" lvl="0" indent="0" algn="ctr" rtl="0">
+              <a:spcBef>
+                <a:spcPts val="0"/>
+              </a:spcBef>
+              <a:spcAft>
+                <a:spcPts val="0"/>
+              </a:spcAft>
+              <a:buNone/>
+            </a:pPr>
+            <a:fld id="{00000000-1234-1234-1234-123412341234}" type="slidenum">
+              <a:rPr lang="en"/>
+              <a:t>4</a:t>
+            </a:fld>
+            <a:endParaRPr/>
+          </a:p>
+        </p:txBody>
+      </p:sp>
+    </p:spTree>
+    <p:extLst>
+      <p:ext uri="{BB962C8B-B14F-4D97-AF65-F5344CB8AC3E}">
+        <p14:creationId xmlns:p14="http://schemas.microsoft.com/office/powerpoint/2010/main" val="3396184922"/>
+      </p:ext>
+    </p:extLst>
+  </p:cSld>
+  <p:clrMapOvr>
+    <a:masterClrMapping/>
+  </p:clrMapOvr>
+</p:sld>
+</file>
+
+<file path=ppt/slides/slide5.xml><?xml version="1.0" encoding="utf-8"?>
+<p:sld xmlns:a="http://schemas.openxmlformats.org/drawingml/2006/main" xmlns:r="http://schemas.openxmlformats.org/officeDocument/2006/relationships" xmlns:p="http://schemas.openxmlformats.org/presentationml/2006/main">
+  <p:cSld>
+    <p:spTree>
+      <p:nvGrpSpPr>
+        <p:cNvPr id="1" name=""/>
+        <p:cNvGrpSpPr/>
+        <p:nvPr/>
+      </p:nvGrpSpPr>
+      <p:grpSpPr>
+        <a:xfrm>
+          <a:off x="0" y="0"/>
+          <a:ext cx="0" cy="0"/>
+          <a:chOff x="0" y="0"/>
+          <a:chExt cx="0" cy="0"/>
+        </a:xfrm>
+      </p:grpSpPr>
+      <p:sp>
+        <p:nvSpPr>
+          <p:cNvPr id="2" name="Title 1">
+            <a:extLst>
+              <a:ext uri="{FF2B5EF4-FFF2-40B4-BE49-F238E27FC236}">
+                <a16:creationId xmlns:a16="http://schemas.microsoft.com/office/drawing/2014/main" id="{19365887-7EDE-BF42-81E2-5014E71EDE5C}"/>
+              </a:ext>
+            </a:extLst>
+          </p:cNvPr>
+          <p:cNvSpPr>
+            <a:spLocks noGrp="1"/>
+          </p:cNvSpPr>
+          <p:nvPr>
+            <p:ph type="ctrTitle"/>
+          </p:nvPr>
+        </p:nvSpPr>
+        <p:spPr/>
+        <p:txBody>
+          <a:bodyPr/>
+          <a:lstStyle/>
+          <a:p>
+            <a:endParaRPr lang="en-US"/>
+          </a:p>
+        </p:txBody>
+      </p:sp>
+      <p:sp>
+        <p:nvSpPr>
+          <p:cNvPr id="3" name="Subtitle 2">
+            <a:extLst>
+              <a:ext uri="{FF2B5EF4-FFF2-40B4-BE49-F238E27FC236}">
+                <a16:creationId xmlns:a16="http://schemas.microsoft.com/office/drawing/2014/main" id="{4462B44D-FD64-7B45-B51F-433173CCF161}"/>
+              </a:ext>
+            </a:extLst>
+          </p:cNvPr>
+          <p:cNvSpPr>
+            <a:spLocks noGrp="1"/>
+          </p:cNvSpPr>
+          <p:nvPr>
+            <p:ph type="subTitle" idx="1"/>
+          </p:nvPr>
+        </p:nvSpPr>
+        <p:spPr/>
+        <p:txBody>
+          <a:bodyPr/>
+          <a:lstStyle/>
+          <a:p>
+            <a:endParaRPr lang="en-US"/>
+          </a:p>
+        </p:txBody>
+      </p:sp>
+      <p:sp>
+        <p:nvSpPr>
+          <p:cNvPr id="4" name="Slide Number Placeholder 3">
+            <a:extLst>
+              <a:ext uri="{FF2B5EF4-FFF2-40B4-BE49-F238E27FC236}">
+                <a16:creationId xmlns:a16="http://schemas.microsoft.com/office/drawing/2014/main" id="{18B41BA1-CC34-CC4F-8534-0C378614DC61}"/>
+              </a:ext>
+            </a:extLst>
+          </p:cNvPr>
+          <p:cNvSpPr>
+            <a:spLocks noGrp="1"/>
+          </p:cNvSpPr>
+          <p:nvPr>
+            <p:ph type="sldNum" idx="12"/>
+          </p:nvPr>
+        </p:nvSpPr>
+        <p:spPr/>
+        <p:txBody>
+          <a:bodyPr/>
+          <a:lstStyle/>
+          <a:p>
+            <a:pPr marL="0" lvl="0" indent="0" algn="ctr" rtl="0">
+              <a:spcBef>
+                <a:spcPts val="0"/>
+              </a:spcBef>
+              <a:spcAft>
+                <a:spcPts val="0"/>
+              </a:spcAft>
+              <a:buNone/>
+            </a:pPr>
+            <a:fld id="{00000000-1234-1234-1234-123412341234}" type="slidenum">
+              <a:rPr lang="en" smtClean="0"/>
+              <a:t>5</a:t>
+            </a:fld>
+            <a:endParaRPr lang="en"/>
+          </a:p>
+        </p:txBody>
+      </p:sp>
+    </p:spTree>
+    <p:extLst>
+      <p:ext uri="{BB962C8B-B14F-4D97-AF65-F5344CB8AC3E}">
+        <p14:creationId xmlns:p14="http://schemas.microsoft.com/office/powerpoint/2010/main" val="4159804167"/>
+      </p:ext>
+    </p:extLst>
+  </p:cSld>
+  <p:clrMapOvr>
+    <a:masterClrMapping/>
+  </p:clrMapOvr>
+</p:sld>
+</file>
+
+<file path=ppt/slides/slide6.xml><?xml version="1.0" encoding="utf-8"?>
+<p:sld xmlns:a="http://schemas.openxmlformats.org/drawingml/2006/main" xmlns:r="http://schemas.openxmlformats.org/officeDocument/2006/relationships" xmlns:p="http://schemas.openxmlformats.org/presentationml/2006/main">
+  <p:cSld>
+    <p:spTree>
+      <p:nvGrpSpPr>
         <p:cNvPr id="1" name=""/>
         <p:cNvGrpSpPr/>
         <p:nvPr/>
@@ -3676,7 +7424,7 @@
             </a:pPr>
             <a:fld id="{00000000-1234-1234-1234-123412341234}" type="slidenum">
               <a:rPr lang="en" smtClean="0"/>
-              <a:t>2</a:t>
+              <a:t>6</a:t>
             </a:fld>
             <a:endParaRPr lang="en"/>
           </a:p>
@@ -3695,7 +7443,7 @@
 </p:sld>
 </file>
 
-<file path=ppt/slides/slide3.xml><?xml version="1.0" encoding="utf-8"?>
+<file path=ppt/slides/slide7.xml><?xml version="1.0" encoding="utf-8"?>
 <p:sld xmlns:a="http://schemas.openxmlformats.org/drawingml/2006/main" xmlns:r="http://schemas.openxmlformats.org/officeDocument/2006/relationships" xmlns:p="http://schemas.openxmlformats.org/presentationml/2006/main">
   <p:cSld>
     <p:spTree>
@@ -3899,7 +7647,7 @@
             </a:pPr>
             <a:fld id="{00000000-1234-1234-1234-123412341234}" type="slidenum">
               <a:rPr lang="en"/>
-              <a:t>3</a:t>
+              <a:t>7</a:t>
             </a:fld>
             <a:endParaRPr/>
           </a:p>

</xml_diff>

<commit_message>
Provable Undo Theory & steps
Co-Authored-By: Jay Bazuzi <jay@bazuzi.com>
</commit_message>
<xml_diff>
--- a/RefactoringToCleanerCode.pptx
+++ b/RefactoringToCleanerCode.pptx
@@ -5,7 +5,7 @@
     <p:sldMasterId id="2147483658" r:id="rId1"/>
   </p:sldMasterIdLst>
   <p:notesMasterIdLst>
-    <p:notesMasterId r:id="rId13"/>
+    <p:notesMasterId r:id="rId17"/>
   </p:notesMasterIdLst>
   <p:sldIdLst>
     <p:sldId id="256" r:id="rId2"/>
@@ -16,9 +16,13 @@
     <p:sldId id="262" r:id="rId7"/>
     <p:sldId id="273" r:id="rId8"/>
     <p:sldId id="294" r:id="rId9"/>
-    <p:sldId id="260" r:id="rId10"/>
-    <p:sldId id="288" r:id="rId11"/>
-    <p:sldId id="278" r:id="rId12"/>
+    <p:sldId id="267" r:id="rId10"/>
+    <p:sldId id="295" r:id="rId11"/>
+    <p:sldId id="296" r:id="rId12"/>
+    <p:sldId id="298" r:id="rId13"/>
+    <p:sldId id="260" r:id="rId14"/>
+    <p:sldId id="288" r:id="rId15"/>
+    <p:sldId id="278" r:id="rId16"/>
   </p:sldIdLst>
   <p:sldSz cx="9144000" cy="5143500" type="screen16x9"/>
   <p:notesSz cx="6858000" cy="9144000"/>
@@ -809,6 +813,442 @@
   <p:cSld>
     <p:spTree>
       <p:nvGrpSpPr>
+        <p:cNvPr id="1" name="Shape 136"/>
+        <p:cNvGrpSpPr/>
+        <p:nvPr/>
+      </p:nvGrpSpPr>
+      <p:grpSpPr>
+        <a:xfrm>
+          <a:off x="0" y="0"/>
+          <a:ext cx="0" cy="0"/>
+          <a:chOff x="0" y="0"/>
+          <a:chExt cx="0" cy="0"/>
+        </a:xfrm>
+      </p:grpSpPr>
+      <p:sp>
+        <p:nvSpPr>
+          <p:cNvPr id="137" name="Google Shape;137;g35f391192_073:notes"/>
+          <p:cNvSpPr>
+            <a:spLocks noGrp="1" noRot="1" noChangeAspect="1"/>
+          </p:cNvSpPr>
+          <p:nvPr>
+            <p:ph type="sldImg" idx="2"/>
+          </p:nvPr>
+        </p:nvSpPr>
+        <p:spPr>
+          <a:xfrm>
+            <a:off x="381000" y="685800"/>
+            <a:ext cx="6096000" cy="3429000"/>
+          </a:xfrm>
+          <a:custGeom>
+            <a:avLst/>
+            <a:gdLst/>
+            <a:ahLst/>
+            <a:cxnLst/>
+            <a:rect l="l" t="t" r="r" b="b"/>
+            <a:pathLst>
+              <a:path w="120000" h="120000" extrusionOk="0">
+                <a:moveTo>
+                  <a:pt x="0" y="0"/>
+                </a:moveTo>
+                <a:lnTo>
+                  <a:pt x="120000" y="0"/>
+                </a:lnTo>
+                <a:lnTo>
+                  <a:pt x="120000" y="120000"/>
+                </a:lnTo>
+                <a:lnTo>
+                  <a:pt x="0" y="120000"/>
+                </a:lnTo>
+                <a:close/>
+              </a:path>
+            </a:pathLst>
+          </a:custGeom>
+        </p:spPr>
+      </p:sp>
+      <p:sp>
+        <p:nvSpPr>
+          <p:cNvPr id="138" name="Google Shape;138;g35f391192_073:notes"/>
+          <p:cNvSpPr txBox="1">
+            <a:spLocks noGrp="1"/>
+          </p:cNvSpPr>
+          <p:nvPr>
+            <p:ph type="body" idx="1"/>
+          </p:nvPr>
+        </p:nvSpPr>
+        <p:spPr>
+          <a:xfrm>
+            <a:off x="685800" y="4343400"/>
+            <a:ext cx="5486400" cy="4114800"/>
+          </a:xfrm>
+          <a:prstGeom prst="rect">
+            <a:avLst/>
+          </a:prstGeom>
+        </p:spPr>
+        <p:txBody>
+          <a:bodyPr spcFirstLastPara="1" wrap="square" lIns="91425" tIns="91425" rIns="91425" bIns="91425" anchor="t" anchorCtr="0">
+            <a:noAutofit/>
+          </a:bodyPr>
+          <a:lstStyle/>
+          <a:p>
+            <a:pPr marL="0" lvl="0" indent="0" algn="l" rtl="0">
+              <a:spcBef>
+                <a:spcPts val="0"/>
+              </a:spcBef>
+              <a:spcAft>
+                <a:spcPts val="0"/>
+              </a:spcAft>
+              <a:buNone/>
+            </a:pPr>
+            <a:endParaRPr/>
+          </a:p>
+        </p:txBody>
+      </p:sp>
+    </p:spTree>
+    <p:extLst>
+      <p:ext uri="{BB962C8B-B14F-4D97-AF65-F5344CB8AC3E}">
+        <p14:creationId xmlns:p14="http://schemas.microsoft.com/office/powerpoint/2010/main" val="400622496"/>
+      </p:ext>
+    </p:extLst>
+  </p:cSld>
+  <p:clrMapOvr>
+    <a:masterClrMapping/>
+  </p:clrMapOvr>
+</p:notes>
+</file>
+
+<file path=ppt/notesSlides/notesSlide11.xml><?xml version="1.0" encoding="utf-8"?>
+<p:notes xmlns:a="http://schemas.openxmlformats.org/drawingml/2006/main" xmlns:r="http://schemas.openxmlformats.org/officeDocument/2006/relationships" xmlns:p="http://schemas.openxmlformats.org/presentationml/2006/main" showMasterSp="0" showMasterPhAnim="0">
+  <p:cSld>
+    <p:spTree>
+      <p:nvGrpSpPr>
+        <p:cNvPr id="1" name="Shape 136"/>
+        <p:cNvGrpSpPr/>
+        <p:nvPr/>
+      </p:nvGrpSpPr>
+      <p:grpSpPr>
+        <a:xfrm>
+          <a:off x="0" y="0"/>
+          <a:ext cx="0" cy="0"/>
+          <a:chOff x="0" y="0"/>
+          <a:chExt cx="0" cy="0"/>
+        </a:xfrm>
+      </p:grpSpPr>
+      <p:sp>
+        <p:nvSpPr>
+          <p:cNvPr id="137" name="Google Shape;137;g35f391192_073:notes"/>
+          <p:cNvSpPr>
+            <a:spLocks noGrp="1" noRot="1" noChangeAspect="1"/>
+          </p:cNvSpPr>
+          <p:nvPr>
+            <p:ph type="sldImg" idx="2"/>
+          </p:nvPr>
+        </p:nvSpPr>
+        <p:spPr>
+          <a:xfrm>
+            <a:off x="381000" y="685800"/>
+            <a:ext cx="6096000" cy="3429000"/>
+          </a:xfrm>
+          <a:custGeom>
+            <a:avLst/>
+            <a:gdLst/>
+            <a:ahLst/>
+            <a:cxnLst/>
+            <a:rect l="l" t="t" r="r" b="b"/>
+            <a:pathLst>
+              <a:path w="120000" h="120000" extrusionOk="0">
+                <a:moveTo>
+                  <a:pt x="0" y="0"/>
+                </a:moveTo>
+                <a:lnTo>
+                  <a:pt x="120000" y="0"/>
+                </a:lnTo>
+                <a:lnTo>
+                  <a:pt x="120000" y="120000"/>
+                </a:lnTo>
+                <a:lnTo>
+                  <a:pt x="0" y="120000"/>
+                </a:lnTo>
+                <a:close/>
+              </a:path>
+            </a:pathLst>
+          </a:custGeom>
+        </p:spPr>
+      </p:sp>
+      <p:sp>
+        <p:nvSpPr>
+          <p:cNvPr id="138" name="Google Shape;138;g35f391192_073:notes"/>
+          <p:cNvSpPr txBox="1">
+            <a:spLocks noGrp="1"/>
+          </p:cNvSpPr>
+          <p:nvPr>
+            <p:ph type="body" idx="1"/>
+          </p:nvPr>
+        </p:nvSpPr>
+        <p:spPr>
+          <a:xfrm>
+            <a:off x="685800" y="4343400"/>
+            <a:ext cx="5486400" cy="4114800"/>
+          </a:xfrm>
+          <a:prstGeom prst="rect">
+            <a:avLst/>
+          </a:prstGeom>
+        </p:spPr>
+        <p:txBody>
+          <a:bodyPr spcFirstLastPara="1" wrap="square" lIns="91425" tIns="91425" rIns="91425" bIns="91425" anchor="t" anchorCtr="0">
+            <a:noAutofit/>
+          </a:bodyPr>
+          <a:lstStyle/>
+          <a:p>
+            <a:pPr marL="0" lvl="0" indent="0" algn="l" rtl="0">
+              <a:spcBef>
+                <a:spcPts val="0"/>
+              </a:spcBef>
+              <a:spcAft>
+                <a:spcPts val="0"/>
+              </a:spcAft>
+              <a:buNone/>
+            </a:pPr>
+            <a:endParaRPr/>
+          </a:p>
+        </p:txBody>
+      </p:sp>
+    </p:spTree>
+    <p:extLst>
+      <p:ext uri="{BB962C8B-B14F-4D97-AF65-F5344CB8AC3E}">
+        <p14:creationId xmlns:p14="http://schemas.microsoft.com/office/powerpoint/2010/main" val="1013400593"/>
+      </p:ext>
+    </p:extLst>
+  </p:cSld>
+  <p:clrMapOvr>
+    <a:masterClrMapping/>
+  </p:clrMapOvr>
+</p:notes>
+</file>
+
+<file path=ppt/notesSlides/notesSlide12.xml><?xml version="1.0" encoding="utf-8"?>
+<p:notes xmlns:a="http://schemas.openxmlformats.org/drawingml/2006/main" xmlns:r="http://schemas.openxmlformats.org/officeDocument/2006/relationships" xmlns:p="http://schemas.openxmlformats.org/presentationml/2006/main" showMasterSp="0" showMasterPhAnim="0">
+  <p:cSld>
+    <p:spTree>
+      <p:nvGrpSpPr>
+        <p:cNvPr id="1" name="Shape 136"/>
+        <p:cNvGrpSpPr/>
+        <p:nvPr/>
+      </p:nvGrpSpPr>
+      <p:grpSpPr>
+        <a:xfrm>
+          <a:off x="0" y="0"/>
+          <a:ext cx="0" cy="0"/>
+          <a:chOff x="0" y="0"/>
+          <a:chExt cx="0" cy="0"/>
+        </a:xfrm>
+      </p:grpSpPr>
+      <p:sp>
+        <p:nvSpPr>
+          <p:cNvPr id="137" name="Google Shape;137;g35f391192_073:notes"/>
+          <p:cNvSpPr>
+            <a:spLocks noGrp="1" noRot="1" noChangeAspect="1"/>
+          </p:cNvSpPr>
+          <p:nvPr>
+            <p:ph type="sldImg" idx="2"/>
+          </p:nvPr>
+        </p:nvSpPr>
+        <p:spPr>
+          <a:xfrm>
+            <a:off x="381000" y="685800"/>
+            <a:ext cx="6096000" cy="3429000"/>
+          </a:xfrm>
+          <a:custGeom>
+            <a:avLst/>
+            <a:gdLst/>
+            <a:ahLst/>
+            <a:cxnLst/>
+            <a:rect l="l" t="t" r="r" b="b"/>
+            <a:pathLst>
+              <a:path w="120000" h="120000" extrusionOk="0">
+                <a:moveTo>
+                  <a:pt x="0" y="0"/>
+                </a:moveTo>
+                <a:lnTo>
+                  <a:pt x="120000" y="0"/>
+                </a:lnTo>
+                <a:lnTo>
+                  <a:pt x="120000" y="120000"/>
+                </a:lnTo>
+                <a:lnTo>
+                  <a:pt x="0" y="120000"/>
+                </a:lnTo>
+                <a:close/>
+              </a:path>
+            </a:pathLst>
+          </a:custGeom>
+        </p:spPr>
+      </p:sp>
+      <p:sp>
+        <p:nvSpPr>
+          <p:cNvPr id="138" name="Google Shape;138;g35f391192_073:notes"/>
+          <p:cNvSpPr txBox="1">
+            <a:spLocks noGrp="1"/>
+          </p:cNvSpPr>
+          <p:nvPr>
+            <p:ph type="body" idx="1"/>
+          </p:nvPr>
+        </p:nvSpPr>
+        <p:spPr>
+          <a:xfrm>
+            <a:off x="685800" y="4343400"/>
+            <a:ext cx="5486400" cy="4114800"/>
+          </a:xfrm>
+          <a:prstGeom prst="rect">
+            <a:avLst/>
+          </a:prstGeom>
+        </p:spPr>
+        <p:txBody>
+          <a:bodyPr spcFirstLastPara="1" wrap="square" lIns="91425" tIns="91425" rIns="91425" bIns="91425" anchor="t" anchorCtr="0">
+            <a:noAutofit/>
+          </a:bodyPr>
+          <a:lstStyle/>
+          <a:p>
+            <a:pPr marL="0" lvl="0" indent="0" algn="l" rtl="0">
+              <a:spcBef>
+                <a:spcPts val="0"/>
+              </a:spcBef>
+              <a:spcAft>
+                <a:spcPts val="0"/>
+              </a:spcAft>
+              <a:buNone/>
+            </a:pPr>
+            <a:endParaRPr/>
+          </a:p>
+        </p:txBody>
+      </p:sp>
+    </p:spTree>
+    <p:extLst>
+      <p:ext uri="{BB962C8B-B14F-4D97-AF65-F5344CB8AC3E}">
+        <p14:creationId xmlns:p14="http://schemas.microsoft.com/office/powerpoint/2010/main" val="3385966170"/>
+      </p:ext>
+    </p:extLst>
+  </p:cSld>
+  <p:clrMapOvr>
+    <a:masterClrMapping/>
+  </p:clrMapOvr>
+</p:notes>
+</file>
+
+<file path=ppt/notesSlides/notesSlide13.xml><?xml version="1.0" encoding="utf-8"?>
+<p:notes xmlns:a="http://schemas.openxmlformats.org/drawingml/2006/main" xmlns:r="http://schemas.openxmlformats.org/officeDocument/2006/relationships" xmlns:p="http://schemas.openxmlformats.org/presentationml/2006/main" showMasterSp="0" showMasterPhAnim="0">
+  <p:cSld>
+    <p:spTree>
+      <p:nvGrpSpPr>
+        <p:cNvPr id="1" name="Shape 77"/>
+        <p:cNvGrpSpPr/>
+        <p:nvPr/>
+      </p:nvGrpSpPr>
+      <p:grpSpPr>
+        <a:xfrm>
+          <a:off x="0" y="0"/>
+          <a:ext cx="0" cy="0"/>
+          <a:chOff x="0" y="0"/>
+          <a:chExt cx="0" cy="0"/>
+        </a:xfrm>
+      </p:grpSpPr>
+      <p:sp>
+        <p:nvSpPr>
+          <p:cNvPr id="78" name="Google Shape;78;g35f391192_09:notes"/>
+          <p:cNvSpPr>
+            <a:spLocks noGrp="1" noRot="1" noChangeAspect="1"/>
+          </p:cNvSpPr>
+          <p:nvPr>
+            <p:ph type="sldImg" idx="2"/>
+          </p:nvPr>
+        </p:nvSpPr>
+        <p:spPr>
+          <a:xfrm>
+            <a:off x="381000" y="685800"/>
+            <a:ext cx="6096000" cy="3429000"/>
+          </a:xfrm>
+          <a:custGeom>
+            <a:avLst/>
+            <a:gdLst/>
+            <a:ahLst/>
+            <a:cxnLst/>
+            <a:rect l="l" t="t" r="r" b="b"/>
+            <a:pathLst>
+              <a:path w="120000" h="120000" extrusionOk="0">
+                <a:moveTo>
+                  <a:pt x="0" y="0"/>
+                </a:moveTo>
+                <a:lnTo>
+                  <a:pt x="120000" y="0"/>
+                </a:lnTo>
+                <a:lnTo>
+                  <a:pt x="120000" y="120000"/>
+                </a:lnTo>
+                <a:lnTo>
+                  <a:pt x="0" y="120000"/>
+                </a:lnTo>
+                <a:close/>
+              </a:path>
+            </a:pathLst>
+          </a:custGeom>
+        </p:spPr>
+      </p:sp>
+      <p:sp>
+        <p:nvSpPr>
+          <p:cNvPr id="79" name="Google Shape;79;g35f391192_09:notes"/>
+          <p:cNvSpPr txBox="1">
+            <a:spLocks noGrp="1"/>
+          </p:cNvSpPr>
+          <p:nvPr>
+            <p:ph type="body" idx="1"/>
+          </p:nvPr>
+        </p:nvSpPr>
+        <p:spPr>
+          <a:xfrm>
+            <a:off x="685800" y="4343400"/>
+            <a:ext cx="5486400" cy="4114800"/>
+          </a:xfrm>
+          <a:prstGeom prst="rect">
+            <a:avLst/>
+          </a:prstGeom>
+        </p:spPr>
+        <p:txBody>
+          <a:bodyPr spcFirstLastPara="1" wrap="square" lIns="91425" tIns="91425" rIns="91425" bIns="91425" anchor="t" anchorCtr="0">
+            <a:noAutofit/>
+          </a:bodyPr>
+          <a:lstStyle/>
+          <a:p>
+            <a:pPr marL="0" lvl="0" indent="0" algn="l" rtl="0">
+              <a:spcBef>
+                <a:spcPts val="0"/>
+              </a:spcBef>
+              <a:spcAft>
+                <a:spcPts val="0"/>
+              </a:spcAft>
+              <a:buNone/>
+            </a:pPr>
+            <a:endParaRPr/>
+          </a:p>
+        </p:txBody>
+      </p:sp>
+    </p:spTree>
+    <p:extLst>
+      <p:ext uri="{BB962C8B-B14F-4D97-AF65-F5344CB8AC3E}">
+        <p14:creationId xmlns:p14="http://schemas.microsoft.com/office/powerpoint/2010/main" val="2810330859"/>
+      </p:ext>
+    </p:extLst>
+  </p:cSld>
+  <p:clrMapOvr>
+    <a:masterClrMapping/>
+  </p:clrMapOvr>
+</p:notes>
+</file>
+
+<file path=ppt/notesSlides/notesSlide14.xml><?xml version="1.0" encoding="utf-8"?>
+<p:notes xmlns:a="http://schemas.openxmlformats.org/drawingml/2006/main" xmlns:r="http://schemas.openxmlformats.org/officeDocument/2006/relationships" xmlns:p="http://schemas.openxmlformats.org/presentationml/2006/main" showMasterSp="0" showMasterPhAnim="0">
+  <p:cSld>
+    <p:spTree>
+      <p:nvGrpSpPr>
         <p:cNvPr id="1" name="Shape 274"/>
         <p:cNvGrpSpPr/>
         <p:nvPr/>
@@ -1676,7 +2116,7 @@
   <p:cSld>
     <p:spTree>
       <p:nvGrpSpPr>
-        <p:cNvPr id="1" name="Shape 77"/>
+        <p:cNvPr id="1" name="Shape 136"/>
         <p:cNvGrpSpPr/>
         <p:nvPr/>
       </p:nvGrpSpPr>
@@ -1690,7 +2130,7 @@
       </p:grpSpPr>
       <p:sp>
         <p:nvSpPr>
-          <p:cNvPr id="78" name="Google Shape;78;g35f391192_09:notes"/>
+          <p:cNvPr id="137" name="Google Shape;137;g35f391192_073:notes"/>
           <p:cNvSpPr>
             <a:spLocks noGrp="1" noRot="1" noChangeAspect="1"/>
           </p:cNvSpPr>
@@ -1731,7 +2171,7 @@
       </p:sp>
       <p:sp>
         <p:nvSpPr>
-          <p:cNvPr id="79" name="Google Shape;79;g35f391192_09:notes"/>
+          <p:cNvPr id="138" name="Google Shape;138;g35f391192_073:notes"/>
           <p:cNvSpPr txBox="1">
             <a:spLocks noGrp="1"/>
           </p:cNvSpPr>
@@ -1770,7 +2210,7 @@
     </p:spTree>
     <p:extLst>
       <p:ext uri="{BB962C8B-B14F-4D97-AF65-F5344CB8AC3E}">
-        <p14:creationId xmlns:p14="http://schemas.microsoft.com/office/powerpoint/2010/main" val="2810330859"/>
+        <p14:creationId xmlns:p14="http://schemas.microsoft.com/office/powerpoint/2010/main" val="2805659604"/>
       </p:ext>
     </p:extLst>
   </p:cSld>
@@ -4132,6 +4572,248 @@
 </p:sldLayout>
 </file>
 
+<file path=ppt/slideLayouts/slideLayout8.xml><?xml version="1.0" encoding="utf-8"?>
+<p:sldLayout xmlns:a="http://schemas.openxmlformats.org/drawingml/2006/main" xmlns:r="http://schemas.openxmlformats.org/officeDocument/2006/relationships" xmlns:p="http://schemas.openxmlformats.org/presentationml/2006/main" matchingName="Title only" type="titleOnly">
+  <p:cSld name="Title only">
+    <p:spTree>
+      <p:nvGrpSpPr>
+        <p:cNvPr id="1" name="Shape 37"/>
+        <p:cNvGrpSpPr/>
+        <p:nvPr/>
+      </p:nvGrpSpPr>
+      <p:grpSpPr>
+        <a:xfrm>
+          <a:off x="0" y="0"/>
+          <a:ext cx="0" cy="0"/>
+          <a:chOff x="0" y="0"/>
+          <a:chExt cx="0" cy="0"/>
+        </a:xfrm>
+      </p:grpSpPr>
+      <p:sp>
+        <p:nvSpPr>
+          <p:cNvPr id="38" name="Google Shape;38;p8"/>
+          <p:cNvSpPr txBox="1">
+            <a:spLocks noGrp="1"/>
+          </p:cNvSpPr>
+          <p:nvPr>
+            <p:ph type="title"/>
+          </p:nvPr>
+        </p:nvSpPr>
+        <p:spPr>
+          <a:xfrm>
+            <a:off x="388955" y="338306"/>
+            <a:ext cx="8366100" cy="762600"/>
+          </a:xfrm>
+          <a:prstGeom prst="rect">
+            <a:avLst/>
+          </a:prstGeom>
+        </p:spPr>
+        <p:txBody>
+          <a:bodyPr spcFirstLastPara="1" wrap="square" lIns="91425" tIns="91425" rIns="91425" bIns="91425" anchor="ctr" anchorCtr="0">
+            <a:noAutofit/>
+          </a:bodyPr>
+          <a:lstStyle>
+            <a:lvl1pPr lvl="0">
+              <a:spcBef>
+                <a:spcPts val="0"/>
+              </a:spcBef>
+              <a:spcAft>
+                <a:spcPts val="0"/>
+              </a:spcAft>
+              <a:buSzPts val="1600"/>
+              <a:buNone/>
+              <a:defRPr>
+                <a:highlight>
+                  <a:srgbClr val="F3F3F3"/>
+                </a:highlight>
+              </a:defRPr>
+            </a:lvl1pPr>
+            <a:lvl2pPr lvl="1">
+              <a:spcBef>
+                <a:spcPts val="0"/>
+              </a:spcBef>
+              <a:spcAft>
+                <a:spcPts val="0"/>
+              </a:spcAft>
+              <a:buSzPts val="1600"/>
+              <a:buNone/>
+              <a:defRPr/>
+            </a:lvl2pPr>
+            <a:lvl3pPr lvl="2">
+              <a:spcBef>
+                <a:spcPts val="0"/>
+              </a:spcBef>
+              <a:spcAft>
+                <a:spcPts val="0"/>
+              </a:spcAft>
+              <a:buSzPts val="1600"/>
+              <a:buNone/>
+              <a:defRPr/>
+            </a:lvl3pPr>
+            <a:lvl4pPr lvl="3">
+              <a:spcBef>
+                <a:spcPts val="0"/>
+              </a:spcBef>
+              <a:spcAft>
+                <a:spcPts val="0"/>
+              </a:spcAft>
+              <a:buSzPts val="1600"/>
+              <a:buNone/>
+              <a:defRPr/>
+            </a:lvl4pPr>
+            <a:lvl5pPr lvl="4">
+              <a:spcBef>
+                <a:spcPts val="0"/>
+              </a:spcBef>
+              <a:spcAft>
+                <a:spcPts val="0"/>
+              </a:spcAft>
+              <a:buSzPts val="1600"/>
+              <a:buNone/>
+              <a:defRPr/>
+            </a:lvl5pPr>
+            <a:lvl6pPr lvl="5">
+              <a:spcBef>
+                <a:spcPts val="0"/>
+              </a:spcBef>
+              <a:spcAft>
+                <a:spcPts val="0"/>
+              </a:spcAft>
+              <a:buSzPts val="1600"/>
+              <a:buNone/>
+              <a:defRPr/>
+            </a:lvl6pPr>
+            <a:lvl7pPr lvl="6">
+              <a:spcBef>
+                <a:spcPts val="0"/>
+              </a:spcBef>
+              <a:spcAft>
+                <a:spcPts val="0"/>
+              </a:spcAft>
+              <a:buSzPts val="1600"/>
+              <a:buNone/>
+              <a:defRPr/>
+            </a:lvl7pPr>
+            <a:lvl8pPr lvl="7">
+              <a:spcBef>
+                <a:spcPts val="0"/>
+              </a:spcBef>
+              <a:spcAft>
+                <a:spcPts val="0"/>
+              </a:spcAft>
+              <a:buSzPts val="1600"/>
+              <a:buNone/>
+              <a:defRPr/>
+            </a:lvl8pPr>
+            <a:lvl9pPr lvl="8">
+              <a:spcBef>
+                <a:spcPts val="0"/>
+              </a:spcBef>
+              <a:spcAft>
+                <a:spcPts val="0"/>
+              </a:spcAft>
+              <a:buSzPts val="1600"/>
+              <a:buNone/>
+              <a:defRPr/>
+            </a:lvl9pPr>
+          </a:lstStyle>
+          <a:p>
+            <a:endParaRPr/>
+          </a:p>
+        </p:txBody>
+      </p:sp>
+      <p:sp>
+        <p:nvSpPr>
+          <p:cNvPr id="39" name="Google Shape;39;p8"/>
+          <p:cNvSpPr txBox="1">
+            <a:spLocks noGrp="1"/>
+          </p:cNvSpPr>
+          <p:nvPr>
+            <p:ph type="sldNum" idx="12"/>
+          </p:nvPr>
+        </p:nvSpPr>
+        <p:spPr>
+          <a:xfrm>
+            <a:off x="4297650" y="4419838"/>
+            <a:ext cx="548700" cy="393600"/>
+          </a:xfrm>
+          <a:prstGeom prst="rect">
+            <a:avLst/>
+          </a:prstGeom>
+        </p:spPr>
+        <p:txBody>
+          <a:bodyPr spcFirstLastPara="1" wrap="square" lIns="91425" tIns="91425" rIns="91425" bIns="91425" anchor="b" anchorCtr="0">
+            <a:noAutofit/>
+          </a:bodyPr>
+          <a:lstStyle>
+            <a:lvl1pPr lvl="0" rtl="0">
+              <a:buNone/>
+              <a:defRPr/>
+            </a:lvl1pPr>
+            <a:lvl2pPr lvl="1" rtl="0">
+              <a:buNone/>
+              <a:defRPr/>
+            </a:lvl2pPr>
+            <a:lvl3pPr lvl="2" rtl="0">
+              <a:buNone/>
+              <a:defRPr/>
+            </a:lvl3pPr>
+            <a:lvl4pPr lvl="3" rtl="0">
+              <a:buNone/>
+              <a:defRPr/>
+            </a:lvl4pPr>
+            <a:lvl5pPr lvl="4" rtl="0">
+              <a:buNone/>
+              <a:defRPr/>
+            </a:lvl5pPr>
+            <a:lvl6pPr lvl="5" rtl="0">
+              <a:buNone/>
+              <a:defRPr/>
+            </a:lvl6pPr>
+            <a:lvl7pPr lvl="6" rtl="0">
+              <a:buNone/>
+              <a:defRPr/>
+            </a:lvl7pPr>
+            <a:lvl8pPr lvl="7" rtl="0">
+              <a:buNone/>
+              <a:defRPr/>
+            </a:lvl8pPr>
+            <a:lvl9pPr lvl="8" rtl="0">
+              <a:buNone/>
+              <a:defRPr/>
+            </a:lvl9pPr>
+          </a:lstStyle>
+          <a:p>
+            <a:pPr marL="0" lvl="0" indent="0" algn="ctr" rtl="0">
+              <a:spcBef>
+                <a:spcPts val="0"/>
+              </a:spcBef>
+              <a:spcAft>
+                <a:spcPts val="0"/>
+              </a:spcAft>
+              <a:buNone/>
+            </a:pPr>
+            <a:fld id="{00000000-1234-1234-1234-123412341234}" type="slidenum">
+              <a:rPr lang="en"/>
+              <a:t>‹#›</a:t>
+            </a:fld>
+            <a:endParaRPr/>
+          </a:p>
+        </p:txBody>
+      </p:sp>
+    </p:spTree>
+    <p:extLst>
+      <p:ext uri="{BB962C8B-B14F-4D97-AF65-F5344CB8AC3E}">
+        <p14:creationId xmlns:p14="http://schemas.microsoft.com/office/powerpoint/2010/main" val="3110752525"/>
+      </p:ext>
+    </p:extLst>
+  </p:cSld>
+  <p:clrMapOvr>
+    <a:masterClrMapping/>
+  </p:clrMapOvr>
+</p:sldLayout>
+</file>
+
 <file path=ppt/slideMasters/slideMaster1.xml><?xml version="1.0" encoding="utf-8"?>
 <p:sldMaster xmlns:a="http://schemas.openxmlformats.org/drawingml/2006/main" xmlns:r="http://schemas.openxmlformats.org/officeDocument/2006/relationships" xmlns:p="http://schemas.openxmlformats.org/presentationml/2006/main">
   <p:cSld name="simple-light">
@@ -4893,6 +5575,7 @@
     <p:sldLayoutId id="2147483662" r:id="rId5"/>
     <p:sldLayoutId id="2147483663" r:id="rId6"/>
     <p:sldLayoutId id="2147483664" r:id="rId7"/>
+    <p:sldLayoutId id="2147483665" r:id="rId8"/>
   </p:sldLayoutIdLst>
   <p:hf hdr="0" ftr="0" dt="0"/>
   <p:txStyles>
@@ -6001,6 +6684,1886 @@
   <p:cSld>
     <p:spTree>
       <p:nvGrpSpPr>
+        <p:cNvPr id="1" name="Shape 139"/>
+        <p:cNvGrpSpPr/>
+        <p:nvPr/>
+      </p:nvGrpSpPr>
+      <p:grpSpPr>
+        <a:xfrm>
+          <a:off x="0" y="0"/>
+          <a:ext cx="0" cy="0"/>
+          <a:chOff x="0" y="0"/>
+          <a:chExt cx="0" cy="0"/>
+        </a:xfrm>
+      </p:grpSpPr>
+      <p:sp>
+        <p:nvSpPr>
+          <p:cNvPr id="141" name="Google Shape;141;p23"/>
+          <p:cNvSpPr/>
+          <p:nvPr/>
+        </p:nvSpPr>
+        <p:spPr>
+          <a:xfrm>
+            <a:off x="1927550" y="1640700"/>
+            <a:ext cx="1876800" cy="1862100"/>
+          </a:xfrm>
+          <a:prstGeom prst="ellipse">
+            <a:avLst/>
+          </a:prstGeom>
+          <a:solidFill>
+            <a:srgbClr val="F3F3F3"/>
+          </a:solidFill>
+          <a:ln>
+            <a:noFill/>
+          </a:ln>
+        </p:spPr>
+        <p:txBody>
+          <a:bodyPr spcFirstLastPara="1" wrap="square" lIns="91425" tIns="91425" rIns="91425" bIns="91425" anchor="ctr" anchorCtr="0">
+            <a:noAutofit/>
+          </a:bodyPr>
+          <a:lstStyle/>
+          <a:p>
+            <a:pPr marL="0" lvl="0" indent="0" algn="ctr" rtl="0">
+              <a:spcBef>
+                <a:spcPts val="0"/>
+              </a:spcBef>
+              <a:spcAft>
+                <a:spcPts val="0"/>
+              </a:spcAft>
+              <a:buNone/>
+            </a:pPr>
+            <a:r>
+              <a:rPr lang="en" dirty="0">
+                <a:latin typeface="PT Serif"/>
+                <a:ea typeface="PT Serif"/>
+                <a:cs typeface="PT Serif"/>
+                <a:sym typeface="PT Serif"/>
+              </a:rPr>
+              <a:t>Original </a:t>
+            </a:r>
+          </a:p>
+          <a:p>
+            <a:pPr marL="0" lvl="0" indent="0" algn="ctr" rtl="0">
+              <a:spcBef>
+                <a:spcPts val="0"/>
+              </a:spcBef>
+              <a:spcAft>
+                <a:spcPts val="0"/>
+              </a:spcAft>
+              <a:buNone/>
+            </a:pPr>
+            <a:r>
+              <a:rPr lang="en" dirty="0">
+                <a:latin typeface="PT Serif"/>
+                <a:ea typeface="PT Serif"/>
+                <a:cs typeface="PT Serif"/>
+                <a:sym typeface="PT Serif"/>
+              </a:rPr>
+              <a:t>Code</a:t>
+            </a:r>
+            <a:endParaRPr dirty="0">
+              <a:latin typeface="PT Serif"/>
+              <a:ea typeface="PT Serif"/>
+              <a:cs typeface="PT Serif"/>
+              <a:sym typeface="PT Serif"/>
+            </a:endParaRPr>
+          </a:p>
+        </p:txBody>
+      </p:sp>
+      <p:sp>
+        <p:nvSpPr>
+          <p:cNvPr id="142" name="Google Shape;142;p23"/>
+          <p:cNvSpPr/>
+          <p:nvPr/>
+        </p:nvSpPr>
+        <p:spPr>
+          <a:xfrm>
+            <a:off x="5339611" y="1640700"/>
+            <a:ext cx="1876800" cy="1862100"/>
+          </a:xfrm>
+          <a:prstGeom prst="ellipse">
+            <a:avLst/>
+          </a:prstGeom>
+          <a:solidFill>
+            <a:srgbClr val="F3F3F3"/>
+          </a:solidFill>
+          <a:ln>
+            <a:noFill/>
+          </a:ln>
+        </p:spPr>
+        <p:txBody>
+          <a:bodyPr spcFirstLastPara="1" wrap="square" lIns="91425" tIns="91425" rIns="91425" bIns="91425" anchor="ctr" anchorCtr="0">
+            <a:noAutofit/>
+          </a:bodyPr>
+          <a:lstStyle/>
+          <a:p>
+            <a:pPr marL="0" lvl="0" indent="0" algn="ctr" rtl="0">
+              <a:spcBef>
+                <a:spcPts val="0"/>
+              </a:spcBef>
+              <a:spcAft>
+                <a:spcPts val="0"/>
+              </a:spcAft>
+              <a:buNone/>
+            </a:pPr>
+            <a:r>
+              <a:rPr lang="en" dirty="0">
+                <a:latin typeface="PT Serif"/>
+                <a:ea typeface="PT Serif"/>
+                <a:cs typeface="PT Serif"/>
+                <a:sym typeface="PT Serif"/>
+              </a:rPr>
+              <a:t>Refactored </a:t>
+            </a:r>
+          </a:p>
+          <a:p>
+            <a:pPr marL="0" lvl="0" indent="0" algn="ctr" rtl="0">
+              <a:spcBef>
+                <a:spcPts val="0"/>
+              </a:spcBef>
+              <a:spcAft>
+                <a:spcPts val="0"/>
+              </a:spcAft>
+              <a:buNone/>
+            </a:pPr>
+            <a:r>
+              <a:rPr lang="en" dirty="0">
+                <a:latin typeface="PT Serif"/>
+                <a:ea typeface="PT Serif"/>
+                <a:cs typeface="PT Serif"/>
+                <a:sym typeface="PT Serif"/>
+              </a:rPr>
+              <a:t>Code</a:t>
+            </a:r>
+            <a:endParaRPr dirty="0">
+              <a:latin typeface="PT Serif"/>
+              <a:ea typeface="PT Serif"/>
+              <a:cs typeface="PT Serif"/>
+              <a:sym typeface="PT Serif"/>
+            </a:endParaRPr>
+          </a:p>
+        </p:txBody>
+      </p:sp>
+      <p:sp>
+        <p:nvSpPr>
+          <p:cNvPr id="144" name="Google Shape;144;p23"/>
+          <p:cNvSpPr txBox="1">
+            <a:spLocks noGrp="1"/>
+          </p:cNvSpPr>
+          <p:nvPr>
+            <p:ph type="sldNum" idx="12"/>
+          </p:nvPr>
+        </p:nvSpPr>
+        <p:spPr>
+          <a:xfrm>
+            <a:off x="4297650" y="4419838"/>
+            <a:ext cx="548700" cy="393600"/>
+          </a:xfrm>
+          <a:prstGeom prst="rect">
+            <a:avLst/>
+          </a:prstGeom>
+        </p:spPr>
+        <p:txBody>
+          <a:bodyPr spcFirstLastPara="1" wrap="square" lIns="91425" tIns="91425" rIns="91425" bIns="91425" anchor="b" anchorCtr="0">
+            <a:noAutofit/>
+          </a:bodyPr>
+          <a:lstStyle/>
+          <a:p>
+            <a:pPr marL="0" lvl="0" indent="0" algn="ctr" rtl="0">
+              <a:spcBef>
+                <a:spcPts val="0"/>
+              </a:spcBef>
+              <a:spcAft>
+                <a:spcPts val="0"/>
+              </a:spcAft>
+              <a:buNone/>
+            </a:pPr>
+            <a:fld id="{00000000-1234-1234-1234-123412341234}" type="slidenum">
+              <a:rPr lang="en"/>
+              <a:t>10</a:t>
+            </a:fld>
+            <a:endParaRPr/>
+          </a:p>
+        </p:txBody>
+      </p:sp>
+      <p:sp>
+        <p:nvSpPr>
+          <p:cNvPr id="2" name="TextBox 1">
+            <a:extLst>
+              <a:ext uri="{FF2B5EF4-FFF2-40B4-BE49-F238E27FC236}">
+                <a16:creationId xmlns:a16="http://schemas.microsoft.com/office/drawing/2014/main" id="{F958274F-3410-3745-9856-0B137122BBA9}"/>
+              </a:ext>
+            </a:extLst>
+          </p:cNvPr>
+          <p:cNvSpPr txBox="1"/>
+          <p:nvPr/>
+        </p:nvSpPr>
+        <p:spPr>
+          <a:xfrm>
+            <a:off x="4171165" y="2340917"/>
+            <a:ext cx="675185" cy="461665"/>
+          </a:xfrm>
+          <a:prstGeom prst="rect">
+            <a:avLst/>
+          </a:prstGeom>
+          <a:noFill/>
+        </p:spPr>
+        <p:txBody>
+          <a:bodyPr wrap="none" rtlCol="0">
+            <a:spAutoFit/>
+          </a:bodyPr>
+          <a:lstStyle/>
+          <a:p>
+            <a:r>
+              <a:rPr lang="en-US" sz="2400" dirty="0">
+                <a:latin typeface="PT Serif"/>
+              </a:rPr>
+              <a:t>===</a:t>
+            </a:r>
+          </a:p>
+        </p:txBody>
+      </p:sp>
+      <p:cxnSp>
+        <p:nvCxnSpPr>
+          <p:cNvPr id="4" name="Straight Arrow Connector 3">
+            <a:extLst>
+              <a:ext uri="{FF2B5EF4-FFF2-40B4-BE49-F238E27FC236}">
+                <a16:creationId xmlns:a16="http://schemas.microsoft.com/office/drawing/2014/main" id="{EAAF9933-340E-284C-BF32-583805272BFB}"/>
+              </a:ext>
+            </a:extLst>
+          </p:cNvPr>
+          <p:cNvCxnSpPr>
+            <a:cxnSpLocks/>
+          </p:cNvCxnSpPr>
+          <p:nvPr/>
+        </p:nvCxnSpPr>
+        <p:spPr>
+          <a:xfrm>
+            <a:off x="6263668" y="1391478"/>
+            <a:ext cx="0" cy="249222"/>
+          </a:xfrm>
+          <a:prstGeom prst="straightConnector1">
+            <a:avLst/>
+          </a:prstGeom>
+          <a:ln>
+            <a:tailEnd type="triangle"/>
+          </a:ln>
+        </p:spPr>
+        <p:style>
+          <a:lnRef idx="1">
+            <a:schemeClr val="accent1"/>
+          </a:lnRef>
+          <a:fillRef idx="0">
+            <a:schemeClr val="accent1"/>
+          </a:fillRef>
+          <a:effectRef idx="0">
+            <a:schemeClr val="accent1"/>
+          </a:effectRef>
+          <a:fontRef idx="minor">
+            <a:schemeClr val="tx1"/>
+          </a:fontRef>
+        </p:style>
+      </p:cxnSp>
+      <p:sp>
+        <p:nvSpPr>
+          <p:cNvPr id="9" name="Freeform 8">
+            <a:extLst>
+              <a:ext uri="{FF2B5EF4-FFF2-40B4-BE49-F238E27FC236}">
+                <a16:creationId xmlns:a16="http://schemas.microsoft.com/office/drawing/2014/main" id="{B00EDA58-360B-9346-B89E-B9FE9E5C2179}"/>
+              </a:ext>
+            </a:extLst>
+          </p:cNvPr>
+          <p:cNvSpPr/>
+          <p:nvPr/>
+        </p:nvSpPr>
+        <p:spPr>
+          <a:xfrm rot="10800000">
+            <a:off x="3645654" y="2976106"/>
+            <a:ext cx="1852654" cy="366270"/>
+          </a:xfrm>
+          <a:custGeom>
+            <a:avLst/>
+            <a:gdLst>
+              <a:gd name="connsiteX0" fmla="*/ 0 w 1852654"/>
+              <a:gd name="connsiteY0" fmla="*/ 302659 h 366270"/>
+              <a:gd name="connsiteX1" fmla="*/ 842838 w 1852654"/>
+              <a:gd name="connsiteY1" fmla="*/ 510 h 366270"/>
+              <a:gd name="connsiteX2" fmla="*/ 1852654 w 1852654"/>
+              <a:gd name="connsiteY2" fmla="*/ 366270 h 366270"/>
+            </a:gdLst>
+            <a:ahLst/>
+            <a:cxnLst>
+              <a:cxn ang="0">
+                <a:pos x="connsiteX0" y="connsiteY0"/>
+              </a:cxn>
+              <a:cxn ang="0">
+                <a:pos x="connsiteX1" y="connsiteY1"/>
+              </a:cxn>
+              <a:cxn ang="0">
+                <a:pos x="connsiteX2" y="connsiteY2"/>
+              </a:cxn>
+            </a:cxnLst>
+            <a:rect l="l" t="t" r="r" b="b"/>
+            <a:pathLst>
+              <a:path w="1852654" h="366270">
+                <a:moveTo>
+                  <a:pt x="0" y="302659"/>
+                </a:moveTo>
+                <a:cubicBezTo>
+                  <a:pt x="267031" y="146283"/>
+                  <a:pt x="534062" y="-10092"/>
+                  <a:pt x="842838" y="510"/>
+                </a:cubicBezTo>
+                <a:cubicBezTo>
+                  <a:pt x="1151614" y="11112"/>
+                  <a:pt x="1502134" y="188691"/>
+                  <a:pt x="1852654" y="366270"/>
+                </a:cubicBezTo>
+              </a:path>
+            </a:pathLst>
+          </a:custGeom>
+          <a:noFill/>
+          <a:ln>
+            <a:tailEnd type="triangle"/>
+          </a:ln>
+        </p:spPr>
+        <p:style>
+          <a:lnRef idx="2">
+            <a:schemeClr val="accent1">
+              <a:shade val="50000"/>
+            </a:schemeClr>
+          </a:lnRef>
+          <a:fillRef idx="1">
+            <a:schemeClr val="accent1"/>
+          </a:fillRef>
+          <a:effectRef idx="0">
+            <a:schemeClr val="accent1"/>
+          </a:effectRef>
+          <a:fontRef idx="minor">
+            <a:schemeClr val="lt1"/>
+          </a:fontRef>
+        </p:style>
+        <p:txBody>
+          <a:bodyPr rtlCol="0" anchor="ctr"/>
+          <a:lstStyle/>
+          <a:p>
+            <a:pPr algn="ctr"/>
+            <a:endParaRPr lang="en-US"/>
+          </a:p>
+        </p:txBody>
+      </p:sp>
+      <p:sp>
+        <p:nvSpPr>
+          <p:cNvPr id="10" name="TextBox 9">
+            <a:extLst>
+              <a:ext uri="{FF2B5EF4-FFF2-40B4-BE49-F238E27FC236}">
+                <a16:creationId xmlns:a16="http://schemas.microsoft.com/office/drawing/2014/main" id="{F63E6113-C64B-BC42-ABEA-6DB09455D094}"/>
+              </a:ext>
+            </a:extLst>
+          </p:cNvPr>
+          <p:cNvSpPr txBox="1"/>
+          <p:nvPr/>
+        </p:nvSpPr>
+        <p:spPr>
+          <a:xfrm>
+            <a:off x="3500213" y="3342377"/>
+            <a:ext cx="2143536" cy="307777"/>
+          </a:xfrm>
+          <a:prstGeom prst="rect">
+            <a:avLst/>
+          </a:prstGeom>
+          <a:noFill/>
+        </p:spPr>
+        <p:txBody>
+          <a:bodyPr wrap="none" rtlCol="0">
+            <a:spAutoFit/>
+          </a:bodyPr>
+          <a:lstStyle/>
+          <a:p>
+            <a:pPr algn="ctr"/>
+            <a:r>
+              <a:rPr lang="en-US" dirty="0"/>
+              <a:t>Provable Transformation</a:t>
+            </a:r>
+          </a:p>
+        </p:txBody>
+      </p:sp>
+      <p:pic>
+        <p:nvPicPr>
+          <p:cNvPr id="1026" name="Picture 2" descr="Green check mark icon checkmark in circle Vector Image">
+            <a:extLst>
+              <a:ext uri="{FF2B5EF4-FFF2-40B4-BE49-F238E27FC236}">
+                <a16:creationId xmlns:a16="http://schemas.microsoft.com/office/drawing/2014/main" id="{E5A0E872-AB72-3440-A650-58A91E67278D}"/>
+              </a:ext>
+            </a:extLst>
+          </p:cNvPr>
+          <p:cNvPicPr>
+            <a:picLocks noChangeAspect="1" noChangeArrowheads="1"/>
+          </p:cNvPicPr>
+          <p:nvPr/>
+        </p:nvPicPr>
+        <p:blipFill rotWithShape="1">
+          <a:blip r:embed="rId3">
+            <a:extLst>
+              <a:ext uri="{BEBA8EAE-BF5A-486C-A8C5-ECC9F3942E4B}">
+                <a14:imgProps xmlns:a14="http://schemas.microsoft.com/office/drawing/2010/main">
+                  <a14:imgLayer r:embed="rId4">
+                    <a14:imgEffect>
+                      <a14:backgroundRemoval t="8593" b="77337" l="10000" r="90000">
+                        <a14:foregroundMark x1="46200" y1="54630" x2="46200" y2="54630"/>
+                      </a14:backgroundRemoval>
+                    </a14:imgEffect>
+                  </a14:imgLayer>
+                </a14:imgProps>
+              </a:ext>
+              <a:ext uri="{28A0092B-C50C-407E-A947-70E740481C1C}">
+                <a14:useLocalDpi xmlns:a14="http://schemas.microsoft.com/office/drawing/2010/main" val="0"/>
+              </a:ext>
+            </a:extLst>
+          </a:blip>
+          <a:srcRect b="14070"/>
+          <a:stretch/>
+        </p:blipFill>
+        <p:spPr bwMode="auto">
+          <a:xfrm>
+            <a:off x="1888976" y="3014197"/>
+            <a:ext cx="707246" cy="656360"/>
+          </a:xfrm>
+          <a:prstGeom prst="rect">
+            <a:avLst/>
+          </a:prstGeom>
+          <a:noFill/>
+          <a:extLst>
+            <a:ext uri="{909E8E84-426E-40DD-AFC4-6F175D3DCCD1}">
+              <a14:hiddenFill xmlns:a14="http://schemas.microsoft.com/office/drawing/2010/main">
+                <a:solidFill>
+                  <a:srgbClr val="FFFFFF"/>
+                </a:solidFill>
+              </a14:hiddenFill>
+            </a:ext>
+          </a:extLst>
+        </p:spPr>
+      </p:pic>
+      <p:sp>
+        <p:nvSpPr>
+          <p:cNvPr id="13" name="Google Shape;140;p23">
+            <a:extLst>
+              <a:ext uri="{FF2B5EF4-FFF2-40B4-BE49-F238E27FC236}">
+                <a16:creationId xmlns:a16="http://schemas.microsoft.com/office/drawing/2014/main" id="{4F8AF1CE-5BB7-3D49-9E1C-B0C194523DDB}"/>
+              </a:ext>
+            </a:extLst>
+          </p:cNvPr>
+          <p:cNvSpPr txBox="1">
+            <a:spLocks noGrp="1"/>
+          </p:cNvSpPr>
+          <p:nvPr>
+            <p:ph type="title"/>
+          </p:nvPr>
+        </p:nvSpPr>
+        <p:spPr>
+          <a:xfrm>
+            <a:off x="388955" y="338306"/>
+            <a:ext cx="8366100" cy="762600"/>
+          </a:xfrm>
+          <a:prstGeom prst="rect">
+            <a:avLst/>
+          </a:prstGeom>
+        </p:spPr>
+        <p:txBody>
+          <a:bodyPr spcFirstLastPara="1" wrap="square" lIns="91425" tIns="91425" rIns="91425" bIns="91425" anchor="ctr" anchorCtr="0">
+            <a:noAutofit/>
+          </a:bodyPr>
+          <a:lstStyle/>
+          <a:p>
+            <a:pPr marL="0" lvl="0" indent="0" algn="ctr" rtl="0">
+              <a:spcBef>
+                <a:spcPts val="0"/>
+              </a:spcBef>
+              <a:spcAft>
+                <a:spcPts val="0"/>
+              </a:spcAft>
+              <a:buNone/>
+            </a:pPr>
+            <a:r>
+              <a:rPr lang="en" dirty="0"/>
+              <a:t>Checking For Behavior Preservation</a:t>
+            </a:r>
+            <a:endParaRPr dirty="0"/>
+          </a:p>
+        </p:txBody>
+      </p:sp>
+    </p:spTree>
+    <p:extLst>
+      <p:ext uri="{BB962C8B-B14F-4D97-AF65-F5344CB8AC3E}">
+        <p14:creationId xmlns:p14="http://schemas.microsoft.com/office/powerpoint/2010/main" val="647161667"/>
+      </p:ext>
+    </p:extLst>
+  </p:cSld>
+  <p:clrMapOvr>
+    <a:masterClrMapping/>
+  </p:clrMapOvr>
+  <p:timing>
+    <p:tnLst>
+      <p:par>
+        <p:cTn id="1" dur="indefinite" restart="never" nodeType="tmRoot">
+          <p:childTnLst>
+            <p:seq concurrent="1" nextAc="seek">
+              <p:cTn id="2" dur="indefinite" nodeType="mainSeq">
+                <p:childTnLst>
+                  <p:par>
+                    <p:cTn id="3" fill="hold">
+                      <p:stCondLst>
+                        <p:cond delay="indefinite"/>
+                      </p:stCondLst>
+                      <p:childTnLst>
+                        <p:par>
+                          <p:cTn id="4" fill="hold">
+                            <p:stCondLst>
+                              <p:cond delay="0"/>
+                            </p:stCondLst>
+                            <p:childTnLst>
+                              <p:par>
+                                <p:cTn id="5" presetID="1" presetClass="entr" presetSubtype="0" fill="hold" nodeType="clickEffect">
+                                  <p:stCondLst>
+                                    <p:cond delay="0"/>
+                                  </p:stCondLst>
+                                  <p:childTnLst>
+                                    <p:set>
+                                      <p:cBhvr>
+                                        <p:cTn id="6" dur="1" fill="hold">
+                                          <p:stCondLst>
+                                            <p:cond delay="0"/>
+                                          </p:stCondLst>
+                                        </p:cTn>
+                                        <p:tgtEl>
+                                          <p:spTgt spid="4"/>
+                                        </p:tgtEl>
+                                        <p:attrNameLst>
+                                          <p:attrName>style.visibility</p:attrName>
+                                        </p:attrNameLst>
+                                      </p:cBhvr>
+                                      <p:to>
+                                        <p:strVal val="visible"/>
+                                      </p:to>
+                                    </p:set>
+                                  </p:childTnLst>
+                                </p:cTn>
+                              </p:par>
+                            </p:childTnLst>
+                          </p:cTn>
+                        </p:par>
+                      </p:childTnLst>
+                    </p:cTn>
+                  </p:par>
+                  <p:par>
+                    <p:cTn id="7" fill="hold">
+                      <p:stCondLst>
+                        <p:cond delay="indefinite"/>
+                      </p:stCondLst>
+                      <p:childTnLst>
+                        <p:par>
+                          <p:cTn id="8" fill="hold">
+                            <p:stCondLst>
+                              <p:cond delay="0"/>
+                            </p:stCondLst>
+                            <p:childTnLst>
+                              <p:par>
+                                <p:cTn id="9" presetID="1" presetClass="entr" presetSubtype="0" fill="hold" grpId="0" nodeType="clickEffect">
+                                  <p:stCondLst>
+                                    <p:cond delay="0"/>
+                                  </p:stCondLst>
+                                  <p:childTnLst>
+                                    <p:set>
+                                      <p:cBhvr>
+                                        <p:cTn id="10" dur="1" fill="hold">
+                                          <p:stCondLst>
+                                            <p:cond delay="0"/>
+                                          </p:stCondLst>
+                                        </p:cTn>
+                                        <p:tgtEl>
+                                          <p:spTgt spid="10"/>
+                                        </p:tgtEl>
+                                        <p:attrNameLst>
+                                          <p:attrName>style.visibility</p:attrName>
+                                        </p:attrNameLst>
+                                      </p:cBhvr>
+                                      <p:to>
+                                        <p:strVal val="visible"/>
+                                      </p:to>
+                                    </p:set>
+                                  </p:childTnLst>
+                                </p:cTn>
+                              </p:par>
+                              <p:par>
+                                <p:cTn id="11" presetID="1" presetClass="entr" presetSubtype="0" fill="hold" grpId="0" nodeType="withEffect">
+                                  <p:stCondLst>
+                                    <p:cond delay="0"/>
+                                  </p:stCondLst>
+                                  <p:childTnLst>
+                                    <p:set>
+                                      <p:cBhvr>
+                                        <p:cTn id="12" dur="1" fill="hold">
+                                          <p:stCondLst>
+                                            <p:cond delay="0"/>
+                                          </p:stCondLst>
+                                        </p:cTn>
+                                        <p:tgtEl>
+                                          <p:spTgt spid="9"/>
+                                        </p:tgtEl>
+                                        <p:attrNameLst>
+                                          <p:attrName>style.visibility</p:attrName>
+                                        </p:attrNameLst>
+                                      </p:cBhvr>
+                                      <p:to>
+                                        <p:strVal val="visible"/>
+                                      </p:to>
+                                    </p:set>
+                                  </p:childTnLst>
+                                </p:cTn>
+                              </p:par>
+                            </p:childTnLst>
+                          </p:cTn>
+                        </p:par>
+                      </p:childTnLst>
+                    </p:cTn>
+                  </p:par>
+                  <p:par>
+                    <p:cTn id="13" fill="hold">
+                      <p:stCondLst>
+                        <p:cond delay="indefinite"/>
+                      </p:stCondLst>
+                      <p:childTnLst>
+                        <p:par>
+                          <p:cTn id="14" fill="hold">
+                            <p:stCondLst>
+                              <p:cond delay="0"/>
+                            </p:stCondLst>
+                            <p:childTnLst>
+                              <p:par>
+                                <p:cTn id="15" presetID="1" presetClass="entr" presetSubtype="0" fill="hold" nodeType="clickEffect">
+                                  <p:stCondLst>
+                                    <p:cond delay="0"/>
+                                  </p:stCondLst>
+                                  <p:childTnLst>
+                                    <p:set>
+                                      <p:cBhvr>
+                                        <p:cTn id="16" dur="1" fill="hold">
+                                          <p:stCondLst>
+                                            <p:cond delay="0"/>
+                                          </p:stCondLst>
+                                        </p:cTn>
+                                        <p:tgtEl>
+                                          <p:spTgt spid="1026"/>
+                                        </p:tgtEl>
+                                        <p:attrNameLst>
+                                          <p:attrName>style.visibility</p:attrName>
+                                        </p:attrNameLst>
+                                      </p:cBhvr>
+                                      <p:to>
+                                        <p:strVal val="visible"/>
+                                      </p:to>
+                                    </p:set>
+                                  </p:childTnLst>
+                                </p:cTn>
+                              </p:par>
+                            </p:childTnLst>
+                          </p:cTn>
+                        </p:par>
+                      </p:childTnLst>
+                    </p:cTn>
+                  </p:par>
+                </p:childTnLst>
+              </p:cTn>
+              <p:prevCondLst>
+                <p:cond evt="onPrev" delay="0">
+                  <p:tgtEl>
+                    <p:sldTgt/>
+                  </p:tgtEl>
+                </p:cond>
+              </p:prevCondLst>
+              <p:nextCondLst>
+                <p:cond evt="onNext" delay="0">
+                  <p:tgtEl>
+                    <p:sldTgt/>
+                  </p:tgtEl>
+                </p:cond>
+              </p:nextCondLst>
+            </p:seq>
+          </p:childTnLst>
+        </p:cTn>
+      </p:par>
+    </p:tnLst>
+    <p:bldLst>
+      <p:bldP spid="9" grpId="0" animBg="1"/>
+      <p:bldP spid="10" grpId="0"/>
+    </p:bldLst>
+  </p:timing>
+</p:sld>
+</file>
+
+<file path=ppt/slides/slide11.xml><?xml version="1.0" encoding="utf-8"?>
+<p:sld xmlns:a="http://schemas.openxmlformats.org/drawingml/2006/main" xmlns:r="http://schemas.openxmlformats.org/officeDocument/2006/relationships" xmlns:p="http://schemas.openxmlformats.org/presentationml/2006/main">
+  <p:cSld>
+    <p:spTree>
+      <p:nvGrpSpPr>
+        <p:cNvPr id="1" name="Shape 139"/>
+        <p:cNvGrpSpPr/>
+        <p:nvPr/>
+      </p:nvGrpSpPr>
+      <p:grpSpPr>
+        <a:xfrm>
+          <a:off x="0" y="0"/>
+          <a:ext cx="0" cy="0"/>
+          <a:chOff x="0" y="0"/>
+          <a:chExt cx="0" cy="0"/>
+        </a:xfrm>
+      </p:grpSpPr>
+      <p:sp>
+        <p:nvSpPr>
+          <p:cNvPr id="141" name="Google Shape;141;p23"/>
+          <p:cNvSpPr/>
+          <p:nvPr/>
+        </p:nvSpPr>
+        <p:spPr>
+          <a:xfrm>
+            <a:off x="474135" y="389416"/>
+            <a:ext cx="1876800" cy="1862100"/>
+          </a:xfrm>
+          <a:prstGeom prst="ellipse">
+            <a:avLst/>
+          </a:prstGeom>
+          <a:solidFill>
+            <a:srgbClr val="F3F3F3"/>
+          </a:solidFill>
+          <a:ln>
+            <a:noFill/>
+          </a:ln>
+        </p:spPr>
+        <p:txBody>
+          <a:bodyPr spcFirstLastPara="1" wrap="square" lIns="91425" tIns="91425" rIns="91425" bIns="91425" anchor="ctr" anchorCtr="0">
+            <a:noAutofit/>
+          </a:bodyPr>
+          <a:lstStyle/>
+          <a:p>
+            <a:pPr marL="0" lvl="0" indent="0" algn="ctr" rtl="0">
+              <a:spcBef>
+                <a:spcPts val="0"/>
+              </a:spcBef>
+              <a:spcAft>
+                <a:spcPts val="0"/>
+              </a:spcAft>
+              <a:buNone/>
+            </a:pPr>
+            <a:r>
+              <a:rPr lang="en" dirty="0">
+                <a:latin typeface="PT Serif"/>
+                <a:ea typeface="PT Serif"/>
+                <a:cs typeface="PT Serif"/>
+                <a:sym typeface="PT Serif"/>
+              </a:rPr>
+              <a:t>Original </a:t>
+            </a:r>
+          </a:p>
+          <a:p>
+            <a:pPr marL="0" lvl="0" indent="0" algn="ctr" rtl="0">
+              <a:spcBef>
+                <a:spcPts val="0"/>
+              </a:spcBef>
+              <a:spcAft>
+                <a:spcPts val="0"/>
+              </a:spcAft>
+              <a:buNone/>
+            </a:pPr>
+            <a:r>
+              <a:rPr lang="en" dirty="0">
+                <a:latin typeface="PT Serif"/>
+                <a:ea typeface="PT Serif"/>
+                <a:cs typeface="PT Serif"/>
+                <a:sym typeface="PT Serif"/>
+              </a:rPr>
+              <a:t>Code</a:t>
+            </a:r>
+            <a:endParaRPr dirty="0">
+              <a:latin typeface="PT Serif"/>
+              <a:ea typeface="PT Serif"/>
+              <a:cs typeface="PT Serif"/>
+              <a:sym typeface="PT Serif"/>
+            </a:endParaRPr>
+          </a:p>
+        </p:txBody>
+      </p:sp>
+      <p:sp>
+        <p:nvSpPr>
+          <p:cNvPr id="142" name="Google Shape;142;p23"/>
+          <p:cNvSpPr/>
+          <p:nvPr/>
+        </p:nvSpPr>
+        <p:spPr>
+          <a:xfrm>
+            <a:off x="5488485" y="1727327"/>
+            <a:ext cx="1876800" cy="1862100"/>
+          </a:xfrm>
+          <a:prstGeom prst="ellipse">
+            <a:avLst/>
+          </a:prstGeom>
+          <a:solidFill>
+            <a:srgbClr val="F3F3F3"/>
+          </a:solidFill>
+          <a:ln>
+            <a:noFill/>
+          </a:ln>
+        </p:spPr>
+        <p:txBody>
+          <a:bodyPr spcFirstLastPara="1" wrap="square" lIns="91425" tIns="91425" rIns="91425" bIns="91425" anchor="ctr" anchorCtr="0">
+            <a:noAutofit/>
+          </a:bodyPr>
+          <a:lstStyle/>
+          <a:p>
+            <a:pPr marL="0" lvl="0" indent="0" algn="ctr" rtl="0">
+              <a:spcBef>
+                <a:spcPts val="0"/>
+              </a:spcBef>
+              <a:spcAft>
+                <a:spcPts val="0"/>
+              </a:spcAft>
+              <a:buNone/>
+            </a:pPr>
+            <a:r>
+              <a:rPr lang="en" dirty="0">
+                <a:latin typeface="PT Serif"/>
+                <a:ea typeface="PT Serif"/>
+                <a:cs typeface="PT Serif"/>
+                <a:sym typeface="PT Serif"/>
+              </a:rPr>
+              <a:t>Refactored </a:t>
+            </a:r>
+          </a:p>
+          <a:p>
+            <a:pPr marL="0" lvl="0" indent="0" algn="ctr" rtl="0">
+              <a:spcBef>
+                <a:spcPts val="0"/>
+              </a:spcBef>
+              <a:spcAft>
+                <a:spcPts val="0"/>
+              </a:spcAft>
+              <a:buNone/>
+            </a:pPr>
+            <a:r>
+              <a:rPr lang="en" dirty="0">
+                <a:latin typeface="PT Serif"/>
+                <a:ea typeface="PT Serif"/>
+                <a:cs typeface="PT Serif"/>
+                <a:sym typeface="PT Serif"/>
+              </a:rPr>
+              <a:t>Code</a:t>
+            </a:r>
+            <a:endParaRPr dirty="0">
+              <a:latin typeface="PT Serif"/>
+              <a:ea typeface="PT Serif"/>
+              <a:cs typeface="PT Serif"/>
+              <a:sym typeface="PT Serif"/>
+            </a:endParaRPr>
+          </a:p>
+        </p:txBody>
+      </p:sp>
+      <p:sp>
+        <p:nvSpPr>
+          <p:cNvPr id="144" name="Google Shape;144;p23"/>
+          <p:cNvSpPr txBox="1">
+            <a:spLocks noGrp="1"/>
+          </p:cNvSpPr>
+          <p:nvPr>
+            <p:ph type="sldNum" idx="12"/>
+          </p:nvPr>
+        </p:nvSpPr>
+        <p:spPr>
+          <a:xfrm>
+            <a:off x="4297650" y="4419838"/>
+            <a:ext cx="548700" cy="393600"/>
+          </a:xfrm>
+          <a:prstGeom prst="rect">
+            <a:avLst/>
+          </a:prstGeom>
+        </p:spPr>
+        <p:txBody>
+          <a:bodyPr spcFirstLastPara="1" wrap="square" lIns="91425" tIns="91425" rIns="91425" bIns="91425" anchor="b" anchorCtr="0">
+            <a:noAutofit/>
+          </a:bodyPr>
+          <a:lstStyle/>
+          <a:p>
+            <a:pPr marL="0" lvl="0" indent="0" algn="ctr" rtl="0">
+              <a:spcBef>
+                <a:spcPts val="0"/>
+              </a:spcBef>
+              <a:spcAft>
+                <a:spcPts val="0"/>
+              </a:spcAft>
+              <a:buNone/>
+            </a:pPr>
+            <a:fld id="{00000000-1234-1234-1234-123412341234}" type="slidenum">
+              <a:rPr lang="en"/>
+              <a:t>11</a:t>
+            </a:fld>
+            <a:endParaRPr/>
+          </a:p>
+        </p:txBody>
+      </p:sp>
+      <p:sp>
+        <p:nvSpPr>
+          <p:cNvPr id="10" name="TextBox 9">
+            <a:extLst>
+              <a:ext uri="{FF2B5EF4-FFF2-40B4-BE49-F238E27FC236}">
+                <a16:creationId xmlns:a16="http://schemas.microsoft.com/office/drawing/2014/main" id="{F63E6113-C64B-BC42-ABEA-6DB09455D094}"/>
+              </a:ext>
+            </a:extLst>
+          </p:cNvPr>
+          <p:cNvSpPr txBox="1"/>
+          <p:nvPr/>
+        </p:nvSpPr>
+        <p:spPr>
+          <a:xfrm>
+            <a:off x="2956390" y="2504488"/>
+            <a:ext cx="1776448" cy="307777"/>
+          </a:xfrm>
+          <a:prstGeom prst="rect">
+            <a:avLst/>
+          </a:prstGeom>
+          <a:noFill/>
+        </p:spPr>
+        <p:txBody>
+          <a:bodyPr wrap="none" rtlCol="0">
+            <a:spAutoFit/>
+          </a:bodyPr>
+          <a:lstStyle/>
+          <a:p>
+            <a:pPr algn="ctr"/>
+            <a:r>
+              <a:rPr lang="en-US" dirty="0"/>
+              <a:t>Provable Movement</a:t>
+            </a:r>
+          </a:p>
+        </p:txBody>
+      </p:sp>
+      <p:cxnSp>
+        <p:nvCxnSpPr>
+          <p:cNvPr id="5" name="Straight Arrow Connector 4">
+            <a:extLst>
+              <a:ext uri="{FF2B5EF4-FFF2-40B4-BE49-F238E27FC236}">
+                <a16:creationId xmlns:a16="http://schemas.microsoft.com/office/drawing/2014/main" id="{0BB4B109-F0E1-2940-BE38-F40FFA0285C6}"/>
+              </a:ext>
+            </a:extLst>
+          </p:cNvPr>
+          <p:cNvCxnSpPr/>
+          <p:nvPr/>
+        </p:nvCxnSpPr>
+        <p:spPr>
+          <a:xfrm>
+            <a:off x="4846350" y="2658376"/>
+            <a:ext cx="428294" cy="0"/>
+          </a:xfrm>
+          <a:prstGeom prst="straightConnector1">
+            <a:avLst/>
+          </a:prstGeom>
+          <a:ln>
+            <a:tailEnd type="triangle"/>
+          </a:ln>
+        </p:spPr>
+        <p:style>
+          <a:lnRef idx="1">
+            <a:schemeClr val="accent1"/>
+          </a:lnRef>
+          <a:fillRef idx="0">
+            <a:schemeClr val="accent1"/>
+          </a:fillRef>
+          <a:effectRef idx="0">
+            <a:schemeClr val="accent1"/>
+          </a:effectRef>
+          <a:fontRef idx="minor">
+            <a:schemeClr val="tx1"/>
+          </a:fontRef>
+        </p:style>
+      </p:cxnSp>
+      <p:sp>
+        <p:nvSpPr>
+          <p:cNvPr id="11" name="TextBox 10">
+            <a:extLst>
+              <a:ext uri="{FF2B5EF4-FFF2-40B4-BE49-F238E27FC236}">
+                <a16:creationId xmlns:a16="http://schemas.microsoft.com/office/drawing/2014/main" id="{1E9325B4-9939-1543-B763-C3AC5F40BD40}"/>
+              </a:ext>
+            </a:extLst>
+          </p:cNvPr>
+          <p:cNvSpPr txBox="1"/>
+          <p:nvPr/>
+        </p:nvSpPr>
+        <p:spPr>
+          <a:xfrm>
+            <a:off x="3443703" y="4265949"/>
+            <a:ext cx="801823" cy="307777"/>
+          </a:xfrm>
+          <a:prstGeom prst="rect">
+            <a:avLst/>
+          </a:prstGeom>
+          <a:noFill/>
+        </p:spPr>
+        <p:txBody>
+          <a:bodyPr wrap="none" rtlCol="0">
+            <a:spAutoFit/>
+          </a:bodyPr>
+          <a:lstStyle/>
+          <a:p>
+            <a:pPr algn="ctr"/>
+            <a:r>
+              <a:rPr lang="en-US" dirty="0"/>
+              <a:t>Commit</a:t>
+            </a:r>
+          </a:p>
+        </p:txBody>
+      </p:sp>
+    </p:spTree>
+    <p:extLst>
+      <p:ext uri="{BB962C8B-B14F-4D97-AF65-F5344CB8AC3E}">
+        <p14:creationId xmlns:p14="http://schemas.microsoft.com/office/powerpoint/2010/main" val="3519876440"/>
+      </p:ext>
+    </p:extLst>
+  </p:cSld>
+  <p:clrMapOvr>
+    <a:masterClrMapping/>
+  </p:clrMapOvr>
+</p:sld>
+</file>
+
+<file path=ppt/slides/slide12.xml><?xml version="1.0" encoding="utf-8"?>
+<p:sld xmlns:a="http://schemas.openxmlformats.org/drawingml/2006/main" xmlns:r="http://schemas.openxmlformats.org/officeDocument/2006/relationships" xmlns:p="http://schemas.openxmlformats.org/presentationml/2006/main">
+  <p:cSld>
+    <p:spTree>
+      <p:nvGrpSpPr>
+        <p:cNvPr id="1" name="Shape 139"/>
+        <p:cNvGrpSpPr/>
+        <p:nvPr/>
+      </p:nvGrpSpPr>
+      <p:grpSpPr>
+        <a:xfrm>
+          <a:off x="0" y="0"/>
+          <a:ext cx="0" cy="0"/>
+          <a:chOff x="0" y="0"/>
+          <a:chExt cx="0" cy="0"/>
+        </a:xfrm>
+      </p:grpSpPr>
+      <p:sp>
+        <p:nvSpPr>
+          <p:cNvPr id="141" name="Google Shape;141;p23"/>
+          <p:cNvSpPr/>
+          <p:nvPr/>
+        </p:nvSpPr>
+        <p:spPr>
+          <a:xfrm>
+            <a:off x="474135" y="389416"/>
+            <a:ext cx="1480205" cy="1468611"/>
+          </a:xfrm>
+          <a:prstGeom prst="ellipse">
+            <a:avLst/>
+          </a:prstGeom>
+          <a:solidFill>
+            <a:srgbClr val="F3F3F3"/>
+          </a:solidFill>
+          <a:ln>
+            <a:noFill/>
+          </a:ln>
+        </p:spPr>
+        <p:txBody>
+          <a:bodyPr spcFirstLastPara="1" wrap="square" lIns="91425" tIns="91425" rIns="91425" bIns="91425" anchor="ctr" anchorCtr="0">
+            <a:noAutofit/>
+          </a:bodyPr>
+          <a:lstStyle/>
+          <a:p>
+            <a:pPr marL="0" lvl="0" indent="0" algn="ctr" rtl="0">
+              <a:spcBef>
+                <a:spcPts val="0"/>
+              </a:spcBef>
+              <a:spcAft>
+                <a:spcPts val="0"/>
+              </a:spcAft>
+              <a:buNone/>
+            </a:pPr>
+            <a:r>
+              <a:rPr lang="en" dirty="0">
+                <a:latin typeface="PT Serif"/>
+                <a:ea typeface="PT Serif"/>
+                <a:cs typeface="PT Serif"/>
+                <a:sym typeface="PT Serif"/>
+              </a:rPr>
+              <a:t>Original </a:t>
+            </a:r>
+          </a:p>
+          <a:p>
+            <a:pPr marL="0" lvl="0" indent="0" algn="ctr" rtl="0">
+              <a:spcBef>
+                <a:spcPts val="0"/>
+              </a:spcBef>
+              <a:spcAft>
+                <a:spcPts val="0"/>
+              </a:spcAft>
+              <a:buNone/>
+            </a:pPr>
+            <a:r>
+              <a:rPr lang="en" dirty="0">
+                <a:latin typeface="PT Serif"/>
+                <a:ea typeface="PT Serif"/>
+                <a:cs typeface="PT Serif"/>
+                <a:sym typeface="PT Serif"/>
+              </a:rPr>
+              <a:t>Code</a:t>
+            </a:r>
+            <a:endParaRPr dirty="0">
+              <a:latin typeface="PT Serif"/>
+              <a:ea typeface="PT Serif"/>
+              <a:cs typeface="PT Serif"/>
+              <a:sym typeface="PT Serif"/>
+            </a:endParaRPr>
+          </a:p>
+        </p:txBody>
+      </p:sp>
+      <p:sp>
+        <p:nvSpPr>
+          <p:cNvPr id="142" name="Google Shape;142;p23"/>
+          <p:cNvSpPr/>
+          <p:nvPr/>
+        </p:nvSpPr>
+        <p:spPr>
+          <a:xfrm>
+            <a:off x="6238213" y="1103139"/>
+            <a:ext cx="1480205" cy="1468611"/>
+          </a:xfrm>
+          <a:prstGeom prst="ellipse">
+            <a:avLst/>
+          </a:prstGeom>
+          <a:solidFill>
+            <a:srgbClr val="F3F3F3"/>
+          </a:solidFill>
+          <a:ln>
+            <a:noFill/>
+          </a:ln>
+        </p:spPr>
+        <p:txBody>
+          <a:bodyPr spcFirstLastPara="1" wrap="square" lIns="91425" tIns="91425" rIns="91425" bIns="91425" anchor="ctr" anchorCtr="0">
+            <a:noAutofit/>
+          </a:bodyPr>
+          <a:lstStyle/>
+          <a:p>
+            <a:pPr marL="0" lvl="0" indent="0" algn="ctr" rtl="0">
+              <a:spcBef>
+                <a:spcPts val="0"/>
+              </a:spcBef>
+              <a:spcAft>
+                <a:spcPts val="0"/>
+              </a:spcAft>
+              <a:buNone/>
+            </a:pPr>
+            <a:r>
+              <a:rPr lang="en" dirty="0">
+                <a:latin typeface="PT Serif"/>
+                <a:ea typeface="PT Serif"/>
+                <a:cs typeface="PT Serif"/>
+                <a:sym typeface="PT Serif"/>
+              </a:rPr>
+              <a:t>Refactored </a:t>
+            </a:r>
+          </a:p>
+          <a:p>
+            <a:pPr marL="0" lvl="0" indent="0" algn="ctr" rtl="0">
+              <a:spcBef>
+                <a:spcPts val="0"/>
+              </a:spcBef>
+              <a:spcAft>
+                <a:spcPts val="0"/>
+              </a:spcAft>
+              <a:buNone/>
+            </a:pPr>
+            <a:r>
+              <a:rPr lang="en" dirty="0">
+                <a:latin typeface="PT Serif"/>
+                <a:ea typeface="PT Serif"/>
+                <a:cs typeface="PT Serif"/>
+                <a:sym typeface="PT Serif"/>
+              </a:rPr>
+              <a:t>Code</a:t>
+            </a:r>
+            <a:endParaRPr dirty="0">
+              <a:latin typeface="PT Serif"/>
+              <a:ea typeface="PT Serif"/>
+              <a:cs typeface="PT Serif"/>
+              <a:sym typeface="PT Serif"/>
+            </a:endParaRPr>
+          </a:p>
+        </p:txBody>
+      </p:sp>
+      <p:sp>
+        <p:nvSpPr>
+          <p:cNvPr id="144" name="Google Shape;144;p23"/>
+          <p:cNvSpPr txBox="1">
+            <a:spLocks noGrp="1"/>
+          </p:cNvSpPr>
+          <p:nvPr>
+            <p:ph type="sldNum" idx="12"/>
+          </p:nvPr>
+        </p:nvSpPr>
+        <p:spPr>
+          <a:xfrm>
+            <a:off x="4297650" y="4419838"/>
+            <a:ext cx="548700" cy="393600"/>
+          </a:xfrm>
+          <a:prstGeom prst="rect">
+            <a:avLst/>
+          </a:prstGeom>
+        </p:spPr>
+        <p:txBody>
+          <a:bodyPr spcFirstLastPara="1" wrap="square" lIns="91425" tIns="91425" rIns="91425" bIns="91425" anchor="b" anchorCtr="0">
+            <a:noAutofit/>
+          </a:bodyPr>
+          <a:lstStyle/>
+          <a:p>
+            <a:pPr marL="0" lvl="0" indent="0" algn="ctr" rtl="0">
+              <a:spcBef>
+                <a:spcPts val="0"/>
+              </a:spcBef>
+              <a:spcAft>
+                <a:spcPts val="0"/>
+              </a:spcAft>
+              <a:buNone/>
+            </a:pPr>
+            <a:fld id="{00000000-1234-1234-1234-123412341234}" type="slidenum">
+              <a:rPr lang="en"/>
+              <a:t>12</a:t>
+            </a:fld>
+            <a:endParaRPr/>
+          </a:p>
+        </p:txBody>
+      </p:sp>
+      <p:sp>
+        <p:nvSpPr>
+          <p:cNvPr id="10" name="TextBox 9">
+            <a:extLst>
+              <a:ext uri="{FF2B5EF4-FFF2-40B4-BE49-F238E27FC236}">
+                <a16:creationId xmlns:a16="http://schemas.microsoft.com/office/drawing/2014/main" id="{F63E6113-C64B-BC42-ABEA-6DB09455D094}"/>
+              </a:ext>
+            </a:extLst>
+          </p:cNvPr>
+          <p:cNvSpPr txBox="1"/>
+          <p:nvPr/>
+        </p:nvSpPr>
+        <p:spPr>
+          <a:xfrm>
+            <a:off x="3810470" y="1744092"/>
+            <a:ext cx="1338829" cy="307777"/>
+          </a:xfrm>
+          <a:prstGeom prst="rect">
+            <a:avLst/>
+          </a:prstGeom>
+          <a:noFill/>
+        </p:spPr>
+        <p:txBody>
+          <a:bodyPr wrap="none" rtlCol="0">
+            <a:spAutoFit/>
+          </a:bodyPr>
+          <a:lstStyle/>
+          <a:p>
+            <a:pPr algn="ctr"/>
+            <a:r>
+              <a:rPr lang="en-US" dirty="0"/>
+              <a:t>Hand Refactor</a:t>
+            </a:r>
+          </a:p>
+        </p:txBody>
+      </p:sp>
+      <p:cxnSp>
+        <p:nvCxnSpPr>
+          <p:cNvPr id="5" name="Straight Arrow Connector 4">
+            <a:extLst>
+              <a:ext uri="{FF2B5EF4-FFF2-40B4-BE49-F238E27FC236}">
+                <a16:creationId xmlns:a16="http://schemas.microsoft.com/office/drawing/2014/main" id="{0BB4B109-F0E1-2940-BE38-F40FFA0285C6}"/>
+              </a:ext>
+            </a:extLst>
+          </p:cNvPr>
+          <p:cNvCxnSpPr/>
+          <p:nvPr/>
+        </p:nvCxnSpPr>
+        <p:spPr>
+          <a:xfrm>
+            <a:off x="5481619" y="1897980"/>
+            <a:ext cx="428294" cy="0"/>
+          </a:xfrm>
+          <a:prstGeom prst="straightConnector1">
+            <a:avLst/>
+          </a:prstGeom>
+          <a:ln>
+            <a:tailEnd type="triangle"/>
+          </a:ln>
+        </p:spPr>
+        <p:style>
+          <a:lnRef idx="1">
+            <a:schemeClr val="accent1"/>
+          </a:lnRef>
+          <a:fillRef idx="0">
+            <a:schemeClr val="accent1"/>
+          </a:fillRef>
+          <a:effectRef idx="0">
+            <a:schemeClr val="accent1"/>
+          </a:effectRef>
+          <a:fontRef idx="minor">
+            <a:schemeClr val="tx1"/>
+          </a:fontRef>
+        </p:style>
+      </p:cxnSp>
+      <p:sp>
+        <p:nvSpPr>
+          <p:cNvPr id="11" name="TextBox 10">
+            <a:extLst>
+              <a:ext uri="{FF2B5EF4-FFF2-40B4-BE49-F238E27FC236}">
+                <a16:creationId xmlns:a16="http://schemas.microsoft.com/office/drawing/2014/main" id="{1E9325B4-9939-1543-B763-C3AC5F40BD40}"/>
+              </a:ext>
+            </a:extLst>
+          </p:cNvPr>
+          <p:cNvSpPr txBox="1"/>
+          <p:nvPr/>
+        </p:nvSpPr>
+        <p:spPr>
+          <a:xfrm>
+            <a:off x="2939830" y="3111072"/>
+            <a:ext cx="3098926" cy="307777"/>
+          </a:xfrm>
+          <a:prstGeom prst="rect">
+            <a:avLst/>
+          </a:prstGeom>
+          <a:noFill/>
+        </p:spPr>
+        <p:txBody>
+          <a:bodyPr wrap="none" rtlCol="0">
+            <a:spAutoFit/>
+          </a:bodyPr>
+          <a:lstStyle/>
+          <a:p>
+            <a:pPr algn="ctr"/>
+            <a:r>
+              <a:rPr lang="en-US" dirty="0"/>
+              <a:t>Check source control for no changes</a:t>
+            </a:r>
+          </a:p>
+        </p:txBody>
+      </p:sp>
+      <p:sp>
+        <p:nvSpPr>
+          <p:cNvPr id="13" name="TextBox 12">
+            <a:extLst>
+              <a:ext uri="{FF2B5EF4-FFF2-40B4-BE49-F238E27FC236}">
+                <a16:creationId xmlns:a16="http://schemas.microsoft.com/office/drawing/2014/main" id="{CF3B5216-EE4A-2E49-AE01-10A10DF60CAF}"/>
+              </a:ext>
+            </a:extLst>
+          </p:cNvPr>
+          <p:cNvSpPr txBox="1"/>
+          <p:nvPr/>
+        </p:nvSpPr>
+        <p:spPr>
+          <a:xfrm>
+            <a:off x="3680418" y="2417861"/>
+            <a:ext cx="1617751" cy="307777"/>
+          </a:xfrm>
+          <a:prstGeom prst="rect">
+            <a:avLst/>
+          </a:prstGeom>
+          <a:noFill/>
+        </p:spPr>
+        <p:txBody>
+          <a:bodyPr wrap="none" rtlCol="0">
+            <a:spAutoFit/>
+          </a:bodyPr>
+          <a:lstStyle/>
+          <a:p>
+            <a:pPr algn="ctr"/>
+            <a:r>
+              <a:rPr lang="en-US" dirty="0"/>
+              <a:t>Provable Refactor</a:t>
+            </a:r>
+          </a:p>
+        </p:txBody>
+      </p:sp>
+      <p:cxnSp>
+        <p:nvCxnSpPr>
+          <p:cNvPr id="14" name="Straight Arrow Connector 13">
+            <a:extLst>
+              <a:ext uri="{FF2B5EF4-FFF2-40B4-BE49-F238E27FC236}">
+                <a16:creationId xmlns:a16="http://schemas.microsoft.com/office/drawing/2014/main" id="{61AA1025-0DB8-2C4E-B108-907A29E8A2D0}"/>
+              </a:ext>
+            </a:extLst>
+          </p:cNvPr>
+          <p:cNvCxnSpPr>
+            <a:cxnSpLocks/>
+          </p:cNvCxnSpPr>
+          <p:nvPr/>
+        </p:nvCxnSpPr>
+        <p:spPr>
+          <a:xfrm flipH="1">
+            <a:off x="2598821" y="2571750"/>
+            <a:ext cx="416588" cy="0"/>
+          </a:xfrm>
+          <a:prstGeom prst="straightConnector1">
+            <a:avLst/>
+          </a:prstGeom>
+          <a:ln>
+            <a:tailEnd type="triangle"/>
+          </a:ln>
+        </p:spPr>
+        <p:style>
+          <a:lnRef idx="1">
+            <a:schemeClr val="accent1"/>
+          </a:lnRef>
+          <a:fillRef idx="0">
+            <a:schemeClr val="accent1"/>
+          </a:fillRef>
+          <a:effectRef idx="0">
+            <a:schemeClr val="accent1"/>
+          </a:effectRef>
+          <a:fontRef idx="minor">
+            <a:schemeClr val="tx1"/>
+          </a:fontRef>
+        </p:style>
+      </p:cxnSp>
+      <p:sp>
+        <p:nvSpPr>
+          <p:cNvPr id="19" name="Google Shape;141;p23">
+            <a:extLst>
+              <a:ext uri="{FF2B5EF4-FFF2-40B4-BE49-F238E27FC236}">
+                <a16:creationId xmlns:a16="http://schemas.microsoft.com/office/drawing/2014/main" id="{7BE3D730-3D14-4A46-8109-EC8B260B1140}"/>
+              </a:ext>
+            </a:extLst>
+          </p:cNvPr>
+          <p:cNvSpPr/>
+          <p:nvPr/>
+        </p:nvSpPr>
+        <p:spPr>
+          <a:xfrm>
+            <a:off x="474135" y="1897980"/>
+            <a:ext cx="1480205" cy="1468611"/>
+          </a:xfrm>
+          <a:prstGeom prst="ellipse">
+            <a:avLst/>
+          </a:prstGeom>
+          <a:solidFill>
+            <a:srgbClr val="F3F3F3"/>
+          </a:solidFill>
+          <a:ln>
+            <a:noFill/>
+          </a:ln>
+        </p:spPr>
+        <p:txBody>
+          <a:bodyPr spcFirstLastPara="1" wrap="square" lIns="91425" tIns="91425" rIns="91425" bIns="91425" anchor="ctr" anchorCtr="0">
+            <a:noAutofit/>
+          </a:bodyPr>
+          <a:lstStyle/>
+          <a:p>
+            <a:pPr marL="0" lvl="0" indent="0" algn="ctr" rtl="0">
+              <a:spcBef>
+                <a:spcPts val="0"/>
+              </a:spcBef>
+              <a:spcAft>
+                <a:spcPts val="0"/>
+              </a:spcAft>
+              <a:buNone/>
+            </a:pPr>
+            <a:r>
+              <a:rPr lang="en" dirty="0">
+                <a:latin typeface="PT Serif"/>
+                <a:ea typeface="PT Serif"/>
+                <a:cs typeface="PT Serif"/>
+                <a:sym typeface="PT Serif"/>
+              </a:rPr>
+              <a:t>Original </a:t>
+            </a:r>
+          </a:p>
+          <a:p>
+            <a:pPr marL="0" lvl="0" indent="0" algn="ctr" rtl="0">
+              <a:spcBef>
+                <a:spcPts val="0"/>
+              </a:spcBef>
+              <a:spcAft>
+                <a:spcPts val="0"/>
+              </a:spcAft>
+              <a:buNone/>
+            </a:pPr>
+            <a:r>
+              <a:rPr lang="en" dirty="0">
+                <a:latin typeface="PT Serif"/>
+                <a:ea typeface="PT Serif"/>
+                <a:cs typeface="PT Serif"/>
+                <a:sym typeface="PT Serif"/>
+              </a:rPr>
+              <a:t>Code</a:t>
+            </a:r>
+            <a:endParaRPr dirty="0">
+              <a:latin typeface="PT Serif"/>
+              <a:ea typeface="PT Serif"/>
+              <a:cs typeface="PT Serif"/>
+              <a:sym typeface="PT Serif"/>
+            </a:endParaRPr>
+          </a:p>
+        </p:txBody>
+      </p:sp>
+      <p:sp>
+        <p:nvSpPr>
+          <p:cNvPr id="20" name="Google Shape;142;p23">
+            <a:extLst>
+              <a:ext uri="{FF2B5EF4-FFF2-40B4-BE49-F238E27FC236}">
+                <a16:creationId xmlns:a16="http://schemas.microsoft.com/office/drawing/2014/main" id="{F0A21A82-AB26-BE4B-9699-D12BFB717AEE}"/>
+              </a:ext>
+            </a:extLst>
+          </p:cNvPr>
+          <p:cNvSpPr/>
+          <p:nvPr/>
+        </p:nvSpPr>
+        <p:spPr>
+          <a:xfrm>
+            <a:off x="6238213" y="3126440"/>
+            <a:ext cx="1480205" cy="1468611"/>
+          </a:xfrm>
+          <a:prstGeom prst="ellipse">
+            <a:avLst/>
+          </a:prstGeom>
+          <a:solidFill>
+            <a:srgbClr val="F3F3F3"/>
+          </a:solidFill>
+          <a:ln>
+            <a:noFill/>
+          </a:ln>
+        </p:spPr>
+        <p:txBody>
+          <a:bodyPr spcFirstLastPara="1" wrap="square" lIns="91425" tIns="91425" rIns="91425" bIns="91425" anchor="ctr" anchorCtr="0">
+            <a:noAutofit/>
+          </a:bodyPr>
+          <a:lstStyle/>
+          <a:p>
+            <a:pPr marL="0" lvl="0" indent="0" algn="ctr" rtl="0">
+              <a:spcBef>
+                <a:spcPts val="0"/>
+              </a:spcBef>
+              <a:spcAft>
+                <a:spcPts val="0"/>
+              </a:spcAft>
+              <a:buNone/>
+            </a:pPr>
+            <a:r>
+              <a:rPr lang="en" dirty="0">
+                <a:latin typeface="PT Serif"/>
+                <a:ea typeface="PT Serif"/>
+                <a:cs typeface="PT Serif"/>
+                <a:sym typeface="PT Serif"/>
+              </a:rPr>
+              <a:t>Refactored </a:t>
+            </a:r>
+          </a:p>
+          <a:p>
+            <a:pPr marL="0" lvl="0" indent="0" algn="ctr" rtl="0">
+              <a:spcBef>
+                <a:spcPts val="0"/>
+              </a:spcBef>
+              <a:spcAft>
+                <a:spcPts val="0"/>
+              </a:spcAft>
+              <a:buNone/>
+            </a:pPr>
+            <a:r>
+              <a:rPr lang="en" dirty="0">
+                <a:latin typeface="PT Serif"/>
+                <a:ea typeface="PT Serif"/>
+                <a:cs typeface="PT Serif"/>
+                <a:sym typeface="PT Serif"/>
+              </a:rPr>
+              <a:t>Code</a:t>
+            </a:r>
+            <a:endParaRPr dirty="0">
+              <a:latin typeface="PT Serif"/>
+              <a:ea typeface="PT Serif"/>
+              <a:cs typeface="PT Serif"/>
+              <a:sym typeface="PT Serif"/>
+            </a:endParaRPr>
+          </a:p>
+        </p:txBody>
+      </p:sp>
+      <p:sp>
+        <p:nvSpPr>
+          <p:cNvPr id="21" name="TextBox 20">
+            <a:extLst>
+              <a:ext uri="{FF2B5EF4-FFF2-40B4-BE49-F238E27FC236}">
+                <a16:creationId xmlns:a16="http://schemas.microsoft.com/office/drawing/2014/main" id="{E663B288-9EE5-3E48-A3DC-BB225AA42AB5}"/>
+              </a:ext>
+            </a:extLst>
+          </p:cNvPr>
+          <p:cNvSpPr txBox="1"/>
+          <p:nvPr/>
+        </p:nvSpPr>
+        <p:spPr>
+          <a:xfrm>
+            <a:off x="4091798" y="3767393"/>
+            <a:ext cx="776175" cy="307777"/>
+          </a:xfrm>
+          <a:prstGeom prst="rect">
+            <a:avLst/>
+          </a:prstGeom>
+          <a:noFill/>
+        </p:spPr>
+        <p:txBody>
+          <a:bodyPr wrap="none" rtlCol="0">
+            <a:spAutoFit/>
+          </a:bodyPr>
+          <a:lstStyle/>
+          <a:p>
+            <a:pPr algn="ctr"/>
+            <a:r>
+              <a:rPr lang="en-US" dirty="0" err="1"/>
+              <a:t>Ctlr</a:t>
+            </a:r>
+            <a:r>
+              <a:rPr lang="en-US" dirty="0"/>
+              <a:t> + Z</a:t>
+            </a:r>
+          </a:p>
+        </p:txBody>
+      </p:sp>
+      <p:cxnSp>
+        <p:nvCxnSpPr>
+          <p:cNvPr id="22" name="Straight Arrow Connector 21">
+            <a:extLst>
+              <a:ext uri="{FF2B5EF4-FFF2-40B4-BE49-F238E27FC236}">
+                <a16:creationId xmlns:a16="http://schemas.microsoft.com/office/drawing/2014/main" id="{7355A9B6-AC6D-B34A-9590-975059BEF2B1}"/>
+              </a:ext>
+            </a:extLst>
+          </p:cNvPr>
+          <p:cNvCxnSpPr/>
+          <p:nvPr/>
+        </p:nvCxnSpPr>
+        <p:spPr>
+          <a:xfrm>
+            <a:off x="5481619" y="3921281"/>
+            <a:ext cx="428294" cy="0"/>
+          </a:xfrm>
+          <a:prstGeom prst="straightConnector1">
+            <a:avLst/>
+          </a:prstGeom>
+          <a:ln>
+            <a:tailEnd type="triangle"/>
+          </a:ln>
+        </p:spPr>
+        <p:style>
+          <a:lnRef idx="1">
+            <a:schemeClr val="accent1"/>
+          </a:lnRef>
+          <a:fillRef idx="0">
+            <a:schemeClr val="accent1"/>
+          </a:fillRef>
+          <a:effectRef idx="0">
+            <a:schemeClr val="accent1"/>
+          </a:effectRef>
+          <a:fontRef idx="minor">
+            <a:schemeClr val="tx1"/>
+          </a:fontRef>
+        </p:style>
+      </p:cxnSp>
+      <p:sp>
+        <p:nvSpPr>
+          <p:cNvPr id="26" name="TextBox 25">
+            <a:extLst>
+              <a:ext uri="{FF2B5EF4-FFF2-40B4-BE49-F238E27FC236}">
+                <a16:creationId xmlns:a16="http://schemas.microsoft.com/office/drawing/2014/main" id="{11301F18-F376-1244-AAF7-C8D71B7D440C}"/>
+              </a:ext>
+            </a:extLst>
+          </p:cNvPr>
+          <p:cNvSpPr txBox="1"/>
+          <p:nvPr/>
+        </p:nvSpPr>
+        <p:spPr>
+          <a:xfrm>
+            <a:off x="4171088" y="4441162"/>
+            <a:ext cx="801823" cy="307777"/>
+          </a:xfrm>
+          <a:prstGeom prst="rect">
+            <a:avLst/>
+          </a:prstGeom>
+          <a:noFill/>
+        </p:spPr>
+        <p:txBody>
+          <a:bodyPr wrap="none" rtlCol="0">
+            <a:spAutoFit/>
+          </a:bodyPr>
+          <a:lstStyle/>
+          <a:p>
+            <a:pPr algn="ctr"/>
+            <a:r>
+              <a:rPr lang="en-US" dirty="0"/>
+              <a:t>Commit</a:t>
+            </a:r>
+          </a:p>
+        </p:txBody>
+      </p:sp>
+    </p:spTree>
+    <p:extLst>
+      <p:ext uri="{BB962C8B-B14F-4D97-AF65-F5344CB8AC3E}">
+        <p14:creationId xmlns:p14="http://schemas.microsoft.com/office/powerpoint/2010/main" val="914475512"/>
+      </p:ext>
+    </p:extLst>
+  </p:cSld>
+  <p:clrMapOvr>
+    <a:masterClrMapping/>
+  </p:clrMapOvr>
+</p:sld>
+</file>
+
+<file path=ppt/slides/slide13.xml><?xml version="1.0" encoding="utf-8"?>
+<p:sld xmlns:a="http://schemas.openxmlformats.org/drawingml/2006/main" xmlns:r="http://schemas.openxmlformats.org/officeDocument/2006/relationships" xmlns:p="http://schemas.openxmlformats.org/presentationml/2006/main">
+  <p:cSld>
+    <p:spTree>
+      <p:nvGrpSpPr>
+        <p:cNvPr id="1" name="Shape 80"/>
+        <p:cNvGrpSpPr/>
+        <p:nvPr/>
+      </p:nvGrpSpPr>
+      <p:grpSpPr>
+        <a:xfrm>
+          <a:off x="0" y="0"/>
+          <a:ext cx="0" cy="0"/>
+          <a:chOff x="0" y="0"/>
+          <a:chExt cx="0" cy="0"/>
+        </a:xfrm>
+      </p:grpSpPr>
+      <p:sp>
+        <p:nvSpPr>
+          <p:cNvPr id="81" name="Google Shape;81;p16"/>
+          <p:cNvSpPr txBox="1">
+            <a:spLocks noGrp="1"/>
+          </p:cNvSpPr>
+          <p:nvPr>
+            <p:ph type="body" idx="1"/>
+          </p:nvPr>
+        </p:nvSpPr>
+        <p:spPr>
+          <a:xfrm>
+            <a:off x="1659150" y="2161800"/>
+            <a:ext cx="5825700" cy="819900"/>
+          </a:xfrm>
+          <a:prstGeom prst="rect">
+            <a:avLst/>
+          </a:prstGeom>
+        </p:spPr>
+        <p:txBody>
+          <a:bodyPr spcFirstLastPara="1" wrap="square" lIns="91425" tIns="91425" rIns="91425" bIns="91425" anchor="t" anchorCtr="0">
+            <a:noAutofit/>
+          </a:bodyPr>
+          <a:lstStyle/>
+          <a:p>
+            <a:pPr marL="0" lvl="0" indent="0" algn="ctr" rtl="0">
+              <a:spcBef>
+                <a:spcPts val="600"/>
+              </a:spcBef>
+              <a:spcAft>
+                <a:spcPts val="0"/>
+              </a:spcAft>
+              <a:buNone/>
+            </a:pPr>
+            <a:r>
+              <a:rPr lang="en" dirty="0"/>
+              <a:t>Instead of extending the system to add your feature,</a:t>
+            </a:r>
+          </a:p>
+          <a:p>
+            <a:pPr marL="0" lvl="0" indent="0" algn="ctr" rtl="0">
+              <a:spcBef>
+                <a:spcPts val="600"/>
+              </a:spcBef>
+              <a:spcAft>
+                <a:spcPts val="0"/>
+              </a:spcAft>
+              <a:buNone/>
+            </a:pPr>
+            <a:r>
+              <a:rPr lang="en" b="1" dirty="0"/>
+              <a:t>extend it to add extendibility </a:t>
+            </a:r>
+          </a:p>
+          <a:p>
+            <a:pPr marL="0" lvl="0" indent="0" algn="ctr" rtl="0">
+              <a:spcBef>
+                <a:spcPts val="600"/>
+              </a:spcBef>
+              <a:spcAft>
+                <a:spcPts val="0"/>
+              </a:spcAft>
+              <a:buNone/>
+            </a:pPr>
+            <a:r>
+              <a:rPr lang="en" dirty="0"/>
+              <a:t>and then plug in your feature</a:t>
+            </a:r>
+            <a:endParaRPr dirty="0"/>
+          </a:p>
+        </p:txBody>
+      </p:sp>
+      <p:sp>
+        <p:nvSpPr>
+          <p:cNvPr id="82" name="Google Shape;82;p16"/>
+          <p:cNvSpPr txBox="1">
+            <a:spLocks noGrp="1"/>
+          </p:cNvSpPr>
+          <p:nvPr>
+            <p:ph type="sldNum" idx="12"/>
+          </p:nvPr>
+        </p:nvSpPr>
+        <p:spPr>
+          <a:xfrm>
+            <a:off x="4297650" y="4419838"/>
+            <a:ext cx="548700" cy="393600"/>
+          </a:xfrm>
+          <a:prstGeom prst="rect">
+            <a:avLst/>
+          </a:prstGeom>
+        </p:spPr>
+        <p:txBody>
+          <a:bodyPr spcFirstLastPara="1" wrap="square" lIns="91425" tIns="91425" rIns="91425" bIns="91425" anchor="b" anchorCtr="0">
+            <a:noAutofit/>
+          </a:bodyPr>
+          <a:lstStyle/>
+          <a:p>
+            <a:pPr marL="0" lvl="0" indent="0" algn="ctr" rtl="0">
+              <a:spcBef>
+                <a:spcPts val="0"/>
+              </a:spcBef>
+              <a:spcAft>
+                <a:spcPts val="0"/>
+              </a:spcAft>
+              <a:buNone/>
+            </a:pPr>
+            <a:fld id="{00000000-1234-1234-1234-123412341234}" type="slidenum">
+              <a:rPr lang="en"/>
+              <a:t>13</a:t>
+            </a:fld>
+            <a:endParaRPr/>
+          </a:p>
+        </p:txBody>
+      </p:sp>
+    </p:spTree>
+    <p:extLst>
+      <p:ext uri="{BB962C8B-B14F-4D97-AF65-F5344CB8AC3E}">
+        <p14:creationId xmlns:p14="http://schemas.microsoft.com/office/powerpoint/2010/main" val="1061700413"/>
+      </p:ext>
+    </p:extLst>
+  </p:cSld>
+  <p:clrMapOvr>
+    <a:masterClrMapping/>
+  </p:clrMapOvr>
+</p:sld>
+</file>
+
+<file path=ppt/slides/slide14.xml><?xml version="1.0" encoding="utf-8"?>
+<p:sld xmlns:a="http://schemas.openxmlformats.org/drawingml/2006/main" xmlns:r="http://schemas.openxmlformats.org/officeDocument/2006/relationships" xmlns:p="http://schemas.openxmlformats.org/presentationml/2006/main">
+  <p:cSld>
+    <p:spTree>
+      <p:nvGrpSpPr>
         <p:cNvPr id="1" name=""/>
         <p:cNvGrpSpPr/>
         <p:nvPr/>
@@ -6142,7 +8705,7 @@
             </a:pPr>
             <a:fld id="{00000000-1234-1234-1234-123412341234}" type="slidenum">
               <a:rPr lang="en" smtClean="0"/>
-              <a:t>10</a:t>
+              <a:t>14</a:t>
             </a:fld>
             <a:endParaRPr lang="en"/>
           </a:p>
@@ -6161,7 +8724,7 @@
 </p:sld>
 </file>
 
-<file path=ppt/slides/slide11.xml><?xml version="1.0" encoding="utf-8"?>
+<file path=ppt/slides/slide15.xml><?xml version="1.0" encoding="utf-8"?>
 <p:sld xmlns:a="http://schemas.openxmlformats.org/drawingml/2006/main" xmlns:r="http://schemas.openxmlformats.org/officeDocument/2006/relationships" xmlns:p="http://schemas.openxmlformats.org/presentationml/2006/main">
   <p:cSld>
     <p:spTree>
@@ -6365,7 +8928,7 @@
             </a:pPr>
             <a:fld id="{00000000-1234-1234-1234-123412341234}" type="slidenum">
               <a:rPr lang="en"/>
-              <a:t>11</a:t>
+              <a:t>15</a:t>
             </a:fld>
             <a:endParaRPr/>
           </a:p>
@@ -16364,7 +18927,7 @@
   <p:cSld>
     <p:spTree>
       <p:nvGrpSpPr>
-        <p:cNvPr id="1" name="Shape 80"/>
+        <p:cNvPr id="1" name="Shape 139"/>
         <p:cNvGrpSpPr/>
         <p:nvPr/>
       </p:nvGrpSpPr>
@@ -16378,32 +18941,34 @@
       </p:grpSpPr>
       <p:sp>
         <p:nvSpPr>
-          <p:cNvPr id="81" name="Google Shape;81;p16"/>
-          <p:cNvSpPr txBox="1">
-            <a:spLocks noGrp="1"/>
-          </p:cNvSpPr>
-          <p:nvPr>
-            <p:ph type="body" idx="1"/>
-          </p:nvPr>
+          <p:cNvPr id="141" name="Google Shape;141;p23"/>
+          <p:cNvSpPr/>
+          <p:nvPr/>
         </p:nvSpPr>
         <p:spPr>
           <a:xfrm>
-            <a:off x="1659150" y="2161800"/>
-            <a:ext cx="5825700" cy="819900"/>
+            <a:off x="1927550" y="1640700"/>
+            <a:ext cx="1876800" cy="1862100"/>
           </a:xfrm>
-          <a:prstGeom prst="rect">
+          <a:prstGeom prst="ellipse">
             <a:avLst/>
           </a:prstGeom>
+          <a:solidFill>
+            <a:srgbClr val="F3F3F3"/>
+          </a:solidFill>
+          <a:ln>
+            <a:noFill/>
+          </a:ln>
         </p:spPr>
         <p:txBody>
-          <a:bodyPr spcFirstLastPara="1" wrap="square" lIns="91425" tIns="91425" rIns="91425" bIns="91425" anchor="t" anchorCtr="0">
+          <a:bodyPr spcFirstLastPara="1" wrap="square" lIns="91425" tIns="91425" rIns="91425" bIns="91425" anchor="ctr" anchorCtr="0">
             <a:noAutofit/>
           </a:bodyPr>
           <a:lstStyle/>
           <a:p>
             <a:pPr marL="0" lvl="0" indent="0" algn="ctr" rtl="0">
               <a:spcBef>
-                <a:spcPts val="600"/>
+                <a:spcPts val="0"/>
               </a:spcBef>
               <a:spcAft>
                 <a:spcPts val="0"/>
@@ -16411,14 +18976,19 @@
               <a:buNone/>
             </a:pPr>
             <a:r>
-              <a:rPr lang="en" dirty="0"/>
-              <a:t>Instead of extending the system to add your feature,</a:t>
+              <a:rPr lang="en" dirty="0">
+                <a:latin typeface="PT Serif"/>
+                <a:ea typeface="PT Serif"/>
+                <a:cs typeface="PT Serif"/>
+                <a:sym typeface="PT Serif"/>
+              </a:rPr>
+              <a:t>Original </a:t>
             </a:r>
           </a:p>
           <a:p>
             <a:pPr marL="0" lvl="0" indent="0" algn="ctr" rtl="0">
               <a:spcBef>
-                <a:spcPts val="600"/>
+                <a:spcPts val="0"/>
               </a:spcBef>
               <a:spcAft>
                 <a:spcPts val="0"/>
@@ -16426,31 +18996,100 @@
               <a:buNone/>
             </a:pPr>
             <a:r>
-              <a:rPr lang="en" b="1" dirty="0"/>
-              <a:t>extend it to add extendibility </a:t>
+              <a:rPr lang="en" dirty="0">
+                <a:latin typeface="PT Serif"/>
+                <a:ea typeface="PT Serif"/>
+                <a:cs typeface="PT Serif"/>
+                <a:sym typeface="PT Serif"/>
+              </a:rPr>
+              <a:t>Code</a:t>
             </a:r>
-          </a:p>
-          <a:p>
-            <a:pPr marL="0" lvl="0" indent="0" algn="ctr" rtl="0">
-              <a:spcBef>
-                <a:spcPts val="600"/>
-              </a:spcBef>
-              <a:spcAft>
-                <a:spcPts val="0"/>
-              </a:spcAft>
-              <a:buNone/>
-            </a:pPr>
-            <a:r>
-              <a:rPr lang="en" dirty="0"/>
-              <a:t>and then plug in your feature</a:t>
-            </a:r>
-            <a:endParaRPr dirty="0"/>
+            <a:endParaRPr dirty="0">
+              <a:latin typeface="PT Serif"/>
+              <a:ea typeface="PT Serif"/>
+              <a:cs typeface="PT Serif"/>
+              <a:sym typeface="PT Serif"/>
+            </a:endParaRPr>
           </a:p>
         </p:txBody>
       </p:sp>
       <p:sp>
         <p:nvSpPr>
-          <p:cNvPr id="82" name="Google Shape;82;p16"/>
+          <p:cNvPr id="142" name="Google Shape;142;p23"/>
+          <p:cNvSpPr/>
+          <p:nvPr/>
+        </p:nvSpPr>
+        <p:spPr>
+          <a:xfrm>
+            <a:off x="5339611" y="1640700"/>
+            <a:ext cx="1876800" cy="1862100"/>
+          </a:xfrm>
+          <a:prstGeom prst="ellipse">
+            <a:avLst/>
+          </a:prstGeom>
+          <a:solidFill>
+            <a:srgbClr val="F3F3F3"/>
+          </a:solidFill>
+          <a:ln>
+            <a:noFill/>
+          </a:ln>
+        </p:spPr>
+        <p:txBody>
+          <a:bodyPr spcFirstLastPara="1" wrap="square" lIns="91425" tIns="91425" rIns="91425" bIns="91425" anchor="ctr" anchorCtr="0">
+            <a:noAutofit/>
+          </a:bodyPr>
+          <a:lstStyle/>
+          <a:p>
+            <a:pPr marL="0" lvl="0" indent="0" algn="ctr" rtl="0">
+              <a:spcBef>
+                <a:spcPts val="0"/>
+              </a:spcBef>
+              <a:spcAft>
+                <a:spcPts val="0"/>
+              </a:spcAft>
+              <a:buNone/>
+            </a:pPr>
+            <a:r>
+              <a:rPr lang="en" dirty="0">
+                <a:latin typeface="PT Serif"/>
+                <a:ea typeface="PT Serif"/>
+                <a:cs typeface="PT Serif"/>
+                <a:sym typeface="PT Serif"/>
+              </a:rPr>
+              <a:t>Refactored </a:t>
+            </a:r>
+          </a:p>
+          <a:p>
+            <a:pPr marL="0" lvl="0" indent="0" algn="ctr" rtl="0">
+              <a:spcBef>
+                <a:spcPts val="0"/>
+              </a:spcBef>
+              <a:spcAft>
+                <a:spcPts val="0"/>
+              </a:spcAft>
+              <a:buNone/>
+            </a:pPr>
+            <a:r>
+              <a:rPr lang="en" dirty="0">
+                <a:latin typeface="PT Serif"/>
+                <a:ea typeface="PT Serif"/>
+                <a:cs typeface="PT Serif"/>
+                <a:sym typeface="PT Serif"/>
+              </a:rPr>
+              <a:t>Code</a:t>
+            </a:r>
+            <a:endParaRPr dirty="0">
+              <a:latin typeface="PT Serif"/>
+              <a:ea typeface="PT Serif"/>
+              <a:cs typeface="PT Serif"/>
+              <a:sym typeface="PT Serif"/>
+            </a:endParaRPr>
+          </a:p>
+        </p:txBody>
+      </p:sp>
+      <p:sp>
+        <p:nvSpPr>
+          <p:cNvPr id="144" name="Google Shape;144;p23"/>
           <p:cNvSpPr txBox="1">
             <a:spLocks noGrp="1"/>
           </p:cNvSpPr>
@@ -16490,16 +19129,417 @@
           </a:p>
         </p:txBody>
       </p:sp>
+      <p:sp>
+        <p:nvSpPr>
+          <p:cNvPr id="2" name="TextBox 1">
+            <a:extLst>
+              <a:ext uri="{FF2B5EF4-FFF2-40B4-BE49-F238E27FC236}">
+                <a16:creationId xmlns:a16="http://schemas.microsoft.com/office/drawing/2014/main" id="{F958274F-3410-3745-9856-0B137122BBA9}"/>
+              </a:ext>
+            </a:extLst>
+          </p:cNvPr>
+          <p:cNvSpPr txBox="1"/>
+          <p:nvPr/>
+        </p:nvSpPr>
+        <p:spPr>
+          <a:xfrm>
+            <a:off x="4171165" y="2340917"/>
+            <a:ext cx="675185" cy="461665"/>
+          </a:xfrm>
+          <a:prstGeom prst="rect">
+            <a:avLst/>
+          </a:prstGeom>
+          <a:noFill/>
+        </p:spPr>
+        <p:txBody>
+          <a:bodyPr wrap="none" rtlCol="0">
+            <a:spAutoFit/>
+          </a:bodyPr>
+          <a:lstStyle/>
+          <a:p>
+            <a:r>
+              <a:rPr lang="en-US" sz="2400" dirty="0">
+                <a:latin typeface="PT Serif"/>
+              </a:rPr>
+              <a:t>===</a:t>
+            </a:r>
+          </a:p>
+        </p:txBody>
+      </p:sp>
+      <p:cxnSp>
+        <p:nvCxnSpPr>
+          <p:cNvPr id="4" name="Straight Arrow Connector 3">
+            <a:extLst>
+              <a:ext uri="{FF2B5EF4-FFF2-40B4-BE49-F238E27FC236}">
+                <a16:creationId xmlns:a16="http://schemas.microsoft.com/office/drawing/2014/main" id="{EAAF9933-340E-284C-BF32-583805272BFB}"/>
+              </a:ext>
+            </a:extLst>
+          </p:cNvPr>
+          <p:cNvCxnSpPr>
+            <a:endCxn id="141" idx="0"/>
+          </p:cNvCxnSpPr>
+          <p:nvPr/>
+        </p:nvCxnSpPr>
+        <p:spPr>
+          <a:xfrm>
+            <a:off x="2865950" y="1391478"/>
+            <a:ext cx="0" cy="249222"/>
+          </a:xfrm>
+          <a:prstGeom prst="straightConnector1">
+            <a:avLst/>
+          </a:prstGeom>
+          <a:ln>
+            <a:tailEnd type="triangle"/>
+          </a:ln>
+        </p:spPr>
+        <p:style>
+          <a:lnRef idx="1">
+            <a:schemeClr val="accent1"/>
+          </a:lnRef>
+          <a:fillRef idx="0">
+            <a:schemeClr val="accent1"/>
+          </a:fillRef>
+          <a:effectRef idx="0">
+            <a:schemeClr val="accent1"/>
+          </a:effectRef>
+          <a:fontRef idx="minor">
+            <a:schemeClr val="tx1"/>
+          </a:fontRef>
+        </p:style>
+      </p:cxnSp>
+      <p:sp>
+        <p:nvSpPr>
+          <p:cNvPr id="9" name="Freeform 8">
+            <a:extLst>
+              <a:ext uri="{FF2B5EF4-FFF2-40B4-BE49-F238E27FC236}">
+                <a16:creationId xmlns:a16="http://schemas.microsoft.com/office/drawing/2014/main" id="{B00EDA58-360B-9346-B89E-B9FE9E5C2179}"/>
+              </a:ext>
+            </a:extLst>
+          </p:cNvPr>
+          <p:cNvSpPr/>
+          <p:nvPr/>
+        </p:nvSpPr>
+        <p:spPr>
+          <a:xfrm>
+            <a:off x="3625795" y="1716972"/>
+            <a:ext cx="1852654" cy="366270"/>
+          </a:xfrm>
+          <a:custGeom>
+            <a:avLst/>
+            <a:gdLst>
+              <a:gd name="connsiteX0" fmla="*/ 0 w 1852654"/>
+              <a:gd name="connsiteY0" fmla="*/ 302659 h 366270"/>
+              <a:gd name="connsiteX1" fmla="*/ 842838 w 1852654"/>
+              <a:gd name="connsiteY1" fmla="*/ 510 h 366270"/>
+              <a:gd name="connsiteX2" fmla="*/ 1852654 w 1852654"/>
+              <a:gd name="connsiteY2" fmla="*/ 366270 h 366270"/>
+            </a:gdLst>
+            <a:ahLst/>
+            <a:cxnLst>
+              <a:cxn ang="0">
+                <a:pos x="connsiteX0" y="connsiteY0"/>
+              </a:cxn>
+              <a:cxn ang="0">
+                <a:pos x="connsiteX1" y="connsiteY1"/>
+              </a:cxn>
+              <a:cxn ang="0">
+                <a:pos x="connsiteX2" y="connsiteY2"/>
+              </a:cxn>
+            </a:cxnLst>
+            <a:rect l="l" t="t" r="r" b="b"/>
+            <a:pathLst>
+              <a:path w="1852654" h="366270">
+                <a:moveTo>
+                  <a:pt x="0" y="302659"/>
+                </a:moveTo>
+                <a:cubicBezTo>
+                  <a:pt x="267031" y="146283"/>
+                  <a:pt x="534062" y="-10092"/>
+                  <a:pt x="842838" y="510"/>
+                </a:cubicBezTo>
+                <a:cubicBezTo>
+                  <a:pt x="1151614" y="11112"/>
+                  <a:pt x="1502134" y="188691"/>
+                  <a:pt x="1852654" y="366270"/>
+                </a:cubicBezTo>
+              </a:path>
+            </a:pathLst>
+          </a:custGeom>
+          <a:noFill/>
+          <a:ln>
+            <a:tailEnd type="triangle"/>
+          </a:ln>
+        </p:spPr>
+        <p:style>
+          <a:lnRef idx="2">
+            <a:schemeClr val="accent1">
+              <a:shade val="50000"/>
+            </a:schemeClr>
+          </a:lnRef>
+          <a:fillRef idx="1">
+            <a:schemeClr val="accent1"/>
+          </a:fillRef>
+          <a:effectRef idx="0">
+            <a:schemeClr val="accent1"/>
+          </a:effectRef>
+          <a:fontRef idx="minor">
+            <a:schemeClr val="lt1"/>
+          </a:fontRef>
+        </p:style>
+        <p:txBody>
+          <a:bodyPr rtlCol="0" anchor="ctr"/>
+          <a:lstStyle/>
+          <a:p>
+            <a:pPr algn="ctr"/>
+            <a:endParaRPr lang="en-US"/>
+          </a:p>
+        </p:txBody>
+      </p:sp>
+      <p:sp>
+        <p:nvSpPr>
+          <p:cNvPr id="10" name="TextBox 9">
+            <a:extLst>
+              <a:ext uri="{FF2B5EF4-FFF2-40B4-BE49-F238E27FC236}">
+                <a16:creationId xmlns:a16="http://schemas.microsoft.com/office/drawing/2014/main" id="{F63E6113-C64B-BC42-ABEA-6DB09455D094}"/>
+              </a:ext>
+            </a:extLst>
+          </p:cNvPr>
+          <p:cNvSpPr txBox="1"/>
+          <p:nvPr/>
+        </p:nvSpPr>
+        <p:spPr>
+          <a:xfrm>
+            <a:off x="3436989" y="1391478"/>
+            <a:ext cx="2143536" cy="307777"/>
+          </a:xfrm>
+          <a:prstGeom prst="rect">
+            <a:avLst/>
+          </a:prstGeom>
+          <a:noFill/>
+        </p:spPr>
+        <p:txBody>
+          <a:bodyPr wrap="none" rtlCol="0">
+            <a:spAutoFit/>
+          </a:bodyPr>
+          <a:lstStyle/>
+          <a:p>
+            <a:pPr algn="ctr"/>
+            <a:r>
+              <a:rPr lang="en-US" dirty="0"/>
+              <a:t>Provable Transformation</a:t>
+            </a:r>
+          </a:p>
+        </p:txBody>
+      </p:sp>
+      <p:sp>
+        <p:nvSpPr>
+          <p:cNvPr id="18" name="Google Shape;140;p23">
+            <a:extLst>
+              <a:ext uri="{FF2B5EF4-FFF2-40B4-BE49-F238E27FC236}">
+                <a16:creationId xmlns:a16="http://schemas.microsoft.com/office/drawing/2014/main" id="{9B645C56-77AE-D843-9795-3EF0DD3B03FA}"/>
+              </a:ext>
+            </a:extLst>
+          </p:cNvPr>
+          <p:cNvSpPr txBox="1">
+            <a:spLocks noGrp="1"/>
+          </p:cNvSpPr>
+          <p:nvPr>
+            <p:ph type="title"/>
+          </p:nvPr>
+        </p:nvSpPr>
+        <p:spPr>
+          <a:xfrm>
+            <a:off x="388955" y="338306"/>
+            <a:ext cx="8366100" cy="762600"/>
+          </a:xfrm>
+          <a:prstGeom prst="rect">
+            <a:avLst/>
+          </a:prstGeom>
+        </p:spPr>
+        <p:txBody>
+          <a:bodyPr spcFirstLastPara="1" wrap="square" lIns="91425" tIns="91425" rIns="91425" bIns="91425" anchor="ctr" anchorCtr="0">
+            <a:noAutofit/>
+          </a:bodyPr>
+          <a:lstStyle/>
+          <a:p>
+            <a:pPr marL="0" lvl="0" indent="0" algn="ctr" rtl="0">
+              <a:spcBef>
+                <a:spcPts val="0"/>
+              </a:spcBef>
+              <a:spcAft>
+                <a:spcPts val="0"/>
+              </a:spcAft>
+              <a:buNone/>
+            </a:pPr>
+            <a:r>
+              <a:rPr lang="en" dirty="0"/>
+              <a:t>Checking For Behavior Preservation</a:t>
+            </a:r>
+            <a:endParaRPr dirty="0"/>
+          </a:p>
+        </p:txBody>
+      </p:sp>
     </p:spTree>
     <p:extLst>
       <p:ext uri="{BB962C8B-B14F-4D97-AF65-F5344CB8AC3E}">
-        <p14:creationId xmlns:p14="http://schemas.microsoft.com/office/powerpoint/2010/main" val="1061700413"/>
+        <p14:creationId xmlns:p14="http://schemas.microsoft.com/office/powerpoint/2010/main" val="996519027"/>
       </p:ext>
     </p:extLst>
   </p:cSld>
   <p:clrMapOvr>
     <a:masterClrMapping/>
   </p:clrMapOvr>
+  <p:timing>
+    <p:tnLst>
+      <p:par>
+        <p:cTn id="1" dur="indefinite" restart="never" nodeType="tmRoot">
+          <p:childTnLst>
+            <p:seq concurrent="1" nextAc="seek">
+              <p:cTn id="2" dur="indefinite" nodeType="mainSeq">
+                <p:childTnLst>
+                  <p:par>
+                    <p:cTn id="3" fill="hold">
+                      <p:stCondLst>
+                        <p:cond delay="indefinite"/>
+                      </p:stCondLst>
+                      <p:childTnLst>
+                        <p:par>
+                          <p:cTn id="4" fill="hold">
+                            <p:stCondLst>
+                              <p:cond delay="0"/>
+                            </p:stCondLst>
+                            <p:childTnLst>
+                              <p:par>
+                                <p:cTn id="5" presetID="1" presetClass="entr" presetSubtype="0" fill="hold" nodeType="clickEffect">
+                                  <p:stCondLst>
+                                    <p:cond delay="0"/>
+                                  </p:stCondLst>
+                                  <p:childTnLst>
+                                    <p:set>
+                                      <p:cBhvr>
+                                        <p:cTn id="6" dur="1" fill="hold">
+                                          <p:stCondLst>
+                                            <p:cond delay="0"/>
+                                          </p:stCondLst>
+                                        </p:cTn>
+                                        <p:tgtEl>
+                                          <p:spTgt spid="4"/>
+                                        </p:tgtEl>
+                                        <p:attrNameLst>
+                                          <p:attrName>style.visibility</p:attrName>
+                                        </p:attrNameLst>
+                                      </p:cBhvr>
+                                      <p:to>
+                                        <p:strVal val="visible"/>
+                                      </p:to>
+                                    </p:set>
+                                  </p:childTnLst>
+                                </p:cTn>
+                              </p:par>
+                            </p:childTnLst>
+                          </p:cTn>
+                        </p:par>
+                      </p:childTnLst>
+                    </p:cTn>
+                  </p:par>
+                  <p:par>
+                    <p:cTn id="7" fill="hold">
+                      <p:stCondLst>
+                        <p:cond delay="indefinite"/>
+                      </p:stCondLst>
+                      <p:childTnLst>
+                        <p:par>
+                          <p:cTn id="8" fill="hold">
+                            <p:stCondLst>
+                              <p:cond delay="0"/>
+                            </p:stCondLst>
+                            <p:childTnLst>
+                              <p:par>
+                                <p:cTn id="9" presetID="1" presetClass="entr" presetSubtype="0" fill="hold" grpId="0" nodeType="clickEffect">
+                                  <p:stCondLst>
+                                    <p:cond delay="0"/>
+                                  </p:stCondLst>
+                                  <p:childTnLst>
+                                    <p:set>
+                                      <p:cBhvr>
+                                        <p:cTn id="10" dur="1" fill="hold">
+                                          <p:stCondLst>
+                                            <p:cond delay="0"/>
+                                          </p:stCondLst>
+                                        </p:cTn>
+                                        <p:tgtEl>
+                                          <p:spTgt spid="10"/>
+                                        </p:tgtEl>
+                                        <p:attrNameLst>
+                                          <p:attrName>style.visibility</p:attrName>
+                                        </p:attrNameLst>
+                                      </p:cBhvr>
+                                      <p:to>
+                                        <p:strVal val="visible"/>
+                                      </p:to>
+                                    </p:set>
+                                  </p:childTnLst>
+                                </p:cTn>
+                              </p:par>
+                              <p:par>
+                                <p:cTn id="11" presetID="1" presetClass="entr" presetSubtype="0" fill="hold" grpId="0" nodeType="withEffect">
+                                  <p:stCondLst>
+                                    <p:cond delay="0"/>
+                                  </p:stCondLst>
+                                  <p:childTnLst>
+                                    <p:set>
+                                      <p:cBhvr>
+                                        <p:cTn id="12" dur="1" fill="hold">
+                                          <p:stCondLst>
+                                            <p:cond delay="0"/>
+                                          </p:stCondLst>
+                                        </p:cTn>
+                                        <p:tgtEl>
+                                          <p:spTgt spid="9"/>
+                                        </p:tgtEl>
+                                        <p:attrNameLst>
+                                          <p:attrName>style.visibility</p:attrName>
+                                        </p:attrNameLst>
+                                      </p:cBhvr>
+                                      <p:to>
+                                        <p:strVal val="visible"/>
+                                      </p:to>
+                                    </p:set>
+                                  </p:childTnLst>
+                                </p:cTn>
+                              </p:par>
+                            </p:childTnLst>
+                          </p:cTn>
+                        </p:par>
+                      </p:childTnLst>
+                    </p:cTn>
+                  </p:par>
+                </p:childTnLst>
+              </p:cTn>
+              <p:prevCondLst>
+                <p:cond evt="onPrev" delay="0">
+                  <p:tgtEl>
+                    <p:sldTgt/>
+                  </p:tgtEl>
+                </p:cond>
+              </p:prevCondLst>
+              <p:nextCondLst>
+                <p:cond evt="onNext" delay="0">
+                  <p:tgtEl>
+                    <p:sldTgt/>
+                  </p:tgtEl>
+                </p:cond>
+              </p:nextCondLst>
+            </p:seq>
+          </p:childTnLst>
+        </p:cTn>
+      </p:par>
+    </p:tnLst>
+    <p:bldLst>
+      <p:bldP spid="9" grpId="0" animBg="1"/>
+      <p:bldP spid="10" grpId="0"/>
+    </p:bldLst>
+  </p:timing>
 </p:sld>
 </file>
 

</xml_diff>